<commit_message>
Added fp samples and updated PPTX
</commit_message>
<xml_diff>
--- a/00 teoría/Language Sessions.pptx
+++ b/00 teoría/Language Sessions.pptx
@@ -5,7 +5,7 @@
     <p:sldMasterId id="2147483648" r:id="rId1"/>
   </p:sldMasterIdLst>
   <p:notesMasterIdLst>
-    <p:notesMasterId r:id="rId11"/>
+    <p:notesMasterId r:id="rId17"/>
   </p:notesMasterIdLst>
   <p:sldIdLst>
     <p:sldId id="256" r:id="rId2"/>
@@ -16,7 +16,13 @@
     <p:sldId id="264" r:id="rId7"/>
     <p:sldId id="261" r:id="rId8"/>
     <p:sldId id="262" r:id="rId9"/>
-    <p:sldId id="263" r:id="rId10"/>
+    <p:sldId id="265" r:id="rId10"/>
+    <p:sldId id="266" r:id="rId11"/>
+    <p:sldId id="269" r:id="rId12"/>
+    <p:sldId id="267" r:id="rId13"/>
+    <p:sldId id="268" r:id="rId14"/>
+    <p:sldId id="270" r:id="rId15"/>
+    <p:sldId id="263" r:id="rId16"/>
   </p:sldIdLst>
   <p:sldSz cx="9144000" cy="5143500" type="screen16x9"/>
   <p:notesSz cx="6858000" cy="9144000"/>
@@ -705,7 +711,7 @@
           </a:lstStyle>
           <a:p>
             <a:fld id="{86CB4B4D-7CA3-9044-876B-883B54F8677D}" type="slidenum">
-              <a:t>‹Nº›</a:t>
+              <a:t>‹#›</a:t>
             </a:fld>
             <a:endParaRPr/>
           </a:p>
@@ -835,7 +841,7 @@
           <a:lstStyle/>
           <a:p>
             <a:fld id="{86CB4B4D-7CA3-9044-876B-883B54F8677D}" type="slidenum">
-              <a:t>‹Nº›</a:t>
+              <a:t>‹#›</a:t>
             </a:fld>
             <a:endParaRPr/>
           </a:p>
@@ -969,7 +975,7 @@
           <a:lstStyle/>
           <a:p>
             <a:fld id="{86CB4B4D-7CA3-9044-876B-883B54F8677D}" type="slidenum">
-              <a:t>‹Nº›</a:t>
+              <a:t>‹#›</a:t>
             </a:fld>
             <a:endParaRPr/>
           </a:p>
@@ -1099,7 +1105,7 @@
           <a:lstStyle/>
           <a:p>
             <a:fld id="{86CB4B4D-7CA3-9044-876B-883B54F8677D}" type="slidenum">
-              <a:t>‹Nº›</a:t>
+              <a:t>‹#›</a:t>
             </a:fld>
             <a:endParaRPr/>
           </a:p>
@@ -1288,7 +1294,7 @@
           <a:lstStyle/>
           <a:p>
             <a:fld id="{86CB4B4D-7CA3-9044-876B-883B54F8677D}" type="slidenum">
-              <a:t>‹Nº›</a:t>
+              <a:t>‹#›</a:t>
             </a:fld>
             <a:endParaRPr/>
           </a:p>
@@ -1449,7 +1455,7 @@
           <a:lstStyle/>
           <a:p>
             <a:fld id="{86CB4B4D-7CA3-9044-876B-883B54F8677D}" type="slidenum">
-              <a:t>‹Nº›</a:t>
+              <a:t>‹#›</a:t>
             </a:fld>
             <a:endParaRPr/>
           </a:p>
@@ -1643,7 +1649,7 @@
           <a:lstStyle/>
           <a:p>
             <a:fld id="{86CB4B4D-7CA3-9044-876B-883B54F8677D}" type="slidenum">
-              <a:t>‹Nº›</a:t>
+              <a:t>‹#›</a:t>
             </a:fld>
             <a:endParaRPr/>
           </a:p>
@@ -1720,7 +1726,7 @@
           <a:lstStyle/>
           <a:p>
             <a:fld id="{86CB4B4D-7CA3-9044-876B-883B54F8677D}" type="slidenum">
-              <a:t>‹Nº›</a:t>
+              <a:t>‹#›</a:t>
             </a:fld>
             <a:endParaRPr/>
           </a:p>
@@ -1772,7 +1778,7 @@
           <a:lstStyle/>
           <a:p>
             <a:fld id="{86CB4B4D-7CA3-9044-876B-883B54F8677D}" type="slidenum">
-              <a:t>‹Nº›</a:t>
+              <a:t>‹#›</a:t>
             </a:fld>
             <a:endParaRPr/>
           </a:p>
@@ -1943,7 +1949,7 @@
           <a:lstStyle/>
           <a:p>
             <a:fld id="{86CB4B4D-7CA3-9044-876B-883B54F8677D}" type="slidenum">
-              <a:t>‹Nº›</a:t>
+              <a:t>‹#›</a:t>
             </a:fld>
             <a:endParaRPr/>
           </a:p>
@@ -2141,7 +2147,7 @@
           <a:lstStyle/>
           <a:p>
             <a:fld id="{86CB4B4D-7CA3-9044-876B-883B54F8677D}" type="slidenum">
-              <a:t>‹Nº›</a:t>
+              <a:t>‹#›</a:t>
             </a:fld>
             <a:endParaRPr/>
           </a:p>
@@ -2204,7 +2210,7 @@
           </a:ln>
           <a:extLst>
             <a:ext uri="{C572A759-6A51-4108-AA02-DFA0A04FC94B}">
-              <ma14:wrappingTextBoxFlag xmlns:ma14="http://schemas.microsoft.com/office/mac/drawingml/2011/main" xmlns:a14="http://schemas.microsoft.com/office/drawing/2010/main" xmlns:m="http://schemas.openxmlformats.org/officeDocument/2006/math" xmlns="" val="1"/>
+              <ma14:wrappingTextBoxFlag xmlns="" xmlns:m="http://schemas.openxmlformats.org/officeDocument/2006/math" xmlns:a14="http://schemas.microsoft.com/office/drawing/2010/main" xmlns:ma14="http://schemas.microsoft.com/office/mac/drawingml/2011/main" val="1"/>
             </a:ext>
           </a:extLst>
         </p:spPr>
@@ -2243,7 +2249,7 @@
           </a:ln>
           <a:extLst>
             <a:ext uri="{C572A759-6A51-4108-AA02-DFA0A04FC94B}">
-              <ma14:wrappingTextBoxFlag xmlns:ma14="http://schemas.microsoft.com/office/mac/drawingml/2011/main" xmlns:a14="http://schemas.microsoft.com/office/drawing/2010/main" xmlns:m="http://schemas.openxmlformats.org/officeDocument/2006/math" xmlns="" val="1"/>
+              <ma14:wrappingTextBoxFlag xmlns="" xmlns:m="http://schemas.openxmlformats.org/officeDocument/2006/math" xmlns:a14="http://schemas.microsoft.com/office/drawing/2010/main" xmlns:ma14="http://schemas.microsoft.com/office/mac/drawingml/2011/main" val="1"/>
             </a:ext>
           </a:extLst>
         </p:spPr>
@@ -2312,7 +2318,7 @@
           <a:lstStyle/>
           <a:p>
             <a:fld id="{86CB4B4D-7CA3-9044-876B-883B54F8677D}" type="slidenum">
-              <a:t>‹Nº›</a:t>
+              <a:t>‹#›</a:t>
             </a:fld>
             <a:endParaRPr/>
           </a:p>
@@ -3333,7 +3339,7 @@
             <a:effectLst/>
             <a:extLst>
               <a:ext uri="{C572A759-6A51-4108-AA02-DFA0A04FC94B}">
-                <ma14:wrappingTextBoxFlag xmlns:ma14="http://schemas.microsoft.com/office/mac/drawingml/2011/main" xmlns:a14="http://schemas.microsoft.com/office/drawing/2010/main" xmlns:m="http://schemas.openxmlformats.org/officeDocument/2006/math" xmlns="" val="1"/>
+                <ma14:wrappingTextBoxFlag xmlns="" xmlns:m="http://schemas.openxmlformats.org/officeDocument/2006/math" xmlns:a14="http://schemas.microsoft.com/office/drawing/2010/main" xmlns:ma14="http://schemas.microsoft.com/office/mac/drawingml/2011/main" val="1"/>
               </a:ext>
             </a:extLst>
           </p:spPr>
@@ -3446,7 +3452,7 @@
             <a:effectLst/>
             <a:extLst>
               <a:ext uri="{C572A759-6A51-4108-AA02-DFA0A04FC94B}">
-                <ma14:wrappingTextBoxFlag xmlns:ma14="http://schemas.microsoft.com/office/mac/drawingml/2011/main" xmlns:a14="http://schemas.microsoft.com/office/drawing/2010/main" xmlns:m="http://schemas.openxmlformats.org/officeDocument/2006/math" xmlns="" val="1"/>
+                <ma14:wrappingTextBoxFlag xmlns="" xmlns:m="http://schemas.openxmlformats.org/officeDocument/2006/math" xmlns:a14="http://schemas.microsoft.com/office/drawing/2010/main" xmlns:ma14="http://schemas.microsoft.com/office/mac/drawingml/2011/main" val="1"/>
               </a:ext>
             </a:extLst>
           </p:spPr>
@@ -3561,7 +3567,7 @@
             <a:effectLst/>
             <a:extLst>
               <a:ext uri="{C572A759-6A51-4108-AA02-DFA0A04FC94B}">
-                <ma14:wrappingTextBoxFlag xmlns:ma14="http://schemas.microsoft.com/office/mac/drawingml/2011/main" xmlns:a14="http://schemas.microsoft.com/office/drawing/2010/main" xmlns:m="http://schemas.openxmlformats.org/officeDocument/2006/math" xmlns="" val="1"/>
+                <ma14:wrappingTextBoxFlag xmlns="" xmlns:m="http://schemas.openxmlformats.org/officeDocument/2006/math" xmlns:a14="http://schemas.microsoft.com/office/drawing/2010/main" xmlns:ma14="http://schemas.microsoft.com/office/mac/drawingml/2011/main" val="1"/>
               </a:ext>
             </a:extLst>
           </p:spPr>
@@ -3672,7 +3678,7 @@
             <a:effectLst/>
             <a:extLst>
               <a:ext uri="{C572A759-6A51-4108-AA02-DFA0A04FC94B}">
-                <ma14:wrappingTextBoxFlag xmlns:ma14="http://schemas.microsoft.com/office/mac/drawingml/2011/main" xmlns:a14="http://schemas.microsoft.com/office/drawing/2010/main" xmlns:m="http://schemas.openxmlformats.org/officeDocument/2006/math" xmlns="" val="1"/>
+                <ma14:wrappingTextBoxFlag xmlns="" xmlns:m="http://schemas.openxmlformats.org/officeDocument/2006/math" xmlns:a14="http://schemas.microsoft.com/office/drawing/2010/main" xmlns:ma14="http://schemas.microsoft.com/office/mac/drawingml/2011/main" val="1"/>
               </a:ext>
             </a:extLst>
           </p:spPr>
@@ -3786,7 +3792,7 @@
             <a:effectLst/>
             <a:extLst>
               <a:ext uri="{C572A759-6A51-4108-AA02-DFA0A04FC94B}">
-                <ma14:wrappingTextBoxFlag xmlns:ma14="http://schemas.microsoft.com/office/mac/drawingml/2011/main" xmlns:a14="http://schemas.microsoft.com/office/drawing/2010/main" xmlns:m="http://schemas.openxmlformats.org/officeDocument/2006/math" xmlns="" val="1"/>
+                <ma14:wrappingTextBoxFlag xmlns="" xmlns:m="http://schemas.openxmlformats.org/officeDocument/2006/math" xmlns:a14="http://schemas.microsoft.com/office/drawing/2010/main" xmlns:ma14="http://schemas.microsoft.com/office/mac/drawingml/2011/main" val="1"/>
               </a:ext>
             </a:extLst>
           </p:spPr>
@@ -3897,7 +3903,7 @@
             <a:effectLst/>
             <a:extLst>
               <a:ext uri="{C572A759-6A51-4108-AA02-DFA0A04FC94B}">
-                <ma14:wrappingTextBoxFlag xmlns:ma14="http://schemas.microsoft.com/office/mac/drawingml/2011/main" xmlns:a14="http://schemas.microsoft.com/office/drawing/2010/main" xmlns:m="http://schemas.openxmlformats.org/officeDocument/2006/math" xmlns="" val="1"/>
+                <ma14:wrappingTextBoxFlag xmlns="" xmlns:m="http://schemas.openxmlformats.org/officeDocument/2006/math" xmlns:a14="http://schemas.microsoft.com/office/drawing/2010/main" xmlns:ma14="http://schemas.microsoft.com/office/mac/drawingml/2011/main" val="1"/>
               </a:ext>
             </a:extLst>
           </p:spPr>
@@ -3984,7 +3990,7 @@
           </a:ln>
           <a:extLst>
             <a:ext uri="{C572A759-6A51-4108-AA02-DFA0A04FC94B}">
-              <ma14:wrappingTextBoxFlag xmlns:ma14="http://schemas.microsoft.com/office/mac/drawingml/2011/main" xmlns:a14="http://schemas.microsoft.com/office/drawing/2010/main" xmlns:m="http://schemas.openxmlformats.org/officeDocument/2006/math" xmlns="" val="1"/>
+              <ma14:wrappingTextBoxFlag xmlns="" xmlns:m="http://schemas.openxmlformats.org/officeDocument/2006/math" xmlns:a14="http://schemas.microsoft.com/office/drawing/2010/main" xmlns:ma14="http://schemas.microsoft.com/office/mac/drawingml/2011/main" val="1"/>
             </a:ext>
           </a:extLst>
         </p:spPr>
@@ -4109,6 +4115,3543 @@
 </p:sld>
 </file>
 
+<file path=ppt/slides/slide10.xml><?xml version="1.0" encoding="utf-8"?>
+<p:sld xmlns:a="http://schemas.openxmlformats.org/drawingml/2006/main" xmlns:r="http://schemas.openxmlformats.org/officeDocument/2006/relationships" xmlns:p="http://schemas.openxmlformats.org/presentationml/2006/main">
+  <p:cSld>
+    <p:spTree>
+      <p:nvGrpSpPr>
+        <p:cNvPr id="1" name=""/>
+        <p:cNvGrpSpPr/>
+        <p:nvPr/>
+      </p:nvGrpSpPr>
+      <p:grpSpPr>
+        <a:xfrm>
+          <a:off x="0" y="0"/>
+          <a:ext cx="0" cy="0"/>
+          <a:chOff x="0" y="0"/>
+          <a:chExt cx="0" cy="0"/>
+        </a:xfrm>
+      </p:grpSpPr>
+      <p:sp>
+        <p:nvSpPr>
+          <p:cNvPr id="112" name="Title 1"/>
+          <p:cNvSpPr txBox="1">
+            <a:spLocks noGrp="1"/>
+          </p:cNvSpPr>
+          <p:nvPr>
+            <p:ph type="title"/>
+          </p:nvPr>
+        </p:nvSpPr>
+        <p:spPr>
+          <a:xfrm>
+            <a:off x="647699" y="-1628"/>
+            <a:ext cx="8245476" cy="810659"/>
+          </a:xfrm>
+          <a:prstGeom prst="rect">
+            <a:avLst/>
+          </a:prstGeom>
+        </p:spPr>
+        <p:txBody>
+          <a:bodyPr lIns="0" tIns="0" rIns="0" bIns="0" anchor="b"/>
+          <a:lstStyle>
+            <a:lvl1pPr>
+              <a:defRPr sz="4000" spc="-300">
+                <a:solidFill>
+                  <a:srgbClr val="242415"/>
+                </a:solidFill>
+                <a:latin typeface="Montserrat SemiBold"/>
+                <a:ea typeface="Montserrat SemiBold"/>
+                <a:cs typeface="Montserrat SemiBold"/>
+                <a:sym typeface="Montserrat SemiBold"/>
+              </a:defRPr>
+            </a:lvl1pPr>
+          </a:lstStyle>
+          <a:p>
+            <a:r>
+              <a:rPr lang="en-GB" dirty="0"/>
+              <a:t>¿</a:t>
+            </a:r>
+            <a:r>
+              <a:rPr lang="en-GB" dirty="0" err="1"/>
+              <a:t>Qué</a:t>
+            </a:r>
+            <a:r>
+              <a:rPr dirty="0"/>
+              <a:t> </a:t>
+            </a:r>
+            <a:r>
+              <a:rPr lang="en-GB" dirty="0"/>
+              <a:t>es la </a:t>
+            </a:r>
+            <a:r>
+              <a:rPr lang="en-GB" dirty="0" err="1"/>
+              <a:t>programación</a:t>
+            </a:r>
+            <a:r>
+              <a:rPr lang="en-GB" dirty="0"/>
+              <a:t> </a:t>
+            </a:r>
+            <a:r>
+              <a:rPr lang="en-GB" dirty="0" err="1"/>
+              <a:t>funcional</a:t>
+            </a:r>
+            <a:r>
+              <a:rPr lang="en-GB" dirty="0"/>
+              <a:t>?</a:t>
+            </a:r>
+            <a:endParaRPr dirty="0"/>
+          </a:p>
+        </p:txBody>
+      </p:sp>
+      <p:sp>
+        <p:nvSpPr>
+          <p:cNvPr id="113" name="Rectángulo 17"/>
+          <p:cNvSpPr/>
+          <p:nvPr/>
+        </p:nvSpPr>
+        <p:spPr>
+          <a:xfrm>
+            <a:off x="0" y="0"/>
+            <a:ext cx="254000" cy="5143500"/>
+          </a:xfrm>
+          <a:prstGeom prst="rect">
+            <a:avLst/>
+          </a:prstGeom>
+          <a:solidFill>
+            <a:srgbClr val="D8D800"/>
+          </a:solidFill>
+          <a:ln w="12700">
+            <a:miter lim="400000"/>
+          </a:ln>
+        </p:spPr>
+        <p:txBody>
+          <a:bodyPr lIns="45719" rIns="45719" anchor="ctr"/>
+          <a:lstStyle/>
+          <a:p>
+            <a:pPr algn="ctr">
+              <a:defRPr>
+                <a:solidFill>
+                  <a:srgbClr val="FFFFFF"/>
+                </a:solidFill>
+              </a:defRPr>
+            </a:pPr>
+            <a:endParaRPr/>
+          </a:p>
+        </p:txBody>
+      </p:sp>
+      <p:sp>
+        <p:nvSpPr>
+          <p:cNvPr id="2" name="TextBox 3">
+            <a:extLst>
+              <a:ext uri="{FF2B5EF4-FFF2-40B4-BE49-F238E27FC236}">
+                <a16:creationId xmlns:a16="http://schemas.microsoft.com/office/drawing/2014/main" id="{F690A08F-CCB4-42CD-B511-499C8E6A85C3}"/>
+              </a:ext>
+            </a:extLst>
+          </p:cNvPr>
+          <p:cNvSpPr txBox="1"/>
+          <p:nvPr/>
+        </p:nvSpPr>
+        <p:spPr>
+          <a:xfrm>
+            <a:off x="900110" y="1722391"/>
+            <a:ext cx="7653195" cy="279401"/>
+          </a:xfrm>
+          <a:prstGeom prst="rect">
+            <a:avLst/>
+          </a:prstGeom>
+          <a:ln w="12700">
+            <a:miter lim="400000"/>
+          </a:ln>
+          <a:extLst>
+            <a:ext uri="{C572A759-6A51-4108-AA02-DFA0A04FC94B}">
+              <ma14:wrappingTextBoxFlag xmlns:ma14="http://schemas.microsoft.com/office/mac/drawingml/2011/main" xmlns:a14="http://schemas.microsoft.com/office/drawing/2010/main" xmlns:m="http://schemas.openxmlformats.org/officeDocument/2006/math" xmlns="" val="1"/>
+            </a:ext>
+          </a:extLst>
+        </p:spPr>
+        <p:txBody>
+          <a:bodyPr lIns="0" tIns="0" rIns="0" bIns="0" anchor="t">
+            <a:spAutoFit/>
+          </a:bodyPr>
+          <a:lstStyle/>
+          <a:p>
+            <a:pPr marL="285750" indent="-285750">
+              <a:buSzPct val="100000"/>
+              <a:buFont typeface="Arial"/>
+              <a:buChar char="•"/>
+              <a:defRPr>
+                <a:solidFill>
+                  <a:srgbClr val="242415"/>
+                </a:solidFill>
+                <a:latin typeface="Open Sans"/>
+                <a:ea typeface="Open Sans"/>
+                <a:cs typeface="Open Sans"/>
+                <a:sym typeface="Open Sans"/>
+              </a:defRPr>
+            </a:pPr>
+            <a:r>
+              <a:rPr lang="en-US" dirty="0"/>
+              <a:t>Propiedades y </a:t>
+            </a:r>
+            <a:r>
+              <a:rPr lang="en-US" dirty="0" err="1"/>
+              <a:t>mentalidad</a:t>
+            </a:r>
+            <a:r>
+              <a:rPr lang="en-US" dirty="0"/>
+              <a:t> </a:t>
+            </a:r>
+            <a:r>
+              <a:rPr lang="en-US" dirty="0" err="1"/>
+              <a:t>matemática</a:t>
+            </a:r>
+          </a:p>
+        </p:txBody>
+      </p:sp>
+      <p:sp>
+        <p:nvSpPr>
+          <p:cNvPr id="3" name="TextBox 3">
+            <a:extLst>
+              <a:ext uri="{FF2B5EF4-FFF2-40B4-BE49-F238E27FC236}">
+                <a16:creationId xmlns:a16="http://schemas.microsoft.com/office/drawing/2014/main" id="{F8297C39-9EDE-4ED0-AA37-0D780A22784F}"/>
+              </a:ext>
+            </a:extLst>
+          </p:cNvPr>
+          <p:cNvSpPr txBox="1"/>
+          <p:nvPr/>
+        </p:nvSpPr>
+        <p:spPr>
+          <a:xfrm>
+            <a:off x="900112" y="2111613"/>
+            <a:ext cx="7653195" cy="279401"/>
+          </a:xfrm>
+          <a:prstGeom prst="rect">
+            <a:avLst/>
+          </a:prstGeom>
+          <a:ln w="12700">
+            <a:miter lim="400000"/>
+          </a:ln>
+          <a:extLst>
+            <a:ext uri="{C572A759-6A51-4108-AA02-DFA0A04FC94B}">
+              <ma14:wrappingTextBoxFlag xmlns:ma14="http://schemas.microsoft.com/office/mac/drawingml/2011/main" xmlns:a14="http://schemas.microsoft.com/office/drawing/2010/main" xmlns:m="http://schemas.openxmlformats.org/officeDocument/2006/math" xmlns="" val="1"/>
+            </a:ext>
+          </a:extLst>
+        </p:spPr>
+        <p:txBody>
+          <a:bodyPr lIns="0" tIns="0" rIns="0" bIns="0" anchor="t">
+            <a:spAutoFit/>
+          </a:bodyPr>
+          <a:lstStyle/>
+          <a:p>
+            <a:pPr marL="285750" indent="-285750">
+              <a:buSzPct val="100000"/>
+              <a:buFont typeface="Arial"/>
+              <a:buChar char="•"/>
+              <a:defRPr>
+                <a:solidFill>
+                  <a:srgbClr val="242415"/>
+                </a:solidFill>
+                <a:latin typeface="Open Sans"/>
+                <a:ea typeface="Open Sans"/>
+                <a:cs typeface="Open Sans"/>
+                <a:sym typeface="Open Sans"/>
+              </a:defRPr>
+            </a:pPr>
+            <a:r>
+              <a:rPr lang="en-US" dirty="0"/>
+              <a:t>Estilo de </a:t>
+            </a:r>
+            <a:r>
+              <a:rPr lang="en-US" dirty="0" err="1"/>
+              <a:t>programación</a:t>
+            </a:r>
+            <a:r>
+              <a:rPr lang="en-US" dirty="0"/>
+              <a:t> </a:t>
+            </a:r>
+            <a:r>
+              <a:rPr lang="en-US" dirty="0" err="1"/>
+              <a:t>basado</a:t>
+            </a:r>
+            <a:r>
+              <a:rPr lang="en-US" dirty="0"/>
+              <a:t> en </a:t>
+            </a:r>
+            <a:r>
+              <a:rPr lang="en-US" dirty="0" err="1"/>
+              <a:t>funciones</a:t>
+            </a:r>
+            <a:r>
+              <a:rPr lang="en-US" dirty="0"/>
+              <a:t> </a:t>
+            </a:r>
+            <a:r>
+              <a:rPr lang="en-US" dirty="0" err="1"/>
+              <a:t>como</a:t>
+            </a:r>
+            <a:r>
+              <a:rPr lang="en-US" dirty="0"/>
+              <a:t> </a:t>
+            </a:r>
+            <a:r>
+              <a:rPr lang="en-US" dirty="0" err="1"/>
+              <a:t>modelo</a:t>
+            </a:r>
+          </a:p>
+        </p:txBody>
+      </p:sp>
+      <p:sp>
+        <p:nvSpPr>
+          <p:cNvPr id="4" name="TextBox 3">
+            <a:extLst>
+              <a:ext uri="{FF2B5EF4-FFF2-40B4-BE49-F238E27FC236}">
+                <a16:creationId xmlns:a16="http://schemas.microsoft.com/office/drawing/2014/main" id="{CDBAADE6-5D1D-4438-A559-8A4576E64C03}"/>
+              </a:ext>
+            </a:extLst>
+          </p:cNvPr>
+          <p:cNvSpPr txBox="1"/>
+          <p:nvPr/>
+        </p:nvSpPr>
+        <p:spPr>
+          <a:xfrm>
+            <a:off x="900112" y="2500835"/>
+            <a:ext cx="7653195" cy="279401"/>
+          </a:xfrm>
+          <a:prstGeom prst="rect">
+            <a:avLst/>
+          </a:prstGeom>
+          <a:ln w="12700">
+            <a:miter lim="400000"/>
+          </a:ln>
+          <a:extLst>
+            <a:ext uri="{C572A759-6A51-4108-AA02-DFA0A04FC94B}">
+              <ma14:wrappingTextBoxFlag xmlns:ma14="http://schemas.microsoft.com/office/mac/drawingml/2011/main" xmlns:a14="http://schemas.microsoft.com/office/drawing/2010/main" xmlns:m="http://schemas.openxmlformats.org/officeDocument/2006/math" xmlns="" val="1"/>
+            </a:ext>
+          </a:extLst>
+        </p:spPr>
+        <p:txBody>
+          <a:bodyPr lIns="0" tIns="0" rIns="0" bIns="0" anchor="t">
+            <a:spAutoFit/>
+          </a:bodyPr>
+          <a:lstStyle>
+            <a:lvl1pPr marL="285750" indent="-285750">
+              <a:buSzPct val="100000"/>
+              <a:buFont typeface="Arial"/>
+              <a:buChar char="•"/>
+              <a:defRPr>
+                <a:solidFill>
+                  <a:srgbClr val="242415"/>
+                </a:solidFill>
+                <a:latin typeface="Open Sans"/>
+                <a:ea typeface="Open Sans"/>
+                <a:cs typeface="Open Sans"/>
+                <a:sym typeface="Open Sans"/>
+              </a:defRPr>
+            </a:lvl1pPr>
+          </a:lstStyle>
+          <a:p>
+            <a:r>
+              <a:rPr lang="en-US" dirty="0" err="1"/>
+              <a:t>Paradigma</a:t>
+            </a:r>
+            <a:r>
+              <a:rPr lang="en-US" dirty="0"/>
+              <a:t> </a:t>
+            </a:r>
+            <a:r>
+              <a:rPr lang="en-US" dirty="0" err="1"/>
+              <a:t>bastante</a:t>
+            </a:r>
+            <a:r>
+              <a:rPr lang="en-US" dirty="0"/>
+              <a:t> </a:t>
+            </a:r>
+            <a:r>
+              <a:rPr lang="en-US" dirty="0" err="1"/>
+              <a:t>antiguo</a:t>
+            </a:r>
+            <a:r>
+              <a:rPr lang="en-US" dirty="0"/>
+              <a:t> (</a:t>
+            </a:r>
+            <a:r>
+              <a:rPr lang="en-US" dirty="0" err="1"/>
+              <a:t>más</a:t>
+            </a:r>
+            <a:r>
+              <a:rPr lang="en-US" dirty="0"/>
+              <a:t> de 50 </a:t>
+            </a:r>
+            <a:r>
+              <a:rPr lang="en-US" dirty="0" err="1"/>
+              <a:t>años</a:t>
+            </a:r>
+            <a:r>
+              <a:rPr lang="en-US" dirty="0"/>
+              <a:t>)</a:t>
+            </a:r>
+          </a:p>
+        </p:txBody>
+      </p:sp>
+      <p:sp>
+        <p:nvSpPr>
+          <p:cNvPr id="5" name="TextBox 3">
+            <a:extLst>
+              <a:ext uri="{FF2B5EF4-FFF2-40B4-BE49-F238E27FC236}">
+                <a16:creationId xmlns:a16="http://schemas.microsoft.com/office/drawing/2014/main" id="{E73360E9-93BB-47C9-BD8B-787F0215F172}"/>
+              </a:ext>
+            </a:extLst>
+          </p:cNvPr>
+          <p:cNvSpPr txBox="1"/>
+          <p:nvPr/>
+        </p:nvSpPr>
+        <p:spPr>
+          <a:xfrm>
+            <a:off x="900110" y="943947"/>
+            <a:ext cx="7653195" cy="279401"/>
+          </a:xfrm>
+          <a:prstGeom prst="rect">
+            <a:avLst/>
+          </a:prstGeom>
+          <a:ln w="12700">
+            <a:miter lim="400000"/>
+          </a:ln>
+          <a:extLst>
+            <a:ext uri="{C572A759-6A51-4108-AA02-DFA0A04FC94B}">
+              <ma14:wrappingTextBoxFlag xmlns:ma14="http://schemas.microsoft.com/office/mac/drawingml/2011/main" xmlns:a14="http://schemas.microsoft.com/office/drawing/2010/main" xmlns:m="http://schemas.openxmlformats.org/officeDocument/2006/math" xmlns="" val="1"/>
+            </a:ext>
+          </a:extLst>
+        </p:spPr>
+        <p:txBody>
+          <a:bodyPr lIns="0" tIns="0" rIns="0" bIns="0" anchor="t">
+            <a:spAutoFit/>
+          </a:bodyPr>
+          <a:lstStyle>
+            <a:lvl1pPr marL="285750" indent="-285750">
+              <a:buSzPct val="100000"/>
+              <a:buFont typeface="Arial"/>
+              <a:buChar char="•"/>
+              <a:defRPr>
+                <a:solidFill>
+                  <a:srgbClr val="242415"/>
+                </a:solidFill>
+                <a:latin typeface="Open Sans"/>
+                <a:ea typeface="Open Sans"/>
+                <a:cs typeface="Open Sans"/>
+                <a:sym typeface="Open Sans"/>
+              </a:defRPr>
+            </a:lvl1pPr>
+          </a:lstStyle>
+          <a:p>
+            <a:r>
+              <a:rPr lang="en-GB" dirty="0" err="1"/>
+              <a:t>Paradigma</a:t>
+            </a:r>
+            <a:r>
+              <a:rPr lang="en-GB" dirty="0"/>
+              <a:t> de </a:t>
+            </a:r>
+            <a:r>
+              <a:rPr lang="en-GB" dirty="0" err="1"/>
+              <a:t>programación</a:t>
+            </a:r>
+            <a:endParaRPr dirty="0" err="1"/>
+          </a:p>
+        </p:txBody>
+      </p:sp>
+      <p:sp>
+        <p:nvSpPr>
+          <p:cNvPr id="6" name="TextBox 3">
+            <a:extLst>
+              <a:ext uri="{FF2B5EF4-FFF2-40B4-BE49-F238E27FC236}">
+                <a16:creationId xmlns:a16="http://schemas.microsoft.com/office/drawing/2014/main" id="{1251CE56-D5F5-4261-A35B-3D6CA8D9363D}"/>
+              </a:ext>
+            </a:extLst>
+          </p:cNvPr>
+          <p:cNvSpPr txBox="1"/>
+          <p:nvPr/>
+        </p:nvSpPr>
+        <p:spPr>
+          <a:xfrm>
+            <a:off x="900110" y="1333169"/>
+            <a:ext cx="7653195" cy="279401"/>
+          </a:xfrm>
+          <a:prstGeom prst="rect">
+            <a:avLst/>
+          </a:prstGeom>
+          <a:ln w="12700">
+            <a:miter lim="400000"/>
+          </a:ln>
+          <a:extLst>
+            <a:ext uri="{C572A759-6A51-4108-AA02-DFA0A04FC94B}">
+              <ma14:wrappingTextBoxFlag xmlns:ma14="http://schemas.microsoft.com/office/mac/drawingml/2011/main" xmlns:a14="http://schemas.microsoft.com/office/drawing/2010/main" xmlns:m="http://schemas.openxmlformats.org/officeDocument/2006/math" xmlns="" val="1"/>
+            </a:ext>
+          </a:extLst>
+        </p:spPr>
+        <p:txBody>
+          <a:bodyPr lIns="0" tIns="0" rIns="0" bIns="0" anchor="t">
+            <a:spAutoFit/>
+          </a:bodyPr>
+          <a:lstStyle>
+            <a:lvl1pPr marL="285750" indent="-285750">
+              <a:buSzPct val="100000"/>
+              <a:buFont typeface="Arial"/>
+              <a:buChar char="•"/>
+              <a:defRPr>
+                <a:solidFill>
+                  <a:srgbClr val="242415"/>
+                </a:solidFill>
+                <a:latin typeface="Open Sans"/>
+                <a:ea typeface="Open Sans"/>
+                <a:cs typeface="Open Sans"/>
+                <a:sym typeface="Open Sans"/>
+              </a:defRPr>
+            </a:lvl1pPr>
+          </a:lstStyle>
+          <a:p>
+            <a:r>
+              <a:rPr lang="en-GB" dirty="0" err="1"/>
+              <a:t>Modela</a:t>
+            </a:r>
+            <a:r>
+              <a:rPr lang="en-GB" dirty="0"/>
+              <a:t> </a:t>
+            </a:r>
+            <a:r>
+              <a:rPr lang="en-GB" dirty="0" err="1"/>
+              <a:t>soluciones</a:t>
+            </a:r>
+            <a:r>
+              <a:rPr lang="en-GB" dirty="0"/>
+              <a:t> en </a:t>
+            </a:r>
+            <a:r>
+              <a:rPr lang="en-GB" dirty="0" err="1"/>
+              <a:t>torno</a:t>
+            </a:r>
+            <a:r>
+              <a:rPr lang="en-GB" dirty="0"/>
+              <a:t> a </a:t>
+            </a:r>
+            <a:r>
+              <a:rPr lang="en-GB" dirty="0" err="1"/>
+              <a:t>funciones</a:t>
+            </a:r>
+          </a:p>
+        </p:txBody>
+      </p:sp>
+      <p:sp>
+        <p:nvSpPr>
+          <p:cNvPr id="7" name="TextBox 3">
+            <a:extLst>
+              <a:ext uri="{FF2B5EF4-FFF2-40B4-BE49-F238E27FC236}">
+                <a16:creationId xmlns:a16="http://schemas.microsoft.com/office/drawing/2014/main" id="{B8304F32-D02C-44C9-9E2C-F7EE3374CB62}"/>
+              </a:ext>
+            </a:extLst>
+          </p:cNvPr>
+          <p:cNvSpPr txBox="1"/>
+          <p:nvPr/>
+        </p:nvSpPr>
+        <p:spPr>
+          <a:xfrm>
+            <a:off x="900112" y="2890058"/>
+            <a:ext cx="7653195" cy="279401"/>
+          </a:xfrm>
+          <a:prstGeom prst="rect">
+            <a:avLst/>
+          </a:prstGeom>
+          <a:ln w="12700">
+            <a:miter lim="400000"/>
+          </a:ln>
+          <a:extLst>
+            <a:ext uri="{C572A759-6A51-4108-AA02-DFA0A04FC94B}">
+              <ma14:wrappingTextBoxFlag xmlns:ma14="http://schemas.microsoft.com/office/mac/drawingml/2011/main" xmlns:a14="http://schemas.microsoft.com/office/drawing/2010/main" xmlns:m="http://schemas.openxmlformats.org/officeDocument/2006/math" xmlns="" val="1"/>
+            </a:ext>
+          </a:extLst>
+        </p:spPr>
+        <p:txBody>
+          <a:bodyPr lIns="0" tIns="0" rIns="0" bIns="0" anchor="t">
+            <a:spAutoFit/>
+          </a:bodyPr>
+          <a:lstStyle/>
+          <a:p>
+            <a:pPr marL="285750" indent="-285750">
+              <a:buSzPct val="100000"/>
+              <a:buFont typeface="Arial"/>
+              <a:buChar char="•"/>
+              <a:defRPr>
+                <a:solidFill>
+                  <a:srgbClr val="242415"/>
+                </a:solidFill>
+                <a:latin typeface="Open Sans"/>
+                <a:ea typeface="Open Sans"/>
+                <a:cs typeface="Open Sans"/>
+                <a:sym typeface="Open Sans"/>
+              </a:defRPr>
+            </a:pPr>
+            <a:r>
+              <a:rPr lang="en-US" dirty="0" err="1"/>
+              <a:t>Fácil</a:t>
+            </a:r>
+            <a:r>
+              <a:rPr lang="en-US" dirty="0"/>
+              <a:t> de </a:t>
+            </a:r>
+            <a:r>
+              <a:rPr lang="en-US" dirty="0" err="1"/>
+              <a:t>integrar</a:t>
+            </a:r>
+            <a:r>
+              <a:rPr lang="en-US" dirty="0"/>
+              <a:t> en JavaScript </a:t>
+            </a:r>
+            <a:r>
+              <a:rPr lang="en-US" dirty="0" err="1"/>
+              <a:t>ya</a:t>
+            </a:r>
+            <a:r>
+              <a:rPr lang="en-US" dirty="0"/>
+              <a:t> que es un </a:t>
+            </a:r>
+            <a:r>
+              <a:rPr lang="en-US" dirty="0" err="1"/>
+              <a:t>lenguage</a:t>
+            </a:r>
+            <a:r>
+              <a:rPr lang="en-US" dirty="0"/>
+              <a:t> </a:t>
+            </a:r>
+            <a:r>
+              <a:rPr lang="en-US" dirty="0" err="1"/>
+              <a:t>multiparadigma</a:t>
+            </a:r>
+          </a:p>
+        </p:txBody>
+      </p:sp>
+      <p:sp>
+        <p:nvSpPr>
+          <p:cNvPr id="8" name="TextBox 3">
+            <a:extLst>
+              <a:ext uri="{FF2B5EF4-FFF2-40B4-BE49-F238E27FC236}">
+                <a16:creationId xmlns:a16="http://schemas.microsoft.com/office/drawing/2014/main" id="{F46CD173-39DD-4D21-8347-51D6DEB34691}"/>
+              </a:ext>
+            </a:extLst>
+          </p:cNvPr>
+          <p:cNvSpPr txBox="1"/>
+          <p:nvPr/>
+        </p:nvSpPr>
+        <p:spPr>
+          <a:xfrm>
+            <a:off x="900112" y="3279280"/>
+            <a:ext cx="7653195" cy="553998"/>
+          </a:xfrm>
+          <a:prstGeom prst="rect">
+            <a:avLst/>
+          </a:prstGeom>
+          <a:ln w="12700">
+            <a:miter lim="400000"/>
+          </a:ln>
+          <a:extLst>
+            <a:ext uri="{C572A759-6A51-4108-AA02-DFA0A04FC94B}">
+              <ma14:wrappingTextBoxFlag xmlns:ma14="http://schemas.microsoft.com/office/mac/drawingml/2011/main" xmlns:a14="http://schemas.microsoft.com/office/drawing/2010/main" xmlns:m="http://schemas.openxmlformats.org/officeDocument/2006/math" xmlns="" val="1"/>
+            </a:ext>
+          </a:extLst>
+        </p:spPr>
+        <p:txBody>
+          <a:bodyPr lIns="0" tIns="0" rIns="0" bIns="0" anchor="t">
+            <a:spAutoFit/>
+          </a:bodyPr>
+          <a:lstStyle/>
+          <a:p>
+            <a:pPr marL="285750" indent="-285750">
+              <a:buSzPct val="100000"/>
+              <a:buFont typeface="Arial"/>
+              <a:buChar char="•"/>
+              <a:defRPr>
+                <a:solidFill>
+                  <a:srgbClr val="242415"/>
+                </a:solidFill>
+                <a:latin typeface="Open Sans"/>
+                <a:ea typeface="Open Sans"/>
+                <a:cs typeface="Open Sans"/>
+                <a:sym typeface="Open Sans"/>
+              </a:defRPr>
+            </a:pPr>
+            <a:r>
+              <a:rPr lang="en-US" dirty="0"/>
+              <a:t>Se ha </a:t>
+            </a:r>
+            <a:r>
+              <a:rPr lang="en-US" dirty="0" err="1"/>
+              <a:t>puesto</a:t>
+            </a:r>
+            <a:r>
+              <a:rPr lang="en-US" dirty="0"/>
+              <a:t> de </a:t>
+            </a:r>
+            <a:r>
+              <a:rPr lang="en-US" dirty="0" err="1"/>
+              <a:t>moda</a:t>
+            </a:r>
+            <a:r>
+              <a:rPr lang="en-US" dirty="0"/>
+              <a:t>. </a:t>
+            </a:r>
+            <a:r>
+              <a:rPr lang="en-US" dirty="0" err="1"/>
+              <a:t>Cada</a:t>
+            </a:r>
+            <a:r>
+              <a:rPr lang="en-US" dirty="0"/>
+              <a:t> </a:t>
+            </a:r>
+            <a:r>
+              <a:rPr lang="en-US" dirty="0" err="1"/>
+              <a:t>vez</a:t>
+            </a:r>
+            <a:r>
+              <a:rPr lang="en-US" dirty="0"/>
+              <a:t> </a:t>
+            </a:r>
+            <a:r>
+              <a:rPr lang="en-US" dirty="0" err="1"/>
+              <a:t>más</a:t>
+            </a:r>
+            <a:r>
+              <a:rPr lang="en-US" dirty="0"/>
+              <a:t> </a:t>
+            </a:r>
+            <a:r>
+              <a:rPr lang="en-US" dirty="0" err="1"/>
+              <a:t>lenguajes</a:t>
+            </a:r>
+            <a:r>
+              <a:rPr lang="en-US" dirty="0"/>
+              <a:t> se </a:t>
+            </a:r>
+            <a:r>
+              <a:rPr lang="en-US" dirty="0" err="1"/>
+              <a:t>acercan</a:t>
+            </a:r>
+            <a:r>
+              <a:rPr lang="en-US" dirty="0"/>
+              <a:t> a </a:t>
+            </a:r>
+            <a:r>
+              <a:rPr lang="en-US" dirty="0" err="1"/>
+              <a:t>este</a:t>
+            </a:r>
+            <a:r>
+              <a:rPr lang="en-US" dirty="0"/>
+              <a:t> </a:t>
+            </a:r>
+            <a:r>
+              <a:rPr lang="en-US" dirty="0" err="1"/>
+              <a:t>paradigma</a:t>
+            </a:r>
+          </a:p>
+        </p:txBody>
+      </p:sp>
+      <p:sp>
+        <p:nvSpPr>
+          <p:cNvPr id="9" name="TextBox 3">
+            <a:extLst>
+              <a:ext uri="{FF2B5EF4-FFF2-40B4-BE49-F238E27FC236}">
+                <a16:creationId xmlns:a16="http://schemas.microsoft.com/office/drawing/2014/main" id="{F322B547-8EBF-4910-B2C5-45844AF78EE5}"/>
+              </a:ext>
+            </a:extLst>
+          </p:cNvPr>
+          <p:cNvSpPr txBox="1"/>
+          <p:nvPr/>
+        </p:nvSpPr>
+        <p:spPr>
+          <a:xfrm>
+            <a:off x="900112" y="3927294"/>
+            <a:ext cx="7653195" cy="279401"/>
+          </a:xfrm>
+          <a:prstGeom prst="rect">
+            <a:avLst/>
+          </a:prstGeom>
+          <a:ln w="12700">
+            <a:miter lim="400000"/>
+          </a:ln>
+          <a:extLst>
+            <a:ext uri="{C572A759-6A51-4108-AA02-DFA0A04FC94B}">
+              <ma14:wrappingTextBoxFlag xmlns:ma14="http://schemas.microsoft.com/office/mac/drawingml/2011/main" xmlns:a14="http://schemas.microsoft.com/office/drawing/2010/main" xmlns:m="http://schemas.openxmlformats.org/officeDocument/2006/math" xmlns="" val="1"/>
+            </a:ext>
+          </a:extLst>
+        </p:spPr>
+        <p:txBody>
+          <a:bodyPr lIns="0" tIns="0" rIns="0" bIns="0" anchor="t">
+            <a:spAutoFit/>
+          </a:bodyPr>
+          <a:lstStyle>
+            <a:lvl1pPr marL="285750" indent="-285750">
+              <a:buSzPct val="100000"/>
+              <a:buFont typeface="Arial"/>
+              <a:buChar char="•"/>
+              <a:defRPr>
+                <a:solidFill>
+                  <a:srgbClr val="242415"/>
+                </a:solidFill>
+                <a:latin typeface="Open Sans"/>
+                <a:ea typeface="Open Sans"/>
+                <a:cs typeface="Open Sans"/>
+                <a:sym typeface="Open Sans"/>
+              </a:defRPr>
+            </a:lvl1pPr>
+          </a:lstStyle>
+          <a:p>
+            <a:r>
+              <a:rPr lang="en-US" dirty="0"/>
+              <a:t>Tiene puntos </a:t>
+            </a:r>
+            <a:r>
+              <a:rPr lang="en-US" dirty="0" err="1"/>
+              <a:t>fuertes</a:t>
+            </a:r>
+            <a:r>
+              <a:rPr lang="en-US" dirty="0"/>
+              <a:t> y puntos </a:t>
+            </a:r>
+            <a:r>
+              <a:rPr lang="en-US" dirty="0" err="1"/>
+              <a:t>débiles</a:t>
+            </a:r>
+          </a:p>
+        </p:txBody>
+      </p:sp>
+    </p:spTree>
+    <p:extLst>
+      <p:ext uri="{BB962C8B-B14F-4D97-AF65-F5344CB8AC3E}">
+        <p14:creationId xmlns:p14="http://schemas.microsoft.com/office/powerpoint/2010/main" val="722088944"/>
+      </p:ext>
+    </p:extLst>
+  </p:cSld>
+  <p:clrMapOvr>
+    <a:masterClrMapping/>
+  </p:clrMapOvr>
+  <p:transition spd="med"/>
+</p:sld>
+</file>
+
+<file path=ppt/slides/slide11.xml><?xml version="1.0" encoding="utf-8"?>
+<p:sld xmlns:a="http://schemas.openxmlformats.org/drawingml/2006/main" xmlns:r="http://schemas.openxmlformats.org/officeDocument/2006/relationships" xmlns:p="http://schemas.openxmlformats.org/presentationml/2006/main">
+  <p:cSld>
+    <p:spTree>
+      <p:nvGrpSpPr>
+        <p:cNvPr id="1" name=""/>
+        <p:cNvGrpSpPr/>
+        <p:nvPr/>
+      </p:nvGrpSpPr>
+      <p:grpSpPr>
+        <a:xfrm>
+          <a:off x="0" y="0"/>
+          <a:ext cx="0" cy="0"/>
+          <a:chOff x="0" y="0"/>
+          <a:chExt cx="0" cy="0"/>
+        </a:xfrm>
+      </p:grpSpPr>
+      <p:sp>
+        <p:nvSpPr>
+          <p:cNvPr id="112" name="Title 1"/>
+          <p:cNvSpPr txBox="1">
+            <a:spLocks noGrp="1"/>
+          </p:cNvSpPr>
+          <p:nvPr>
+            <p:ph type="title"/>
+          </p:nvPr>
+        </p:nvSpPr>
+        <p:spPr>
+          <a:xfrm>
+            <a:off x="647699" y="-1628"/>
+            <a:ext cx="8245476" cy="810659"/>
+          </a:xfrm>
+          <a:prstGeom prst="rect">
+            <a:avLst/>
+          </a:prstGeom>
+        </p:spPr>
+        <p:txBody>
+          <a:bodyPr lIns="0" tIns="0" rIns="0" bIns="0" anchor="b"/>
+          <a:lstStyle>
+            <a:lvl1pPr>
+              <a:defRPr sz="4000" spc="-300">
+                <a:solidFill>
+                  <a:srgbClr val="242415"/>
+                </a:solidFill>
+                <a:latin typeface="Montserrat SemiBold"/>
+                <a:ea typeface="Montserrat SemiBold"/>
+                <a:cs typeface="Montserrat SemiBold"/>
+                <a:sym typeface="Montserrat SemiBold"/>
+              </a:defRPr>
+            </a:lvl1pPr>
+          </a:lstStyle>
+          <a:p>
+            <a:r>
+              <a:rPr lang="en-GB" dirty="0"/>
+              <a:t>Agenda</a:t>
+            </a:r>
+          </a:p>
+        </p:txBody>
+      </p:sp>
+      <p:sp>
+        <p:nvSpPr>
+          <p:cNvPr id="113" name="Rectángulo 17"/>
+          <p:cNvSpPr/>
+          <p:nvPr/>
+        </p:nvSpPr>
+        <p:spPr>
+          <a:xfrm>
+            <a:off x="0" y="0"/>
+            <a:ext cx="254000" cy="5143500"/>
+          </a:xfrm>
+          <a:prstGeom prst="rect">
+            <a:avLst/>
+          </a:prstGeom>
+          <a:solidFill>
+            <a:srgbClr val="D8D800"/>
+          </a:solidFill>
+          <a:ln w="12700">
+            <a:miter lim="400000"/>
+          </a:ln>
+        </p:spPr>
+        <p:txBody>
+          <a:bodyPr lIns="45719" rIns="45719" anchor="ctr"/>
+          <a:lstStyle/>
+          <a:p>
+            <a:pPr algn="ctr">
+              <a:defRPr>
+                <a:solidFill>
+                  <a:srgbClr val="FFFFFF"/>
+                </a:solidFill>
+              </a:defRPr>
+            </a:pPr>
+            <a:endParaRPr/>
+          </a:p>
+        </p:txBody>
+      </p:sp>
+      <p:sp>
+        <p:nvSpPr>
+          <p:cNvPr id="2" name="TextBox 3">
+            <a:extLst>
+              <a:ext uri="{FF2B5EF4-FFF2-40B4-BE49-F238E27FC236}">
+                <a16:creationId xmlns:a16="http://schemas.microsoft.com/office/drawing/2014/main" id="{F690A08F-CCB4-42CD-B511-499C8E6A85C3}"/>
+              </a:ext>
+            </a:extLst>
+          </p:cNvPr>
+          <p:cNvSpPr txBox="1"/>
+          <p:nvPr/>
+        </p:nvSpPr>
+        <p:spPr>
+          <a:xfrm>
+            <a:off x="900110" y="1722391"/>
+            <a:ext cx="7653195" cy="279401"/>
+          </a:xfrm>
+          <a:prstGeom prst="rect">
+            <a:avLst/>
+          </a:prstGeom>
+          <a:ln w="12700">
+            <a:miter lim="400000"/>
+          </a:ln>
+          <a:extLst>
+            <a:ext uri="{C572A759-6A51-4108-AA02-DFA0A04FC94B}">
+              <ma14:wrappingTextBoxFlag xmlns="" xmlns:m="http://schemas.openxmlformats.org/officeDocument/2006/math" xmlns:a14="http://schemas.microsoft.com/office/drawing/2010/main" xmlns:ma14="http://schemas.microsoft.com/office/mac/drawingml/2011/main" val="1"/>
+            </a:ext>
+          </a:extLst>
+        </p:spPr>
+        <p:txBody>
+          <a:bodyPr lIns="0" tIns="0" rIns="0" bIns="0" anchor="t">
+            <a:spAutoFit/>
+          </a:bodyPr>
+          <a:lstStyle/>
+          <a:p>
+            <a:pPr marL="285750" indent="-285750">
+              <a:buSzPct val="100000"/>
+              <a:buFont typeface="Arial"/>
+              <a:buChar char="•"/>
+              <a:defRPr>
+                <a:solidFill>
+                  <a:srgbClr val="242415"/>
+                </a:solidFill>
+                <a:latin typeface="Open Sans"/>
+                <a:ea typeface="Open Sans"/>
+                <a:cs typeface="Open Sans"/>
+                <a:sym typeface="Open Sans"/>
+              </a:defRPr>
+            </a:pPr>
+            <a:r>
+              <a:rPr lang="en-US" dirty="0"/>
+              <a:t>FP vs OOP</a:t>
+            </a:r>
+          </a:p>
+        </p:txBody>
+      </p:sp>
+      <p:sp>
+        <p:nvSpPr>
+          <p:cNvPr id="3" name="TextBox 3">
+            <a:extLst>
+              <a:ext uri="{FF2B5EF4-FFF2-40B4-BE49-F238E27FC236}">
+                <a16:creationId xmlns:a16="http://schemas.microsoft.com/office/drawing/2014/main" id="{F8297C39-9EDE-4ED0-AA37-0D780A22784F}"/>
+              </a:ext>
+            </a:extLst>
+          </p:cNvPr>
+          <p:cNvSpPr txBox="1"/>
+          <p:nvPr/>
+        </p:nvSpPr>
+        <p:spPr>
+          <a:xfrm>
+            <a:off x="900112" y="2111613"/>
+            <a:ext cx="7653195" cy="279401"/>
+          </a:xfrm>
+          <a:prstGeom prst="rect">
+            <a:avLst/>
+          </a:prstGeom>
+          <a:ln w="12700">
+            <a:miter lim="400000"/>
+          </a:ln>
+          <a:extLst>
+            <a:ext uri="{C572A759-6A51-4108-AA02-DFA0A04FC94B}">
+              <ma14:wrappingTextBoxFlag xmlns="" xmlns:m="http://schemas.openxmlformats.org/officeDocument/2006/math" xmlns:a14="http://schemas.microsoft.com/office/drawing/2010/main" xmlns:ma14="http://schemas.microsoft.com/office/mac/drawingml/2011/main" val="1"/>
+            </a:ext>
+          </a:extLst>
+        </p:spPr>
+        <p:txBody>
+          <a:bodyPr lIns="0" tIns="0" rIns="0" bIns="0" anchor="t">
+            <a:spAutoFit/>
+          </a:bodyPr>
+          <a:lstStyle/>
+          <a:p>
+            <a:pPr marL="285750" indent="-285750">
+              <a:buSzPct val="100000"/>
+              <a:buFont typeface="Arial"/>
+              <a:buChar char="•"/>
+              <a:defRPr>
+                <a:solidFill>
+                  <a:srgbClr val="242415"/>
+                </a:solidFill>
+                <a:latin typeface="Open Sans"/>
+                <a:ea typeface="Open Sans"/>
+                <a:cs typeface="Open Sans"/>
+                <a:sym typeface="Open Sans"/>
+              </a:defRPr>
+            </a:pPr>
+            <a:r>
+              <a:rPr lang="en-US" dirty="0"/>
+              <a:t>Demo </a:t>
+            </a:r>
+            <a:r>
+              <a:rPr lang="en-US" dirty="0" err="1"/>
+              <a:t>métodos</a:t>
+            </a:r>
+            <a:r>
+              <a:rPr lang="en-US" dirty="0"/>
+              <a:t> de arrays</a:t>
+            </a:r>
+          </a:p>
+        </p:txBody>
+      </p:sp>
+      <p:sp>
+        <p:nvSpPr>
+          <p:cNvPr id="4" name="TextBox 3">
+            <a:extLst>
+              <a:ext uri="{FF2B5EF4-FFF2-40B4-BE49-F238E27FC236}">
+                <a16:creationId xmlns:a16="http://schemas.microsoft.com/office/drawing/2014/main" id="{CDBAADE6-5D1D-4438-A559-8A4576E64C03}"/>
+              </a:ext>
+            </a:extLst>
+          </p:cNvPr>
+          <p:cNvSpPr txBox="1"/>
+          <p:nvPr/>
+        </p:nvSpPr>
+        <p:spPr>
+          <a:xfrm>
+            <a:off x="900112" y="2500835"/>
+            <a:ext cx="7653195" cy="279401"/>
+          </a:xfrm>
+          <a:prstGeom prst="rect">
+            <a:avLst/>
+          </a:prstGeom>
+          <a:ln w="12700">
+            <a:miter lim="400000"/>
+          </a:ln>
+          <a:extLst>
+            <a:ext uri="{C572A759-6A51-4108-AA02-DFA0A04FC94B}">
+              <ma14:wrappingTextBoxFlag xmlns="" xmlns:m="http://schemas.openxmlformats.org/officeDocument/2006/math" xmlns:a14="http://schemas.microsoft.com/office/drawing/2010/main" xmlns:ma14="http://schemas.microsoft.com/office/mac/drawingml/2011/main" val="1"/>
+            </a:ext>
+          </a:extLst>
+        </p:spPr>
+        <p:txBody>
+          <a:bodyPr lIns="0" tIns="0" rIns="0" bIns="0" anchor="t">
+            <a:spAutoFit/>
+          </a:bodyPr>
+          <a:lstStyle>
+            <a:lvl1pPr marL="285750" indent="-285750">
+              <a:buSzPct val="100000"/>
+              <a:buFont typeface="Arial"/>
+              <a:buChar char="•"/>
+              <a:defRPr>
+                <a:solidFill>
+                  <a:srgbClr val="242415"/>
+                </a:solidFill>
+                <a:latin typeface="Open Sans"/>
+                <a:ea typeface="Open Sans"/>
+                <a:cs typeface="Open Sans"/>
+                <a:sym typeface="Open Sans"/>
+              </a:defRPr>
+            </a:lvl1pPr>
+          </a:lstStyle>
+          <a:p>
+            <a:r>
+              <a:rPr lang="en-US" dirty="0"/>
+              <a:t>Demo </a:t>
+            </a:r>
+            <a:r>
+              <a:rPr lang="en-US" dirty="0" err="1"/>
+              <a:t>recursividad</a:t>
+            </a:r>
+          </a:p>
+        </p:txBody>
+      </p:sp>
+      <p:sp>
+        <p:nvSpPr>
+          <p:cNvPr id="5" name="TextBox 3">
+            <a:extLst>
+              <a:ext uri="{FF2B5EF4-FFF2-40B4-BE49-F238E27FC236}">
+                <a16:creationId xmlns:a16="http://schemas.microsoft.com/office/drawing/2014/main" id="{E73360E9-93BB-47C9-BD8B-787F0215F172}"/>
+              </a:ext>
+            </a:extLst>
+          </p:cNvPr>
+          <p:cNvSpPr txBox="1"/>
+          <p:nvPr/>
+        </p:nvSpPr>
+        <p:spPr>
+          <a:xfrm>
+            <a:off x="900110" y="943947"/>
+            <a:ext cx="7653195" cy="279401"/>
+          </a:xfrm>
+          <a:prstGeom prst="rect">
+            <a:avLst/>
+          </a:prstGeom>
+          <a:ln w="12700">
+            <a:miter lim="400000"/>
+          </a:ln>
+          <a:extLst>
+            <a:ext uri="{C572A759-6A51-4108-AA02-DFA0A04FC94B}">
+              <ma14:wrappingTextBoxFlag xmlns="" xmlns:m="http://schemas.openxmlformats.org/officeDocument/2006/math" xmlns:a14="http://schemas.microsoft.com/office/drawing/2010/main" xmlns:ma14="http://schemas.microsoft.com/office/mac/drawingml/2011/main" val="1"/>
+            </a:ext>
+          </a:extLst>
+        </p:spPr>
+        <p:txBody>
+          <a:bodyPr lIns="0" tIns="0" rIns="0" bIns="0" anchor="t">
+            <a:spAutoFit/>
+          </a:bodyPr>
+          <a:lstStyle>
+            <a:lvl1pPr marL="285750" indent="-285750">
+              <a:buSzPct val="100000"/>
+              <a:buFont typeface="Arial"/>
+              <a:buChar char="•"/>
+              <a:defRPr>
+                <a:solidFill>
+                  <a:srgbClr val="242415"/>
+                </a:solidFill>
+                <a:latin typeface="Open Sans"/>
+                <a:ea typeface="Open Sans"/>
+                <a:cs typeface="Open Sans"/>
+                <a:sym typeface="Open Sans"/>
+              </a:defRPr>
+            </a:lvl1pPr>
+          </a:lstStyle>
+          <a:p>
+            <a:r>
+              <a:rPr lang="en-GB" dirty="0"/>
+              <a:t>¿</a:t>
+            </a:r>
+            <a:r>
+              <a:rPr lang="en-GB" dirty="0" err="1"/>
+              <a:t>Qué</a:t>
+            </a:r>
+            <a:r>
+              <a:rPr lang="en-GB" dirty="0"/>
+              <a:t> es la </a:t>
+            </a:r>
+            <a:r>
+              <a:rPr lang="en-GB" dirty="0" err="1"/>
+              <a:t>programación</a:t>
+            </a:r>
+            <a:r>
+              <a:rPr lang="en-GB" dirty="0"/>
+              <a:t> </a:t>
+            </a:r>
+            <a:r>
+              <a:rPr lang="en-GB" dirty="0" err="1"/>
+              <a:t>funcional</a:t>
+            </a:r>
+          </a:p>
+        </p:txBody>
+      </p:sp>
+      <p:sp>
+        <p:nvSpPr>
+          <p:cNvPr id="6" name="TextBox 3">
+            <a:extLst>
+              <a:ext uri="{FF2B5EF4-FFF2-40B4-BE49-F238E27FC236}">
+                <a16:creationId xmlns:a16="http://schemas.microsoft.com/office/drawing/2014/main" id="{1251CE56-D5F5-4261-A35B-3D6CA8D9363D}"/>
+              </a:ext>
+            </a:extLst>
+          </p:cNvPr>
+          <p:cNvSpPr txBox="1"/>
+          <p:nvPr/>
+        </p:nvSpPr>
+        <p:spPr>
+          <a:xfrm>
+            <a:off x="900110" y="1333169"/>
+            <a:ext cx="7653195" cy="279401"/>
+          </a:xfrm>
+          <a:prstGeom prst="rect">
+            <a:avLst/>
+          </a:prstGeom>
+          <a:ln w="12700">
+            <a:miter lim="400000"/>
+          </a:ln>
+          <a:extLst>
+            <a:ext uri="{C572A759-6A51-4108-AA02-DFA0A04FC94B}">
+              <ma14:wrappingTextBoxFlag xmlns="" xmlns:m="http://schemas.openxmlformats.org/officeDocument/2006/math" xmlns:a14="http://schemas.microsoft.com/office/drawing/2010/main" xmlns:ma14="http://schemas.microsoft.com/office/mac/drawingml/2011/main" val="1"/>
+            </a:ext>
+          </a:extLst>
+        </p:spPr>
+        <p:txBody>
+          <a:bodyPr lIns="0" tIns="0" rIns="0" bIns="0" anchor="t">
+            <a:spAutoFit/>
+          </a:bodyPr>
+          <a:lstStyle>
+            <a:lvl1pPr marL="285750" indent="-285750">
+              <a:buSzPct val="100000"/>
+              <a:buFont typeface="Arial"/>
+              <a:buChar char="•"/>
+              <a:defRPr>
+                <a:solidFill>
+                  <a:srgbClr val="242415"/>
+                </a:solidFill>
+                <a:latin typeface="Open Sans"/>
+                <a:ea typeface="Open Sans"/>
+                <a:cs typeface="Open Sans"/>
+                <a:sym typeface="Open Sans"/>
+              </a:defRPr>
+            </a:lvl1pPr>
+          </a:lstStyle>
+          <a:p>
+            <a:r>
+              <a:rPr lang="en-GB" dirty="0" err="1"/>
+              <a:t>Características</a:t>
+            </a:r>
+          </a:p>
+        </p:txBody>
+      </p:sp>
+      <p:sp>
+        <p:nvSpPr>
+          <p:cNvPr id="7" name="TextBox 3">
+            <a:extLst>
+              <a:ext uri="{FF2B5EF4-FFF2-40B4-BE49-F238E27FC236}">
+                <a16:creationId xmlns:a16="http://schemas.microsoft.com/office/drawing/2014/main" id="{B8304F32-D02C-44C9-9E2C-F7EE3374CB62}"/>
+              </a:ext>
+            </a:extLst>
+          </p:cNvPr>
+          <p:cNvSpPr txBox="1"/>
+          <p:nvPr/>
+        </p:nvSpPr>
+        <p:spPr>
+          <a:xfrm>
+            <a:off x="900112" y="2890058"/>
+            <a:ext cx="7653195" cy="279401"/>
+          </a:xfrm>
+          <a:prstGeom prst="rect">
+            <a:avLst/>
+          </a:prstGeom>
+          <a:ln w="12700">
+            <a:miter lim="400000"/>
+          </a:ln>
+          <a:extLst>
+            <a:ext uri="{C572A759-6A51-4108-AA02-DFA0A04FC94B}">
+              <ma14:wrappingTextBoxFlag xmlns="" xmlns:m="http://schemas.openxmlformats.org/officeDocument/2006/math" xmlns:a14="http://schemas.microsoft.com/office/drawing/2010/main" xmlns:ma14="http://schemas.microsoft.com/office/mac/drawingml/2011/main" val="1"/>
+            </a:ext>
+          </a:extLst>
+        </p:spPr>
+        <p:txBody>
+          <a:bodyPr lIns="0" tIns="0" rIns="0" bIns="0" anchor="t">
+            <a:spAutoFit/>
+          </a:bodyPr>
+          <a:lstStyle/>
+          <a:p>
+            <a:pPr marL="285750" indent="-285750">
+              <a:buSzPct val="100000"/>
+              <a:buFont typeface="Arial"/>
+              <a:buChar char="•"/>
+              <a:defRPr>
+                <a:solidFill>
+                  <a:srgbClr val="242415"/>
+                </a:solidFill>
+                <a:latin typeface="Open Sans"/>
+                <a:ea typeface="Open Sans"/>
+                <a:cs typeface="Open Sans"/>
+                <a:sym typeface="Open Sans"/>
+              </a:defRPr>
+            </a:pPr>
+            <a:r>
+              <a:rPr lang="en-US" dirty="0"/>
+              <a:t>Demo </a:t>
+            </a:r>
+            <a:r>
+              <a:rPr lang="en-US" dirty="0" err="1"/>
+              <a:t>composición</a:t>
+            </a:r>
+          </a:p>
+        </p:txBody>
+      </p:sp>
+      <p:sp>
+        <p:nvSpPr>
+          <p:cNvPr id="8" name="TextBox 3">
+            <a:extLst>
+              <a:ext uri="{FF2B5EF4-FFF2-40B4-BE49-F238E27FC236}">
+                <a16:creationId xmlns:a16="http://schemas.microsoft.com/office/drawing/2014/main" id="{F46CD173-39DD-4D21-8347-51D6DEB34691}"/>
+              </a:ext>
+            </a:extLst>
+          </p:cNvPr>
+          <p:cNvSpPr txBox="1"/>
+          <p:nvPr/>
+        </p:nvSpPr>
+        <p:spPr>
+          <a:xfrm>
+            <a:off x="900112" y="3279280"/>
+            <a:ext cx="7653195" cy="276999"/>
+          </a:xfrm>
+          <a:prstGeom prst="rect">
+            <a:avLst/>
+          </a:prstGeom>
+          <a:ln w="12700">
+            <a:miter lim="400000"/>
+          </a:ln>
+          <a:extLst>
+            <a:ext uri="{C572A759-6A51-4108-AA02-DFA0A04FC94B}">
+              <ma14:wrappingTextBoxFlag xmlns="" xmlns:m="http://schemas.openxmlformats.org/officeDocument/2006/math" xmlns:a14="http://schemas.microsoft.com/office/drawing/2010/main" xmlns:ma14="http://schemas.microsoft.com/office/mac/drawingml/2011/main" val="1"/>
+            </a:ext>
+          </a:extLst>
+        </p:spPr>
+        <p:txBody>
+          <a:bodyPr lIns="0" tIns="0" rIns="0" bIns="0" anchor="t">
+            <a:spAutoFit/>
+          </a:bodyPr>
+          <a:lstStyle/>
+          <a:p>
+            <a:pPr marL="285750" indent="-285750">
+              <a:buSzPct val="100000"/>
+              <a:buFont typeface="Arial"/>
+              <a:buChar char="•"/>
+              <a:defRPr>
+                <a:solidFill>
+                  <a:srgbClr val="242415"/>
+                </a:solidFill>
+                <a:latin typeface="Open Sans"/>
+                <a:ea typeface="Open Sans"/>
+                <a:cs typeface="Open Sans"/>
+                <a:sym typeface="Open Sans"/>
+              </a:defRPr>
+            </a:pPr>
+            <a:r>
+              <a:rPr lang="en-US" dirty="0"/>
+              <a:t>Demo curry</a:t>
+            </a:r>
+          </a:p>
+        </p:txBody>
+      </p:sp>
+      <p:sp>
+        <p:nvSpPr>
+          <p:cNvPr id="9" name="TextBox 3">
+            <a:extLst>
+              <a:ext uri="{FF2B5EF4-FFF2-40B4-BE49-F238E27FC236}">
+                <a16:creationId xmlns:a16="http://schemas.microsoft.com/office/drawing/2014/main" id="{F322B547-8EBF-4910-B2C5-45844AF78EE5}"/>
+              </a:ext>
+            </a:extLst>
+          </p:cNvPr>
+          <p:cNvSpPr txBox="1"/>
+          <p:nvPr/>
+        </p:nvSpPr>
+        <p:spPr>
+          <a:xfrm>
+            <a:off x="900112" y="4020746"/>
+            <a:ext cx="7653195" cy="279401"/>
+          </a:xfrm>
+          <a:prstGeom prst="rect">
+            <a:avLst/>
+          </a:prstGeom>
+          <a:ln w="12700">
+            <a:miter lim="400000"/>
+          </a:ln>
+          <a:extLst>
+            <a:ext uri="{C572A759-6A51-4108-AA02-DFA0A04FC94B}">
+              <ma14:wrappingTextBoxFlag xmlns="" xmlns:m="http://schemas.openxmlformats.org/officeDocument/2006/math" xmlns:a14="http://schemas.microsoft.com/office/drawing/2010/main" xmlns:ma14="http://schemas.microsoft.com/office/mac/drawingml/2011/main" val="1"/>
+            </a:ext>
+          </a:extLst>
+        </p:spPr>
+        <p:txBody>
+          <a:bodyPr lIns="0" tIns="0" rIns="0" bIns="0" anchor="t">
+            <a:spAutoFit/>
+          </a:bodyPr>
+          <a:lstStyle>
+            <a:lvl1pPr marL="285750" indent="-285750">
+              <a:buSzPct val="100000"/>
+              <a:buFont typeface="Arial"/>
+              <a:buChar char="•"/>
+              <a:defRPr>
+                <a:solidFill>
+                  <a:srgbClr val="242415"/>
+                </a:solidFill>
+                <a:latin typeface="Open Sans"/>
+                <a:ea typeface="Open Sans"/>
+                <a:cs typeface="Open Sans"/>
+                <a:sym typeface="Open Sans"/>
+              </a:defRPr>
+            </a:lvl1pPr>
+          </a:lstStyle>
+          <a:p>
+            <a:r>
+              <a:rPr lang="en-US" dirty="0"/>
+              <a:t>Demo </a:t>
+            </a:r>
+            <a:r>
+              <a:rPr lang="en-US" dirty="0" err="1"/>
+              <a:t>resolución</a:t>
+            </a:r>
+            <a:r>
+              <a:rPr lang="en-US" dirty="0"/>
+              <a:t> </a:t>
+            </a:r>
+            <a:r>
+              <a:rPr lang="en-US" dirty="0" err="1"/>
+              <a:t>FizzBuzz</a:t>
+            </a:r>
+            <a:r>
+              <a:rPr lang="en-US" dirty="0"/>
+              <a:t> de forma </a:t>
+            </a:r>
+            <a:r>
+              <a:rPr lang="en-US" dirty="0" err="1"/>
+              <a:t>funcional</a:t>
+            </a:r>
+          </a:p>
+        </p:txBody>
+      </p:sp>
+      <p:sp>
+        <p:nvSpPr>
+          <p:cNvPr id="12" name="TextBox 3">
+            <a:extLst>
+              <a:ext uri="{FF2B5EF4-FFF2-40B4-BE49-F238E27FC236}">
+                <a16:creationId xmlns:a16="http://schemas.microsoft.com/office/drawing/2014/main" id="{21BB56F7-04AF-46C0-9E61-650C58BCF6C6}"/>
+              </a:ext>
+            </a:extLst>
+          </p:cNvPr>
+          <p:cNvSpPr txBox="1"/>
+          <p:nvPr/>
+        </p:nvSpPr>
+        <p:spPr>
+          <a:xfrm>
+            <a:off x="900112" y="3653092"/>
+            <a:ext cx="7653195" cy="276999"/>
+          </a:xfrm>
+          <a:prstGeom prst="rect">
+            <a:avLst/>
+          </a:prstGeom>
+          <a:ln w="12700">
+            <a:miter lim="400000"/>
+          </a:ln>
+          <a:extLst>
+            <a:ext uri="{C572A759-6A51-4108-AA02-DFA0A04FC94B}">
+              <ma14:wrappingTextBoxFlag xmlns:ma14="http://schemas.microsoft.com/office/mac/drawingml/2011/main" xmlns:a14="http://schemas.microsoft.com/office/drawing/2010/main" xmlns:m="http://schemas.openxmlformats.org/officeDocument/2006/math" xmlns="" val="1"/>
+            </a:ext>
+          </a:extLst>
+        </p:spPr>
+        <p:txBody>
+          <a:bodyPr lIns="0" tIns="0" rIns="0" bIns="0" anchor="t">
+            <a:spAutoFit/>
+          </a:bodyPr>
+          <a:lstStyle/>
+          <a:p>
+            <a:pPr marL="285750" indent="-285750">
+              <a:buSzPct val="100000"/>
+              <a:buFont typeface="Arial"/>
+              <a:buChar char="•"/>
+              <a:defRPr>
+                <a:solidFill>
+                  <a:srgbClr val="242415"/>
+                </a:solidFill>
+                <a:latin typeface="Open Sans"/>
+                <a:ea typeface="Open Sans"/>
+                <a:cs typeface="Open Sans"/>
+                <a:sym typeface="Open Sans"/>
+              </a:defRPr>
+            </a:pPr>
+            <a:r>
+              <a:rPr lang="en-US" dirty="0"/>
+              <a:t>Demo </a:t>
+            </a:r>
+            <a:r>
+              <a:rPr lang="en-US" dirty="0" err="1"/>
+              <a:t>aplicación</a:t>
+            </a:r>
+            <a:r>
+              <a:rPr lang="en-US" dirty="0"/>
+              <a:t> </a:t>
+            </a:r>
+            <a:r>
+              <a:rPr lang="en-US" dirty="0" err="1"/>
+              <a:t>parcial</a:t>
+            </a:r>
+          </a:p>
+        </p:txBody>
+      </p:sp>
+      <p:sp>
+        <p:nvSpPr>
+          <p:cNvPr id="13" name="TextBox 3">
+            <a:extLst>
+              <a:ext uri="{FF2B5EF4-FFF2-40B4-BE49-F238E27FC236}">
+                <a16:creationId xmlns:a16="http://schemas.microsoft.com/office/drawing/2014/main" id="{0EAF63FC-9A3B-4C34-9D6D-4B765384AF8D}"/>
+              </a:ext>
+            </a:extLst>
+          </p:cNvPr>
+          <p:cNvSpPr txBox="1"/>
+          <p:nvPr/>
+        </p:nvSpPr>
+        <p:spPr>
+          <a:xfrm>
+            <a:off x="900111" y="4387368"/>
+            <a:ext cx="7653195" cy="279401"/>
+          </a:xfrm>
+          <a:prstGeom prst="rect">
+            <a:avLst/>
+          </a:prstGeom>
+          <a:ln w="12700">
+            <a:miter lim="400000"/>
+          </a:ln>
+          <a:extLst>
+            <a:ext uri="{C572A759-6A51-4108-AA02-DFA0A04FC94B}">
+              <ma14:wrappingTextBoxFlag xmlns:ma14="http://schemas.microsoft.com/office/mac/drawingml/2011/main" xmlns:a14="http://schemas.microsoft.com/office/drawing/2010/main" xmlns:m="http://schemas.openxmlformats.org/officeDocument/2006/math" xmlns="" val="1"/>
+            </a:ext>
+          </a:extLst>
+        </p:spPr>
+        <p:txBody>
+          <a:bodyPr lIns="0" tIns="0" rIns="0" bIns="0" anchor="t">
+            <a:spAutoFit/>
+          </a:bodyPr>
+          <a:lstStyle>
+            <a:lvl1pPr marL="285750" indent="-285750">
+              <a:buSzPct val="100000"/>
+              <a:buFont typeface="Arial"/>
+              <a:buChar char="•"/>
+              <a:defRPr>
+                <a:solidFill>
+                  <a:srgbClr val="242415"/>
+                </a:solidFill>
+                <a:latin typeface="Open Sans"/>
+                <a:ea typeface="Open Sans"/>
+                <a:cs typeface="Open Sans"/>
+                <a:sym typeface="Open Sans"/>
+              </a:defRPr>
+            </a:lvl1pPr>
+          </a:lstStyle>
+          <a:p>
+            <a:r>
+              <a:rPr lang="en-US" dirty="0"/>
+              <a:t>Demo transducers</a:t>
+            </a:r>
+            <a:endParaRPr lang="en-US" dirty="0" err="1"/>
+          </a:p>
+        </p:txBody>
+      </p:sp>
+    </p:spTree>
+    <p:extLst>
+      <p:ext uri="{BB962C8B-B14F-4D97-AF65-F5344CB8AC3E}">
+        <p14:creationId xmlns:p14="http://schemas.microsoft.com/office/powerpoint/2010/main" val="801211613"/>
+      </p:ext>
+    </p:extLst>
+  </p:cSld>
+  <p:clrMapOvr>
+    <a:masterClrMapping/>
+  </p:clrMapOvr>
+  <p:transition spd="med"/>
+</p:sld>
+</file>
+
+<file path=ppt/slides/slide12.xml><?xml version="1.0" encoding="utf-8"?>
+<p:sld xmlns:a="http://schemas.openxmlformats.org/drawingml/2006/main" xmlns:r="http://schemas.openxmlformats.org/officeDocument/2006/relationships" xmlns:p="http://schemas.openxmlformats.org/presentationml/2006/main">
+  <p:cSld>
+    <p:spTree>
+      <p:nvGrpSpPr>
+        <p:cNvPr id="1" name=""/>
+        <p:cNvGrpSpPr/>
+        <p:nvPr/>
+      </p:nvGrpSpPr>
+      <p:grpSpPr>
+        <a:xfrm>
+          <a:off x="0" y="0"/>
+          <a:ext cx="0" cy="0"/>
+          <a:chOff x="0" y="0"/>
+          <a:chExt cx="0" cy="0"/>
+        </a:xfrm>
+      </p:grpSpPr>
+      <p:sp>
+        <p:nvSpPr>
+          <p:cNvPr id="112" name="Title 1"/>
+          <p:cNvSpPr txBox="1">
+            <a:spLocks noGrp="1"/>
+          </p:cNvSpPr>
+          <p:nvPr>
+            <p:ph type="title"/>
+          </p:nvPr>
+        </p:nvSpPr>
+        <p:spPr>
+          <a:xfrm>
+            <a:off x="647699" y="-1628"/>
+            <a:ext cx="8245476" cy="810659"/>
+          </a:xfrm>
+          <a:prstGeom prst="rect">
+            <a:avLst/>
+          </a:prstGeom>
+        </p:spPr>
+        <p:txBody>
+          <a:bodyPr lIns="0" tIns="0" rIns="0" bIns="0" anchor="b"/>
+          <a:lstStyle>
+            <a:lvl1pPr>
+              <a:defRPr sz="4000" spc="-300">
+                <a:solidFill>
+                  <a:srgbClr val="242415"/>
+                </a:solidFill>
+                <a:latin typeface="Montserrat SemiBold"/>
+                <a:ea typeface="Montserrat SemiBold"/>
+                <a:cs typeface="Montserrat SemiBold"/>
+                <a:sym typeface="Montserrat SemiBold"/>
+              </a:defRPr>
+            </a:lvl1pPr>
+          </a:lstStyle>
+          <a:p>
+            <a:r>
+              <a:rPr lang="en-GB" dirty="0" err="1"/>
+              <a:t>Características</a:t>
+            </a:r>
+          </a:p>
+        </p:txBody>
+      </p:sp>
+      <p:sp>
+        <p:nvSpPr>
+          <p:cNvPr id="113" name="Rectángulo 17"/>
+          <p:cNvSpPr/>
+          <p:nvPr/>
+        </p:nvSpPr>
+        <p:spPr>
+          <a:xfrm>
+            <a:off x="0" y="0"/>
+            <a:ext cx="254000" cy="5143500"/>
+          </a:xfrm>
+          <a:prstGeom prst="rect">
+            <a:avLst/>
+          </a:prstGeom>
+          <a:solidFill>
+            <a:srgbClr val="D8D800"/>
+          </a:solidFill>
+          <a:ln w="12700">
+            <a:miter lim="400000"/>
+          </a:ln>
+        </p:spPr>
+        <p:txBody>
+          <a:bodyPr lIns="45719" rIns="45719" anchor="ctr"/>
+          <a:lstStyle/>
+          <a:p>
+            <a:pPr algn="ctr">
+              <a:defRPr>
+                <a:solidFill>
+                  <a:srgbClr val="FFFFFF"/>
+                </a:solidFill>
+              </a:defRPr>
+            </a:pPr>
+            <a:endParaRPr/>
+          </a:p>
+        </p:txBody>
+      </p:sp>
+      <p:sp>
+        <p:nvSpPr>
+          <p:cNvPr id="2" name="TextBox 3">
+            <a:extLst>
+              <a:ext uri="{FF2B5EF4-FFF2-40B4-BE49-F238E27FC236}">
+                <a16:creationId xmlns:a16="http://schemas.microsoft.com/office/drawing/2014/main" id="{F690A08F-CCB4-42CD-B511-499C8E6A85C3}"/>
+              </a:ext>
+            </a:extLst>
+          </p:cNvPr>
+          <p:cNvSpPr txBox="1"/>
+          <p:nvPr/>
+        </p:nvSpPr>
+        <p:spPr>
+          <a:xfrm>
+            <a:off x="900110" y="1722391"/>
+            <a:ext cx="7653195" cy="279401"/>
+          </a:xfrm>
+          <a:prstGeom prst="rect">
+            <a:avLst/>
+          </a:prstGeom>
+          <a:ln w="12700">
+            <a:miter lim="400000"/>
+          </a:ln>
+          <a:extLst>
+            <a:ext uri="{C572A759-6A51-4108-AA02-DFA0A04FC94B}">
+              <ma14:wrappingTextBoxFlag xmlns="" xmlns:m="http://schemas.openxmlformats.org/officeDocument/2006/math" xmlns:a14="http://schemas.microsoft.com/office/drawing/2010/main" xmlns:ma14="http://schemas.microsoft.com/office/mac/drawingml/2011/main" val="1"/>
+            </a:ext>
+          </a:extLst>
+        </p:spPr>
+        <p:txBody>
+          <a:bodyPr lIns="0" tIns="0" rIns="0" bIns="0" anchor="t">
+            <a:spAutoFit/>
+          </a:bodyPr>
+          <a:lstStyle/>
+          <a:p>
+            <a:pPr marL="285750" indent="-285750">
+              <a:buSzPct val="100000"/>
+              <a:buFont typeface="Arial"/>
+              <a:buChar char="•"/>
+              <a:defRPr>
+                <a:solidFill>
+                  <a:srgbClr val="242415"/>
+                </a:solidFill>
+                <a:latin typeface="Open Sans"/>
+                <a:ea typeface="Open Sans"/>
+                <a:cs typeface="Open Sans"/>
+                <a:sym typeface="Open Sans"/>
+              </a:defRPr>
+            </a:pPr>
+            <a:r>
+              <a:rPr lang="en-US" dirty="0" err="1"/>
+              <a:t>Funciones</a:t>
+            </a:r>
+            <a:r>
+              <a:rPr lang="en-US" dirty="0"/>
+              <a:t> </a:t>
+            </a:r>
+            <a:r>
+              <a:rPr lang="en-US" dirty="0" err="1"/>
+              <a:t>puras</a:t>
+            </a:r>
+            <a:r>
+              <a:rPr lang="en-US" dirty="0"/>
+              <a:t>, </a:t>
+            </a:r>
+            <a:r>
+              <a:rPr lang="en-US" dirty="0" err="1"/>
+              <a:t>transparencia</a:t>
+            </a:r>
+            <a:r>
+              <a:rPr lang="en-US" dirty="0"/>
+              <a:t> </a:t>
+            </a:r>
+            <a:r>
+              <a:rPr lang="en-US" dirty="0" err="1"/>
+              <a:t>referencial</a:t>
+            </a:r>
+          </a:p>
+        </p:txBody>
+      </p:sp>
+      <p:sp>
+        <p:nvSpPr>
+          <p:cNvPr id="3" name="TextBox 3">
+            <a:extLst>
+              <a:ext uri="{FF2B5EF4-FFF2-40B4-BE49-F238E27FC236}">
+                <a16:creationId xmlns:a16="http://schemas.microsoft.com/office/drawing/2014/main" id="{F8297C39-9EDE-4ED0-AA37-0D780A22784F}"/>
+              </a:ext>
+            </a:extLst>
+          </p:cNvPr>
+          <p:cNvSpPr txBox="1"/>
+          <p:nvPr/>
+        </p:nvSpPr>
+        <p:spPr>
+          <a:xfrm>
+            <a:off x="900112" y="2111613"/>
+            <a:ext cx="7653195" cy="279401"/>
+          </a:xfrm>
+          <a:prstGeom prst="rect">
+            <a:avLst/>
+          </a:prstGeom>
+          <a:ln w="12700">
+            <a:miter lim="400000"/>
+          </a:ln>
+          <a:extLst>
+            <a:ext uri="{C572A759-6A51-4108-AA02-DFA0A04FC94B}">
+              <ma14:wrappingTextBoxFlag xmlns="" xmlns:m="http://schemas.openxmlformats.org/officeDocument/2006/math" xmlns:a14="http://schemas.microsoft.com/office/drawing/2010/main" xmlns:ma14="http://schemas.microsoft.com/office/mac/drawingml/2011/main" val="1"/>
+            </a:ext>
+          </a:extLst>
+        </p:spPr>
+        <p:txBody>
+          <a:bodyPr lIns="0" tIns="0" rIns="0" bIns="0" anchor="t">
+            <a:spAutoFit/>
+          </a:bodyPr>
+          <a:lstStyle/>
+          <a:p>
+            <a:pPr marL="285750" indent="-285750">
+              <a:buSzPct val="100000"/>
+              <a:buFont typeface="Arial"/>
+              <a:buChar char="•"/>
+              <a:defRPr>
+                <a:solidFill>
+                  <a:srgbClr val="242415"/>
+                </a:solidFill>
+                <a:latin typeface="Open Sans"/>
+                <a:ea typeface="Open Sans"/>
+                <a:cs typeface="Open Sans"/>
+                <a:sym typeface="Open Sans"/>
+              </a:defRPr>
+            </a:pPr>
+            <a:r>
+              <a:rPr lang="en-US" dirty="0" err="1"/>
+              <a:t>Recursividad</a:t>
+            </a:r>
+          </a:p>
+        </p:txBody>
+      </p:sp>
+      <p:sp>
+        <p:nvSpPr>
+          <p:cNvPr id="4" name="TextBox 3">
+            <a:extLst>
+              <a:ext uri="{FF2B5EF4-FFF2-40B4-BE49-F238E27FC236}">
+                <a16:creationId xmlns:a16="http://schemas.microsoft.com/office/drawing/2014/main" id="{CDBAADE6-5D1D-4438-A559-8A4576E64C03}"/>
+              </a:ext>
+            </a:extLst>
+          </p:cNvPr>
+          <p:cNvSpPr txBox="1"/>
+          <p:nvPr/>
+        </p:nvSpPr>
+        <p:spPr>
+          <a:xfrm>
+            <a:off x="900112" y="2500835"/>
+            <a:ext cx="7653195" cy="279401"/>
+          </a:xfrm>
+          <a:prstGeom prst="rect">
+            <a:avLst/>
+          </a:prstGeom>
+          <a:ln w="12700">
+            <a:miter lim="400000"/>
+          </a:ln>
+          <a:extLst>
+            <a:ext uri="{C572A759-6A51-4108-AA02-DFA0A04FC94B}">
+              <ma14:wrappingTextBoxFlag xmlns="" xmlns:m="http://schemas.openxmlformats.org/officeDocument/2006/math" xmlns:a14="http://schemas.microsoft.com/office/drawing/2010/main" xmlns:ma14="http://schemas.microsoft.com/office/mac/drawingml/2011/main" val="1"/>
+            </a:ext>
+          </a:extLst>
+        </p:spPr>
+        <p:txBody>
+          <a:bodyPr lIns="0" tIns="0" rIns="0" bIns="0" anchor="t">
+            <a:spAutoFit/>
+          </a:bodyPr>
+          <a:lstStyle>
+            <a:lvl1pPr marL="285750" indent="-285750">
+              <a:buSzPct val="100000"/>
+              <a:buFont typeface="Arial"/>
+              <a:buChar char="•"/>
+              <a:defRPr>
+                <a:solidFill>
+                  <a:srgbClr val="242415"/>
+                </a:solidFill>
+                <a:latin typeface="Open Sans"/>
+                <a:ea typeface="Open Sans"/>
+                <a:cs typeface="Open Sans"/>
+                <a:sym typeface="Open Sans"/>
+              </a:defRPr>
+            </a:lvl1pPr>
+          </a:lstStyle>
+          <a:p>
+            <a:r>
+              <a:rPr lang="en-US" dirty="0" err="1"/>
+              <a:t>Estructuras</a:t>
+            </a:r>
+            <a:r>
+              <a:rPr lang="en-US" dirty="0"/>
+              <a:t> de </a:t>
+            </a:r>
+            <a:r>
+              <a:rPr lang="en-US" dirty="0" err="1"/>
+              <a:t>datos</a:t>
+            </a:r>
+            <a:r>
+              <a:rPr lang="en-US" dirty="0"/>
+              <a:t> </a:t>
+            </a:r>
+            <a:r>
+              <a:rPr lang="en-US" dirty="0" err="1"/>
+              <a:t>algebraicas</a:t>
+            </a:r>
+          </a:p>
+        </p:txBody>
+      </p:sp>
+      <p:sp>
+        <p:nvSpPr>
+          <p:cNvPr id="5" name="TextBox 3">
+            <a:extLst>
+              <a:ext uri="{FF2B5EF4-FFF2-40B4-BE49-F238E27FC236}">
+                <a16:creationId xmlns:a16="http://schemas.microsoft.com/office/drawing/2014/main" id="{E73360E9-93BB-47C9-BD8B-787F0215F172}"/>
+              </a:ext>
+            </a:extLst>
+          </p:cNvPr>
+          <p:cNvSpPr txBox="1"/>
+          <p:nvPr/>
+        </p:nvSpPr>
+        <p:spPr>
+          <a:xfrm>
+            <a:off x="900110" y="943947"/>
+            <a:ext cx="7653195" cy="279401"/>
+          </a:xfrm>
+          <a:prstGeom prst="rect">
+            <a:avLst/>
+          </a:prstGeom>
+          <a:ln w="12700">
+            <a:miter lim="400000"/>
+          </a:ln>
+          <a:extLst>
+            <a:ext uri="{C572A759-6A51-4108-AA02-DFA0A04FC94B}">
+              <ma14:wrappingTextBoxFlag xmlns="" xmlns:m="http://schemas.openxmlformats.org/officeDocument/2006/math" xmlns:a14="http://schemas.microsoft.com/office/drawing/2010/main" xmlns:ma14="http://schemas.microsoft.com/office/mac/drawingml/2011/main" val="1"/>
+            </a:ext>
+          </a:extLst>
+        </p:spPr>
+        <p:txBody>
+          <a:bodyPr lIns="0" tIns="0" rIns="0" bIns="0" anchor="t">
+            <a:spAutoFit/>
+          </a:bodyPr>
+          <a:lstStyle>
+            <a:lvl1pPr marL="285750" indent="-285750">
+              <a:buSzPct val="100000"/>
+              <a:buFont typeface="Arial"/>
+              <a:buChar char="•"/>
+              <a:defRPr>
+                <a:solidFill>
+                  <a:srgbClr val="242415"/>
+                </a:solidFill>
+                <a:latin typeface="Open Sans"/>
+                <a:ea typeface="Open Sans"/>
+                <a:cs typeface="Open Sans"/>
+                <a:sym typeface="Open Sans"/>
+              </a:defRPr>
+            </a:lvl1pPr>
+          </a:lstStyle>
+          <a:p>
+            <a:r>
+              <a:rPr lang="en-GB" dirty="0" err="1"/>
+              <a:t>Funciones</a:t>
+            </a:r>
+            <a:r>
+              <a:rPr lang="en-GB" dirty="0"/>
+              <a:t> </a:t>
+            </a:r>
+            <a:r>
+              <a:rPr lang="en-GB" dirty="0" err="1"/>
+              <a:t>como</a:t>
+            </a:r>
+            <a:r>
+              <a:rPr lang="en-GB" dirty="0"/>
+              <a:t> </a:t>
+            </a:r>
+            <a:r>
+              <a:rPr lang="en-GB" dirty="0" err="1"/>
+              <a:t>ciudadanos</a:t>
+            </a:r>
+            <a:r>
+              <a:rPr lang="en-GB" dirty="0"/>
+              <a:t> de primer y alto </a:t>
+            </a:r>
+            <a:r>
+              <a:rPr lang="en-GB" dirty="0" err="1"/>
+              <a:t>orden</a:t>
+            </a:r>
+          </a:p>
+        </p:txBody>
+      </p:sp>
+      <p:sp>
+        <p:nvSpPr>
+          <p:cNvPr id="6" name="TextBox 3">
+            <a:extLst>
+              <a:ext uri="{FF2B5EF4-FFF2-40B4-BE49-F238E27FC236}">
+                <a16:creationId xmlns:a16="http://schemas.microsoft.com/office/drawing/2014/main" id="{1251CE56-D5F5-4261-A35B-3D6CA8D9363D}"/>
+              </a:ext>
+            </a:extLst>
+          </p:cNvPr>
+          <p:cNvSpPr txBox="1"/>
+          <p:nvPr/>
+        </p:nvSpPr>
+        <p:spPr>
+          <a:xfrm>
+            <a:off x="900110" y="1333169"/>
+            <a:ext cx="7653195" cy="279401"/>
+          </a:xfrm>
+          <a:prstGeom prst="rect">
+            <a:avLst/>
+          </a:prstGeom>
+          <a:ln w="12700">
+            <a:miter lim="400000"/>
+          </a:ln>
+          <a:extLst>
+            <a:ext uri="{C572A759-6A51-4108-AA02-DFA0A04FC94B}">
+              <ma14:wrappingTextBoxFlag xmlns="" xmlns:m="http://schemas.openxmlformats.org/officeDocument/2006/math" xmlns:a14="http://schemas.microsoft.com/office/drawing/2010/main" xmlns:ma14="http://schemas.microsoft.com/office/mac/drawingml/2011/main" val="1"/>
+            </a:ext>
+          </a:extLst>
+        </p:spPr>
+        <p:txBody>
+          <a:bodyPr lIns="0" tIns="0" rIns="0" bIns="0" anchor="t">
+            <a:spAutoFit/>
+          </a:bodyPr>
+          <a:lstStyle>
+            <a:lvl1pPr marL="285750" indent="-285750">
+              <a:buSzPct val="100000"/>
+              <a:buFont typeface="Arial"/>
+              <a:buChar char="•"/>
+              <a:defRPr>
+                <a:solidFill>
+                  <a:srgbClr val="242415"/>
+                </a:solidFill>
+                <a:latin typeface="Open Sans"/>
+                <a:ea typeface="Open Sans"/>
+                <a:cs typeface="Open Sans"/>
+                <a:sym typeface="Open Sans"/>
+              </a:defRPr>
+            </a:lvl1pPr>
+          </a:lstStyle>
+          <a:p>
+            <a:r>
+              <a:rPr lang="en-GB" dirty="0" err="1"/>
+              <a:t>Inmutabilidad</a:t>
+            </a:r>
+          </a:p>
+        </p:txBody>
+      </p:sp>
+      <p:sp>
+        <p:nvSpPr>
+          <p:cNvPr id="7" name="TextBox 3">
+            <a:extLst>
+              <a:ext uri="{FF2B5EF4-FFF2-40B4-BE49-F238E27FC236}">
+                <a16:creationId xmlns:a16="http://schemas.microsoft.com/office/drawing/2014/main" id="{B8304F32-D02C-44C9-9E2C-F7EE3374CB62}"/>
+              </a:ext>
+            </a:extLst>
+          </p:cNvPr>
+          <p:cNvSpPr txBox="1"/>
+          <p:nvPr/>
+        </p:nvSpPr>
+        <p:spPr>
+          <a:xfrm>
+            <a:off x="900112" y="2890058"/>
+            <a:ext cx="7653195" cy="279401"/>
+          </a:xfrm>
+          <a:prstGeom prst="rect">
+            <a:avLst/>
+          </a:prstGeom>
+          <a:ln w="12700">
+            <a:miter lim="400000"/>
+          </a:ln>
+          <a:extLst>
+            <a:ext uri="{C572A759-6A51-4108-AA02-DFA0A04FC94B}">
+              <ma14:wrappingTextBoxFlag xmlns="" xmlns:m="http://schemas.openxmlformats.org/officeDocument/2006/math" xmlns:a14="http://schemas.microsoft.com/office/drawing/2010/main" xmlns:ma14="http://schemas.microsoft.com/office/mac/drawingml/2011/main" val="1"/>
+            </a:ext>
+          </a:extLst>
+        </p:spPr>
+        <p:txBody>
+          <a:bodyPr lIns="0" tIns="0" rIns="0" bIns="0" anchor="t">
+            <a:spAutoFit/>
+          </a:bodyPr>
+          <a:lstStyle/>
+          <a:p>
+            <a:pPr marL="285750" indent="-285750">
+              <a:buSzPct val="100000"/>
+              <a:buFont typeface="Arial"/>
+              <a:buChar char="•"/>
+              <a:defRPr>
+                <a:solidFill>
+                  <a:srgbClr val="242415"/>
+                </a:solidFill>
+                <a:latin typeface="Open Sans"/>
+                <a:ea typeface="Open Sans"/>
+                <a:cs typeface="Open Sans"/>
+                <a:sym typeface="Open Sans"/>
+              </a:defRPr>
+            </a:pPr>
+            <a:r>
+              <a:rPr lang="en-US" i="1" dirty="0"/>
+              <a:t>Pattern matching</a:t>
+            </a:r>
+          </a:p>
+        </p:txBody>
+      </p:sp>
+      <p:sp>
+        <p:nvSpPr>
+          <p:cNvPr id="8" name="TextBox 3">
+            <a:extLst>
+              <a:ext uri="{FF2B5EF4-FFF2-40B4-BE49-F238E27FC236}">
+                <a16:creationId xmlns:a16="http://schemas.microsoft.com/office/drawing/2014/main" id="{F46CD173-39DD-4D21-8347-51D6DEB34691}"/>
+              </a:ext>
+            </a:extLst>
+          </p:cNvPr>
+          <p:cNvSpPr txBox="1"/>
+          <p:nvPr/>
+        </p:nvSpPr>
+        <p:spPr>
+          <a:xfrm>
+            <a:off x="900112" y="3279280"/>
+            <a:ext cx="7653195" cy="276999"/>
+          </a:xfrm>
+          <a:prstGeom prst="rect">
+            <a:avLst/>
+          </a:prstGeom>
+          <a:ln w="12700">
+            <a:miter lim="400000"/>
+          </a:ln>
+          <a:extLst>
+            <a:ext uri="{C572A759-6A51-4108-AA02-DFA0A04FC94B}">
+              <ma14:wrappingTextBoxFlag xmlns="" xmlns:m="http://schemas.openxmlformats.org/officeDocument/2006/math" xmlns:a14="http://schemas.microsoft.com/office/drawing/2010/main" xmlns:ma14="http://schemas.microsoft.com/office/mac/drawingml/2011/main" val="1"/>
+            </a:ext>
+          </a:extLst>
+        </p:spPr>
+        <p:txBody>
+          <a:bodyPr lIns="0" tIns="0" rIns="0" bIns="0" anchor="t">
+            <a:spAutoFit/>
+          </a:bodyPr>
+          <a:lstStyle/>
+          <a:p>
+            <a:pPr marL="285750" indent="-285750">
+              <a:buSzPct val="100000"/>
+              <a:buFont typeface="Arial"/>
+              <a:buChar char="•"/>
+              <a:defRPr>
+                <a:solidFill>
+                  <a:srgbClr val="242415"/>
+                </a:solidFill>
+                <a:latin typeface="Open Sans"/>
+                <a:ea typeface="Open Sans"/>
+                <a:cs typeface="Open Sans"/>
+                <a:sym typeface="Open Sans"/>
+              </a:defRPr>
+            </a:pPr>
+            <a:r>
+              <a:rPr lang="en-US" dirty="0" err="1"/>
+              <a:t>Evaluación</a:t>
+            </a:r>
+            <a:r>
+              <a:rPr lang="en-US" dirty="0"/>
+              <a:t> </a:t>
+            </a:r>
+            <a:r>
+              <a:rPr lang="en-US" dirty="0" err="1"/>
+              <a:t>perezosa</a:t>
+            </a:r>
+            <a:r>
+              <a:rPr lang="en-US" dirty="0"/>
+              <a:t> (</a:t>
+            </a:r>
+            <a:r>
+              <a:rPr lang="en-US" i="1" dirty="0"/>
+              <a:t>lazy evaluation</a:t>
+            </a:r>
+            <a:r>
+              <a:rPr lang="en-US" dirty="0"/>
+              <a:t>)</a:t>
+            </a:r>
+          </a:p>
+        </p:txBody>
+      </p:sp>
+      <p:sp>
+        <p:nvSpPr>
+          <p:cNvPr id="9" name="TextBox 3">
+            <a:extLst>
+              <a:ext uri="{FF2B5EF4-FFF2-40B4-BE49-F238E27FC236}">
+                <a16:creationId xmlns:a16="http://schemas.microsoft.com/office/drawing/2014/main" id="{F322B547-8EBF-4910-B2C5-45844AF78EE5}"/>
+              </a:ext>
+            </a:extLst>
+          </p:cNvPr>
+          <p:cNvSpPr txBox="1"/>
+          <p:nvPr/>
+        </p:nvSpPr>
+        <p:spPr>
+          <a:xfrm>
+            <a:off x="900112" y="3733200"/>
+            <a:ext cx="7653195" cy="279401"/>
+          </a:xfrm>
+          <a:prstGeom prst="rect">
+            <a:avLst/>
+          </a:prstGeom>
+          <a:ln w="12700">
+            <a:miter lim="400000"/>
+          </a:ln>
+          <a:extLst>
+            <a:ext uri="{C572A759-6A51-4108-AA02-DFA0A04FC94B}">
+              <ma14:wrappingTextBoxFlag xmlns="" xmlns:m="http://schemas.openxmlformats.org/officeDocument/2006/math" xmlns:a14="http://schemas.microsoft.com/office/drawing/2010/main" xmlns:ma14="http://schemas.microsoft.com/office/mac/drawingml/2011/main" val="1"/>
+            </a:ext>
+          </a:extLst>
+        </p:spPr>
+        <p:txBody>
+          <a:bodyPr lIns="0" tIns="0" rIns="0" bIns="0" anchor="t">
+            <a:spAutoFit/>
+          </a:bodyPr>
+          <a:lstStyle>
+            <a:lvl1pPr marL="285750" indent="-285750">
+              <a:buSzPct val="100000"/>
+              <a:buFont typeface="Arial"/>
+              <a:buChar char="•"/>
+              <a:defRPr>
+                <a:solidFill>
+                  <a:srgbClr val="242415"/>
+                </a:solidFill>
+                <a:latin typeface="Open Sans"/>
+                <a:ea typeface="Open Sans"/>
+                <a:cs typeface="Open Sans"/>
+                <a:sym typeface="Open Sans"/>
+              </a:defRPr>
+            </a:lvl1pPr>
+          </a:lstStyle>
+          <a:p>
+            <a:r>
+              <a:rPr lang="en-US" dirty="0" err="1"/>
+              <a:t>Programación</a:t>
+            </a:r>
+            <a:r>
+              <a:rPr lang="en-US" dirty="0"/>
+              <a:t> </a:t>
+            </a:r>
+            <a:r>
+              <a:rPr lang="en-US" dirty="0" err="1"/>
+              <a:t>declarativa</a:t>
+            </a:r>
+          </a:p>
+        </p:txBody>
+      </p:sp>
+      <p:sp>
+        <p:nvSpPr>
+          <p:cNvPr id="12" name="TextBox 3">
+            <a:extLst>
+              <a:ext uri="{FF2B5EF4-FFF2-40B4-BE49-F238E27FC236}">
+                <a16:creationId xmlns:a16="http://schemas.microsoft.com/office/drawing/2014/main" id="{15793B19-E925-4DC1-B9E7-68B580AEF1AB}"/>
+              </a:ext>
+            </a:extLst>
+          </p:cNvPr>
+          <p:cNvSpPr txBox="1"/>
+          <p:nvPr/>
+        </p:nvSpPr>
+        <p:spPr>
+          <a:xfrm>
+            <a:off x="900111" y="4142954"/>
+            <a:ext cx="7653195" cy="279401"/>
+          </a:xfrm>
+          <a:prstGeom prst="rect">
+            <a:avLst/>
+          </a:prstGeom>
+          <a:ln w="12700">
+            <a:miter lim="400000"/>
+          </a:ln>
+          <a:extLst>
+            <a:ext uri="{C572A759-6A51-4108-AA02-DFA0A04FC94B}">
+              <ma14:wrappingTextBoxFlag xmlns:ma14="http://schemas.microsoft.com/office/mac/drawingml/2011/main" xmlns:a14="http://schemas.microsoft.com/office/drawing/2010/main" xmlns:m="http://schemas.openxmlformats.org/officeDocument/2006/math" xmlns="" val="1"/>
+            </a:ext>
+          </a:extLst>
+        </p:spPr>
+        <p:txBody>
+          <a:bodyPr lIns="0" tIns="0" rIns="0" bIns="0" anchor="t">
+            <a:spAutoFit/>
+          </a:bodyPr>
+          <a:lstStyle>
+            <a:lvl1pPr marL="285750" indent="-285750">
+              <a:buSzPct val="100000"/>
+              <a:buFont typeface="Arial"/>
+              <a:buChar char="•"/>
+              <a:defRPr>
+                <a:solidFill>
+                  <a:srgbClr val="242415"/>
+                </a:solidFill>
+                <a:latin typeface="Open Sans"/>
+                <a:ea typeface="Open Sans"/>
+                <a:cs typeface="Open Sans"/>
+                <a:sym typeface="Open Sans"/>
+              </a:defRPr>
+            </a:lvl1pPr>
+          </a:lstStyle>
+          <a:p>
+            <a:r>
+              <a:rPr lang="en-US" dirty="0" err="1"/>
+              <a:t>Guardas</a:t>
+            </a:r>
+            <a:r>
+              <a:rPr lang="en-US" dirty="0"/>
+              <a:t> (</a:t>
+            </a:r>
+            <a:r>
+              <a:rPr lang="en-US" dirty="0" err="1"/>
+              <a:t>condiciones</a:t>
+            </a:r>
+            <a:r>
+              <a:rPr lang="en-US" dirty="0"/>
+              <a:t> a </a:t>
+            </a:r>
+            <a:r>
+              <a:rPr lang="en-US" dirty="0" err="1"/>
+              <a:t>nivel</a:t>
+            </a:r>
+            <a:r>
+              <a:rPr lang="en-US" dirty="0"/>
+              <a:t> de </a:t>
+            </a:r>
+            <a:r>
+              <a:rPr lang="en-US" dirty="0" err="1"/>
+              <a:t>declaración</a:t>
+            </a:r>
+            <a:r>
+              <a:rPr lang="en-US" dirty="0"/>
+              <a:t>)</a:t>
+            </a:r>
+            <a:endParaRPr lang="en-US" dirty="0" err="1"/>
+          </a:p>
+        </p:txBody>
+      </p:sp>
+    </p:spTree>
+    <p:extLst>
+      <p:ext uri="{BB962C8B-B14F-4D97-AF65-F5344CB8AC3E}">
+        <p14:creationId xmlns:p14="http://schemas.microsoft.com/office/powerpoint/2010/main" val="3949614903"/>
+      </p:ext>
+    </p:extLst>
+  </p:cSld>
+  <p:clrMapOvr>
+    <a:masterClrMapping/>
+  </p:clrMapOvr>
+  <p:transition spd="med"/>
+</p:sld>
+</file>
+
+<file path=ppt/slides/slide13.xml><?xml version="1.0" encoding="utf-8"?>
+<p:sld xmlns:a="http://schemas.openxmlformats.org/drawingml/2006/main" xmlns:r="http://schemas.openxmlformats.org/officeDocument/2006/relationships" xmlns:p="http://schemas.openxmlformats.org/presentationml/2006/main">
+  <p:cSld>
+    <p:spTree>
+      <p:nvGrpSpPr>
+        <p:cNvPr id="1" name=""/>
+        <p:cNvGrpSpPr/>
+        <p:nvPr/>
+      </p:nvGrpSpPr>
+      <p:grpSpPr>
+        <a:xfrm>
+          <a:off x="0" y="0"/>
+          <a:ext cx="0" cy="0"/>
+          <a:chOff x="0" y="0"/>
+          <a:chExt cx="0" cy="0"/>
+        </a:xfrm>
+      </p:grpSpPr>
+      <p:sp>
+        <p:nvSpPr>
+          <p:cNvPr id="112" name="Title 1"/>
+          <p:cNvSpPr txBox="1">
+            <a:spLocks noGrp="1"/>
+          </p:cNvSpPr>
+          <p:nvPr>
+            <p:ph type="title"/>
+          </p:nvPr>
+        </p:nvSpPr>
+        <p:spPr>
+          <a:xfrm>
+            <a:off x="647699" y="-1628"/>
+            <a:ext cx="8245476" cy="810659"/>
+          </a:xfrm>
+          <a:prstGeom prst="rect">
+            <a:avLst/>
+          </a:prstGeom>
+        </p:spPr>
+        <p:txBody>
+          <a:bodyPr lIns="0" tIns="0" rIns="0" bIns="0" anchor="b"/>
+          <a:lstStyle>
+            <a:lvl1pPr>
+              <a:defRPr sz="4000" spc="-300">
+                <a:solidFill>
+                  <a:srgbClr val="242415"/>
+                </a:solidFill>
+                <a:latin typeface="Montserrat SemiBold"/>
+                <a:ea typeface="Montserrat SemiBold"/>
+                <a:cs typeface="Montserrat SemiBold"/>
+                <a:sym typeface="Montserrat SemiBold"/>
+              </a:defRPr>
+            </a:lvl1pPr>
+          </a:lstStyle>
+          <a:p>
+            <a:r>
+              <a:rPr lang="en-GB" dirty="0"/>
+              <a:t>FP vs OOP</a:t>
+            </a:r>
+            <a:endParaRPr lang="en-GB" dirty="0" err="1"/>
+          </a:p>
+        </p:txBody>
+      </p:sp>
+      <p:sp>
+        <p:nvSpPr>
+          <p:cNvPr id="113" name="Rectángulo 17"/>
+          <p:cNvSpPr/>
+          <p:nvPr/>
+        </p:nvSpPr>
+        <p:spPr>
+          <a:xfrm>
+            <a:off x="0" y="0"/>
+            <a:ext cx="254000" cy="5143500"/>
+          </a:xfrm>
+          <a:prstGeom prst="rect">
+            <a:avLst/>
+          </a:prstGeom>
+          <a:solidFill>
+            <a:srgbClr val="D8D800"/>
+          </a:solidFill>
+          <a:ln w="12700">
+            <a:miter lim="400000"/>
+          </a:ln>
+        </p:spPr>
+        <p:txBody>
+          <a:bodyPr lIns="45719" rIns="45719" anchor="ctr"/>
+          <a:lstStyle/>
+          <a:p>
+            <a:pPr algn="ctr">
+              <a:defRPr>
+                <a:solidFill>
+                  <a:srgbClr val="FFFFFF"/>
+                </a:solidFill>
+              </a:defRPr>
+            </a:pPr>
+            <a:endParaRPr/>
+          </a:p>
+        </p:txBody>
+      </p:sp>
+      <p:graphicFrame>
+        <p:nvGraphicFramePr>
+          <p:cNvPr id="10" name="Table 10">
+            <a:extLst>
+              <a:ext uri="{FF2B5EF4-FFF2-40B4-BE49-F238E27FC236}">
+                <a16:creationId xmlns:a16="http://schemas.microsoft.com/office/drawing/2014/main" id="{6A088E68-58D9-411A-9F9C-2F18C3D8F17F}"/>
+              </a:ext>
+            </a:extLst>
+          </p:cNvPr>
+          <p:cNvGraphicFramePr>
+            <a:graphicFrameLocks noGrp="1"/>
+          </p:cNvGraphicFramePr>
+          <p:nvPr>
+            <p:extLst>
+              <p:ext uri="{D42A27DB-BD31-4B8C-83A1-F6EECF244321}">
+                <p14:modId xmlns:p14="http://schemas.microsoft.com/office/powerpoint/2010/main" val="2536503845"/>
+              </p:ext>
+            </p:extLst>
+          </p:nvPr>
+        </p:nvGraphicFramePr>
+        <p:xfrm>
+          <a:off x="688964" y="1038678"/>
+          <a:ext cx="7840470" cy="2904223"/>
+        </p:xfrm>
+        <a:graphic>
+          <a:graphicData uri="http://schemas.openxmlformats.org/drawingml/2006/table">
+            <a:tbl>
+              <a:tblPr firstRow="1">
+                <a:tableStyleId>{1FECB4D8-DB02-4DC6-A0A2-4F2EBAE1DC90}</a:tableStyleId>
+              </a:tblPr>
+              <a:tblGrid>
+                <a:gridCol w="3920235">
+                  <a:extLst>
+                    <a:ext uri="{9D8B030D-6E8A-4147-A177-3AD203B41FA5}">
+                      <a16:colId xmlns:a16="http://schemas.microsoft.com/office/drawing/2014/main" val="2432647363"/>
+                    </a:ext>
+                  </a:extLst>
+                </a:gridCol>
+                <a:gridCol w="3920235">
+                  <a:extLst>
+                    <a:ext uri="{9D8B030D-6E8A-4147-A177-3AD203B41FA5}">
+                      <a16:colId xmlns:a16="http://schemas.microsoft.com/office/drawing/2014/main" val="195682591"/>
+                    </a:ext>
+                  </a:extLst>
+                </a:gridCol>
+              </a:tblGrid>
+              <a:tr h="414889">
+                <a:tc>
+                  <a:txBody>
+                    <a:bodyPr/>
+                    <a:lstStyle/>
+                    <a:p>
+                      <a:r>
+                        <a:rPr lang="en-US" dirty="0" err="1"/>
+                        <a:t>Programación</a:t>
+                      </a:r>
+                      <a:r>
+                        <a:rPr lang="en-US" dirty="0"/>
+                        <a:t> </a:t>
+                      </a:r>
+                      <a:r>
+                        <a:rPr lang="en-US" dirty="0" err="1"/>
+                        <a:t>funcional</a:t>
+                      </a:r>
+                    </a:p>
+                  </a:txBody>
+                  <a:tcPr/>
+                </a:tc>
+                <a:tc>
+                  <a:txBody>
+                    <a:bodyPr/>
+                    <a:lstStyle/>
+                    <a:p>
+                      <a:r>
+                        <a:rPr lang="en-US" dirty="0" err="1"/>
+                        <a:t>Programación</a:t>
+                      </a:r>
+                      <a:r>
+                        <a:rPr lang="en-US" dirty="0"/>
+                        <a:t> </a:t>
+                      </a:r>
+                      <a:r>
+                        <a:rPr lang="en-US" dirty="0" err="1"/>
+                        <a:t>Orientada</a:t>
+                      </a:r>
+                      <a:r>
+                        <a:rPr lang="en-US" dirty="0"/>
+                        <a:t> a </a:t>
+                      </a:r>
+                      <a:r>
+                        <a:rPr lang="en-US" dirty="0" err="1"/>
+                        <a:t>Objectos</a:t>
+                      </a:r>
+                    </a:p>
+                  </a:txBody>
+                  <a:tcPr/>
+                </a:tc>
+                <a:extLst>
+                  <a:ext uri="{0D108BD9-81ED-4DB2-BD59-A6C34878D82A}">
+                    <a16:rowId xmlns:a16="http://schemas.microsoft.com/office/drawing/2014/main" val="3638730495"/>
+                  </a:ext>
+                </a:extLst>
+              </a:tr>
+              <a:tr h="414889">
+                <a:tc>
+                  <a:txBody>
+                    <a:bodyPr/>
+                    <a:lstStyle/>
+                    <a:p>
+                      <a:pPr lvl="0">
+                        <a:buNone/>
+                      </a:pPr>
+                      <a:r>
+                        <a:rPr lang="en-US" dirty="0" err="1"/>
+                        <a:t>Enfatiza</a:t>
+                      </a:r>
+                      <a:r>
+                        <a:rPr lang="en-US" dirty="0"/>
+                        <a:t> el </a:t>
+                      </a:r>
+                      <a:r>
+                        <a:rPr lang="en-US" dirty="0" err="1"/>
+                        <a:t>uso</a:t>
+                      </a:r>
+                      <a:r>
+                        <a:rPr lang="en-US" dirty="0"/>
+                        <a:t> de </a:t>
+                      </a:r>
+                      <a:r>
+                        <a:rPr lang="en-US" dirty="0" err="1"/>
+                        <a:t>funciones</a:t>
+                      </a:r>
+                      <a:r>
+                        <a:rPr lang="en-US" dirty="0"/>
+                        <a:t> y variables</a:t>
+                      </a:r>
+                    </a:p>
+                  </a:txBody>
+                  <a:tcPr/>
+                </a:tc>
+                <a:tc>
+                  <a:txBody>
+                    <a:bodyPr/>
+                    <a:lstStyle/>
+                    <a:p>
+                      <a:pPr lvl="0">
+                        <a:buNone/>
+                      </a:pPr>
+                      <a:r>
+                        <a:rPr lang="en-US" dirty="0" err="1"/>
+                        <a:t>Enfatiza</a:t>
+                      </a:r>
+                      <a:r>
+                        <a:rPr lang="en-US" dirty="0"/>
+                        <a:t> el </a:t>
+                      </a:r>
+                      <a:r>
+                        <a:rPr lang="en-US" dirty="0" err="1"/>
+                        <a:t>uso</a:t>
+                      </a:r>
+                      <a:r>
+                        <a:rPr lang="en-US" dirty="0"/>
+                        <a:t> de </a:t>
+                      </a:r>
+                      <a:r>
+                        <a:rPr lang="en-US" dirty="0" err="1"/>
+                        <a:t>objetos</a:t>
+                      </a:r>
+                      <a:r>
+                        <a:rPr lang="en-US" dirty="0"/>
+                        <a:t> y </a:t>
+                      </a:r>
+                      <a:r>
+                        <a:rPr lang="en-US" dirty="0" err="1"/>
+                        <a:t>métodos</a:t>
+                      </a:r>
+                    </a:p>
+                  </a:txBody>
+                  <a:tcPr/>
+                </a:tc>
+                <a:extLst>
+                  <a:ext uri="{0D108BD9-81ED-4DB2-BD59-A6C34878D82A}">
+                    <a16:rowId xmlns:a16="http://schemas.microsoft.com/office/drawing/2014/main" val="1500066006"/>
+                  </a:ext>
+                </a:extLst>
+              </a:tr>
+              <a:tr h="414889">
+                <a:tc>
+                  <a:txBody>
+                    <a:bodyPr/>
+                    <a:lstStyle/>
+                    <a:p>
+                      <a:r>
+                        <a:rPr lang="en-US" dirty="0" err="1"/>
+                        <a:t>Usa</a:t>
+                      </a:r>
+                      <a:r>
+                        <a:rPr lang="en-US" dirty="0"/>
+                        <a:t> </a:t>
+                      </a:r>
+                      <a:r>
+                        <a:rPr lang="en-US" dirty="0" err="1"/>
+                        <a:t>datos</a:t>
+                      </a:r>
+                      <a:r>
+                        <a:rPr lang="en-US" dirty="0"/>
+                        <a:t> </a:t>
+                      </a:r>
+                      <a:r>
+                        <a:rPr lang="en-US" dirty="0" err="1"/>
+                        <a:t>inmutables</a:t>
+                      </a:r>
+                    </a:p>
+                  </a:txBody>
+                  <a:tcPr/>
+                </a:tc>
+                <a:tc>
+                  <a:txBody>
+                    <a:bodyPr/>
+                    <a:lstStyle/>
+                    <a:p>
+                      <a:r>
+                        <a:rPr lang="en-US" dirty="0" err="1"/>
+                        <a:t>Usa</a:t>
+                      </a:r>
+                      <a:r>
+                        <a:rPr lang="en-US" dirty="0"/>
+                        <a:t> </a:t>
+                      </a:r>
+                      <a:r>
+                        <a:rPr lang="en-US" dirty="0" err="1"/>
+                        <a:t>datos</a:t>
+                      </a:r>
+                      <a:r>
+                        <a:rPr lang="en-US" dirty="0"/>
+                        <a:t> </a:t>
+                      </a:r>
+                      <a:r>
+                        <a:rPr lang="en-US" dirty="0" err="1"/>
+                        <a:t>mutables</a:t>
+                      </a:r>
+                    </a:p>
+                  </a:txBody>
+                  <a:tcPr/>
+                </a:tc>
+                <a:extLst>
+                  <a:ext uri="{0D108BD9-81ED-4DB2-BD59-A6C34878D82A}">
+                    <a16:rowId xmlns:a16="http://schemas.microsoft.com/office/drawing/2014/main" val="1778471902"/>
+                  </a:ext>
+                </a:extLst>
+              </a:tr>
+              <a:tr h="414889">
+                <a:tc>
+                  <a:txBody>
+                    <a:bodyPr/>
+                    <a:lstStyle/>
+                    <a:p>
+                      <a:r>
+                        <a:rPr lang="en-US" dirty="0" err="1"/>
+                        <a:t>Programación</a:t>
+                      </a:r>
+                      <a:r>
+                        <a:rPr lang="en-US" dirty="0"/>
+                        <a:t> </a:t>
+                      </a:r>
+                      <a:r>
+                        <a:rPr lang="en-US" dirty="0" err="1"/>
+                        <a:t>declarativa</a:t>
+                      </a:r>
+                    </a:p>
+                  </a:txBody>
+                  <a:tcPr/>
+                </a:tc>
+                <a:tc>
+                  <a:txBody>
+                    <a:bodyPr/>
+                    <a:lstStyle/>
+                    <a:p>
+                      <a:r>
+                        <a:rPr lang="en-US" dirty="0" err="1"/>
+                        <a:t>Programación</a:t>
+                      </a:r>
+                      <a:r>
+                        <a:rPr lang="en-US" dirty="0"/>
+                        <a:t> </a:t>
+                      </a:r>
+                      <a:r>
+                        <a:rPr lang="en-US" dirty="0" err="1"/>
+                        <a:t>imperativa</a:t>
+                      </a:r>
+                    </a:p>
+                  </a:txBody>
+                  <a:tcPr/>
+                </a:tc>
+                <a:extLst>
+                  <a:ext uri="{0D108BD9-81ED-4DB2-BD59-A6C34878D82A}">
+                    <a16:rowId xmlns:a16="http://schemas.microsoft.com/office/drawing/2014/main" val="867105915"/>
+                  </a:ext>
+                </a:extLst>
+              </a:tr>
+              <a:tr h="414889">
+                <a:tc>
+                  <a:txBody>
+                    <a:bodyPr/>
+                    <a:lstStyle/>
+                    <a:p>
+                      <a:r>
+                        <a:rPr lang="en-US" dirty="0"/>
+                        <a:t>Se </a:t>
+                      </a:r>
+                      <a:r>
+                        <a:rPr lang="en-US" dirty="0" err="1"/>
+                        <a:t>enfoca</a:t>
+                      </a:r>
+                      <a:r>
+                        <a:rPr lang="en-US" dirty="0"/>
+                        <a:t> en "</a:t>
+                      </a:r>
+                      <a:r>
+                        <a:rPr lang="en-US" dirty="0" err="1"/>
+                        <a:t>qué</a:t>
+                      </a:r>
+                      <a:r>
+                        <a:rPr lang="en-US" dirty="0"/>
+                        <a:t> se </a:t>
+                      </a:r>
+                      <a:r>
+                        <a:rPr lang="en-US" dirty="0" err="1"/>
+                        <a:t>hace</a:t>
+                      </a:r>
+                      <a:r>
+                        <a:rPr lang="en-US" dirty="0"/>
+                        <a:t>"</a:t>
+                      </a:r>
+                    </a:p>
+                  </a:txBody>
+                  <a:tcPr/>
+                </a:tc>
+                <a:tc>
+                  <a:txBody>
+                    <a:bodyPr/>
+                    <a:lstStyle/>
+                    <a:p>
+                      <a:r>
+                        <a:rPr lang="en-US" dirty="0"/>
+                        <a:t>Se </a:t>
+                      </a:r>
+                      <a:r>
+                        <a:rPr lang="en-US" dirty="0" err="1"/>
+                        <a:t>enfoca</a:t>
+                      </a:r>
+                      <a:r>
+                        <a:rPr lang="en-US" dirty="0"/>
+                        <a:t> en "</a:t>
+                      </a:r>
+                      <a:r>
+                        <a:rPr lang="en-US" dirty="0" err="1"/>
+                        <a:t>cómo</a:t>
+                      </a:r>
+                      <a:r>
+                        <a:rPr lang="en-US" dirty="0"/>
+                        <a:t> se </a:t>
+                      </a:r>
+                      <a:r>
+                        <a:rPr lang="en-US" dirty="0" err="1"/>
+                        <a:t>hace</a:t>
+                      </a:r>
+                      <a:r>
+                        <a:rPr lang="en-US" dirty="0"/>
+                        <a:t>"</a:t>
+                      </a:r>
+                    </a:p>
+                  </a:txBody>
+                  <a:tcPr/>
+                </a:tc>
+                <a:extLst>
+                  <a:ext uri="{0D108BD9-81ED-4DB2-BD59-A6C34878D82A}">
+                    <a16:rowId xmlns:a16="http://schemas.microsoft.com/office/drawing/2014/main" val="3751465394"/>
+                  </a:ext>
+                </a:extLst>
+              </a:tr>
+              <a:tr h="414889">
+                <a:tc>
+                  <a:txBody>
+                    <a:bodyPr/>
+                    <a:lstStyle/>
+                    <a:p>
+                      <a:r>
+                        <a:rPr lang="en-US" dirty="0" err="1"/>
+                        <a:t>Soporta</a:t>
+                      </a:r>
+                      <a:r>
+                        <a:rPr lang="en-US" dirty="0"/>
+                        <a:t> </a:t>
+                      </a:r>
+                      <a:r>
+                        <a:rPr lang="en-US" dirty="0" err="1"/>
+                        <a:t>programación</a:t>
+                      </a:r>
+                      <a:r>
+                        <a:rPr lang="en-US" dirty="0"/>
+                        <a:t> </a:t>
+                      </a:r>
+                      <a:r>
+                        <a:rPr lang="en-US" dirty="0" err="1"/>
+                        <a:t>concurrente</a:t>
+                      </a:r>
+                    </a:p>
+                  </a:txBody>
+                  <a:tcPr/>
+                </a:tc>
+                <a:tc>
+                  <a:txBody>
+                    <a:bodyPr/>
+                    <a:lstStyle/>
+                    <a:p>
+                      <a:pPr lvl="0" algn="l">
+                        <a:buNone/>
+                      </a:pPr>
+                      <a:r>
+                        <a:rPr lang="en-US" sz="1800" b="0" i="0" u="none" strike="noStrike" noProof="0" dirty="0">
+                          <a:solidFill>
+                            <a:srgbClr val="000000"/>
+                          </a:solidFill>
+                          <a:latin typeface="Calibri"/>
+                        </a:rPr>
+                        <a:t>No </a:t>
+                      </a:r>
+                      <a:r>
+                        <a:rPr lang="en-US" sz="1800" b="0" i="0" u="none" strike="noStrike" noProof="0" dirty="0" err="1">
+                          <a:solidFill>
+                            <a:srgbClr val="000000"/>
+                          </a:solidFill>
+                          <a:latin typeface="Calibri"/>
+                        </a:rPr>
+                        <a:t>soporta</a:t>
+                      </a:r>
+                      <a:r>
+                        <a:rPr lang="en-US" sz="1800" b="0" i="0" u="none" strike="noStrike" noProof="0" dirty="0">
+                          <a:solidFill>
+                            <a:srgbClr val="000000"/>
+                          </a:solidFill>
+                          <a:latin typeface="Calibri"/>
+                        </a:rPr>
+                        <a:t> </a:t>
+                      </a:r>
+                      <a:r>
+                        <a:rPr lang="en-US" sz="1800" b="0" i="0" u="none" strike="noStrike" noProof="0" dirty="0" err="1">
+                          <a:solidFill>
+                            <a:srgbClr val="000000"/>
+                          </a:solidFill>
+                          <a:latin typeface="Calibri"/>
+                        </a:rPr>
+                        <a:t>programación</a:t>
+                      </a:r>
+                      <a:r>
+                        <a:rPr lang="en-US" sz="1800" b="0" i="0" u="none" strike="noStrike" noProof="0" dirty="0">
+                          <a:solidFill>
+                            <a:srgbClr val="000000"/>
+                          </a:solidFill>
+                          <a:latin typeface="Calibri"/>
+                        </a:rPr>
+                        <a:t> </a:t>
+                      </a:r>
+                      <a:r>
+                        <a:rPr lang="en-US" sz="1800" b="0" i="0" u="none" strike="noStrike" noProof="0" dirty="0" err="1">
+                          <a:solidFill>
+                            <a:srgbClr val="000000"/>
+                          </a:solidFill>
+                          <a:latin typeface="Calibri"/>
+                        </a:rPr>
+                        <a:t>concurrente</a:t>
+                      </a:r>
+                      <a:endParaRPr lang="en-US" dirty="0" err="1"/>
+                    </a:p>
+                  </a:txBody>
+                  <a:tcPr/>
+                </a:tc>
+                <a:extLst>
+                  <a:ext uri="{0D108BD9-81ED-4DB2-BD59-A6C34878D82A}">
+                    <a16:rowId xmlns:a16="http://schemas.microsoft.com/office/drawing/2014/main" val="2181120578"/>
+                  </a:ext>
+                </a:extLst>
+              </a:tr>
+              <a:tr h="414889">
+                <a:tc>
+                  <a:txBody>
+                    <a:bodyPr/>
+                    <a:lstStyle/>
+                    <a:p>
+                      <a:r>
+                        <a:rPr lang="en-US" dirty="0" err="1"/>
+                        <a:t>Iteración</a:t>
+                      </a:r>
+                      <a:r>
+                        <a:rPr lang="en-US" dirty="0"/>
+                        <a:t> </a:t>
+                      </a:r>
+                      <a:r>
+                        <a:rPr lang="en-US" dirty="0" err="1"/>
+                        <a:t>mediante</a:t>
+                      </a:r>
+                      <a:r>
+                        <a:rPr lang="en-US" dirty="0"/>
+                        <a:t> </a:t>
+                      </a:r>
+                      <a:r>
+                        <a:rPr lang="en-US" dirty="0" err="1"/>
+                        <a:t>recursividad</a:t>
+                      </a:r>
+                    </a:p>
+                  </a:txBody>
+                  <a:tcPr/>
+                </a:tc>
+                <a:tc>
+                  <a:txBody>
+                    <a:bodyPr/>
+                    <a:lstStyle/>
+                    <a:p>
+                      <a:r>
+                        <a:rPr lang="en-US" dirty="0" err="1"/>
+                        <a:t>Iteración</a:t>
+                      </a:r>
+                      <a:r>
+                        <a:rPr lang="en-US" dirty="0"/>
+                        <a:t> </a:t>
+                      </a:r>
+                      <a:r>
+                        <a:rPr lang="en-US" dirty="0" err="1"/>
+                        <a:t>mediante</a:t>
+                      </a:r>
+                      <a:r>
+                        <a:rPr lang="en-US" dirty="0"/>
+                        <a:t> </a:t>
+                      </a:r>
+                      <a:r>
+                        <a:rPr lang="en-US" dirty="0" err="1"/>
+                        <a:t>bucles</a:t>
+                      </a:r>
+                    </a:p>
+                  </a:txBody>
+                  <a:tcPr/>
+                </a:tc>
+                <a:extLst>
+                  <a:ext uri="{0D108BD9-81ED-4DB2-BD59-A6C34878D82A}">
+                    <a16:rowId xmlns:a16="http://schemas.microsoft.com/office/drawing/2014/main" val="2958808024"/>
+                  </a:ext>
+                </a:extLst>
+              </a:tr>
+            </a:tbl>
+          </a:graphicData>
+        </a:graphic>
+      </p:graphicFrame>
+    </p:spTree>
+    <p:extLst>
+      <p:ext uri="{BB962C8B-B14F-4D97-AF65-F5344CB8AC3E}">
+        <p14:creationId xmlns:p14="http://schemas.microsoft.com/office/powerpoint/2010/main" val="4161404639"/>
+      </p:ext>
+    </p:extLst>
+  </p:cSld>
+  <p:clrMapOvr>
+    <a:masterClrMapping/>
+  </p:clrMapOvr>
+  <p:transition spd="med"/>
+</p:sld>
+</file>
+
+<file path=ppt/slides/slide14.xml><?xml version="1.0" encoding="utf-8"?>
+<p:sld xmlns:a="http://schemas.openxmlformats.org/drawingml/2006/main" xmlns:r="http://schemas.openxmlformats.org/officeDocument/2006/relationships" xmlns:p="http://schemas.openxmlformats.org/presentationml/2006/main">
+  <p:cSld>
+    <p:spTree>
+      <p:nvGrpSpPr>
+        <p:cNvPr id="1" name=""/>
+        <p:cNvGrpSpPr/>
+        <p:nvPr/>
+      </p:nvGrpSpPr>
+      <p:grpSpPr>
+        <a:xfrm>
+          <a:off x="0" y="0"/>
+          <a:ext cx="0" cy="0"/>
+          <a:chOff x="0" y="0"/>
+          <a:chExt cx="0" cy="0"/>
+        </a:xfrm>
+      </p:grpSpPr>
+      <p:pic>
+        <p:nvPicPr>
+          <p:cNvPr id="292" name="Imagen 5" descr="Imagen 5"/>
+          <p:cNvPicPr>
+            <a:picLocks/>
+          </p:cNvPicPr>
+          <p:nvPr/>
+        </p:nvPicPr>
+        <p:blipFill>
+          <a:blip r:embed="rId2">
+            <a:extLst/>
+          </a:blip>
+          <a:stretch>
+            <a:fillRect/>
+          </a:stretch>
+        </p:blipFill>
+        <p:spPr>
+          <a:xfrm>
+            <a:off x="2740790" y="788750"/>
+            <a:ext cx="3810001" cy="2143126"/>
+          </a:xfrm>
+          <a:prstGeom prst="rect">
+            <a:avLst/>
+          </a:prstGeom>
+          <a:ln w="12700">
+            <a:miter lim="400000"/>
+          </a:ln>
+        </p:spPr>
+      </p:pic>
+      <p:sp>
+        <p:nvSpPr>
+          <p:cNvPr id="293" name="Rectángulo 6"/>
+          <p:cNvSpPr/>
+          <p:nvPr/>
+        </p:nvSpPr>
+        <p:spPr>
+          <a:xfrm rot="5400000">
+            <a:off x="4426749" y="2036654"/>
+            <a:ext cx="252001" cy="3395926"/>
+          </a:xfrm>
+          <a:prstGeom prst="rect">
+            <a:avLst/>
+          </a:prstGeom>
+          <a:solidFill>
+            <a:srgbClr val="D8D800"/>
+          </a:solidFill>
+          <a:ln w="12700">
+            <a:miter lim="400000"/>
+          </a:ln>
+        </p:spPr>
+        <p:txBody>
+          <a:bodyPr lIns="45719" rIns="45719" anchor="ctr"/>
+          <a:lstStyle/>
+          <a:p>
+            <a:pPr algn="ctr">
+              <a:defRPr>
+                <a:solidFill>
+                  <a:srgbClr val="FFFFFF"/>
+                </a:solidFill>
+              </a:defRPr>
+            </a:pPr>
+            <a:endParaRPr/>
+          </a:p>
+        </p:txBody>
+      </p:sp>
+      <p:sp>
+        <p:nvSpPr>
+          <p:cNvPr id="294" name="Title 1"/>
+          <p:cNvSpPr txBox="1"/>
+          <p:nvPr/>
+        </p:nvSpPr>
+        <p:spPr>
+          <a:xfrm>
+            <a:off x="2854787" y="3044164"/>
+            <a:ext cx="3434425" cy="609601"/>
+          </a:xfrm>
+          <a:prstGeom prst="rect">
+            <a:avLst/>
+          </a:prstGeom>
+          <a:ln w="12700">
+            <a:miter lim="400000"/>
+          </a:ln>
+          <a:extLst>
+            <a:ext uri="{C572A759-6A51-4108-AA02-DFA0A04FC94B}">
+              <ma14:wrappingTextBoxFlag xmlns:ma14="http://schemas.microsoft.com/office/mac/drawingml/2011/main" xmlns:a14="http://schemas.microsoft.com/office/drawing/2010/main" xmlns:m="http://schemas.openxmlformats.org/officeDocument/2006/math" xmlns="" val="1"/>
+            </a:ext>
+          </a:extLst>
+        </p:spPr>
+        <p:txBody>
+          <a:bodyPr lIns="0" tIns="0" rIns="0" bIns="0" anchor="t">
+            <a:spAutoFit/>
+          </a:bodyPr>
+          <a:lstStyle>
+            <a:lvl1pPr algn="ctr">
+              <a:tabLst>
+                <a:tab pos="88900" algn="l"/>
+              </a:tabLst>
+              <a:defRPr sz="4000" spc="-300">
+                <a:solidFill>
+                  <a:srgbClr val="242415"/>
+                </a:solidFill>
+                <a:latin typeface="Montserrat SemiBold"/>
+                <a:ea typeface="Montserrat SemiBold"/>
+                <a:cs typeface="Montserrat SemiBold"/>
+                <a:sym typeface="Montserrat SemiBold"/>
+              </a:defRPr>
+            </a:lvl1pPr>
+          </a:lstStyle>
+          <a:p>
+            <a:r>
+              <a:rPr lang="en-GB" dirty="0"/>
+              <a:t>Demo time</a:t>
+            </a:r>
+            <a:r>
+              <a:rPr dirty="0"/>
+              <a:t>!!!</a:t>
+            </a:r>
+          </a:p>
+        </p:txBody>
+      </p:sp>
+    </p:spTree>
+    <p:extLst>
+      <p:ext uri="{BB962C8B-B14F-4D97-AF65-F5344CB8AC3E}">
+        <p14:creationId xmlns:p14="http://schemas.microsoft.com/office/powerpoint/2010/main" val="1399089980"/>
+      </p:ext>
+    </p:extLst>
+  </p:cSld>
+  <p:clrMapOvr>
+    <a:masterClrMapping/>
+  </p:clrMapOvr>
+  <p:transition spd="med"/>
+</p:sld>
+</file>
+
+<file path=ppt/slides/slide15.xml><?xml version="1.0" encoding="utf-8"?>
+<p:sld xmlns:a="http://schemas.openxmlformats.org/drawingml/2006/main" xmlns:r="http://schemas.openxmlformats.org/officeDocument/2006/relationships" xmlns:p="http://schemas.openxmlformats.org/presentationml/2006/main">
+  <p:cSld>
+    <p:spTree>
+      <p:nvGrpSpPr>
+        <p:cNvPr id="1" name=""/>
+        <p:cNvGrpSpPr/>
+        <p:nvPr/>
+      </p:nvGrpSpPr>
+      <p:grpSpPr>
+        <a:xfrm>
+          <a:off x="0" y="0"/>
+          <a:ext cx="0" cy="0"/>
+          <a:chOff x="0" y="0"/>
+          <a:chExt cx="0" cy="0"/>
+        </a:xfrm>
+      </p:grpSpPr>
+      <p:sp>
+        <p:nvSpPr>
+          <p:cNvPr id="301" name="Rectángulo 3"/>
+          <p:cNvSpPr/>
+          <p:nvPr/>
+        </p:nvSpPr>
+        <p:spPr>
+          <a:xfrm>
+            <a:off x="0" y="3443907"/>
+            <a:ext cx="9144000" cy="1699593"/>
+          </a:xfrm>
+          <a:prstGeom prst="rect">
+            <a:avLst/>
+          </a:prstGeom>
+          <a:solidFill>
+            <a:srgbClr val="D8D800"/>
+          </a:solidFill>
+          <a:ln w="12700">
+            <a:miter lim="400000"/>
+          </a:ln>
+        </p:spPr>
+        <p:txBody>
+          <a:bodyPr lIns="45719" rIns="45719" anchor="ctr"/>
+          <a:lstStyle/>
+          <a:p>
+            <a:pPr algn="ctr">
+              <a:defRPr>
+                <a:solidFill>
+                  <a:srgbClr val="FFFFFF"/>
+                </a:solidFill>
+              </a:defRPr>
+            </a:pPr>
+            <a:endParaRPr/>
+          </a:p>
+        </p:txBody>
+      </p:sp>
+      <p:pic>
+        <p:nvPicPr>
+          <p:cNvPr id="302" name="Gráfico 10" descr="Gráfico 10"/>
+          <p:cNvPicPr>
+            <a:picLocks noChangeAspect="1"/>
+          </p:cNvPicPr>
+          <p:nvPr/>
+        </p:nvPicPr>
+        <p:blipFill>
+          <a:blip r:embed="rId2">
+            <a:extLst/>
+          </a:blip>
+          <a:stretch>
+            <a:fillRect/>
+          </a:stretch>
+        </p:blipFill>
+        <p:spPr>
+          <a:xfrm>
+            <a:off x="2207873" y="765889"/>
+            <a:ext cx="4728254" cy="1696294"/>
+          </a:xfrm>
+          <a:prstGeom prst="rect">
+            <a:avLst/>
+          </a:prstGeom>
+          <a:ln w="12700">
+            <a:miter lim="400000"/>
+          </a:ln>
+        </p:spPr>
+      </p:pic>
+      <p:pic>
+        <p:nvPicPr>
+          <p:cNvPr id="303" name="Gráfico 13" descr="Gráfico 13"/>
+          <p:cNvPicPr>
+            <a:picLocks noChangeAspect="1"/>
+          </p:cNvPicPr>
+          <p:nvPr/>
+        </p:nvPicPr>
+        <p:blipFill>
+          <a:blip r:embed="rId3">
+            <a:extLst/>
+          </a:blip>
+          <a:stretch>
+            <a:fillRect/>
+          </a:stretch>
+        </p:blipFill>
+        <p:spPr>
+          <a:xfrm>
+            <a:off x="4218292" y="4329110"/>
+            <a:ext cx="360001" cy="360001"/>
+          </a:xfrm>
+          <a:prstGeom prst="rect">
+            <a:avLst/>
+          </a:prstGeom>
+          <a:ln w="12700">
+            <a:miter lim="400000"/>
+          </a:ln>
+        </p:spPr>
+      </p:pic>
+      <p:pic>
+        <p:nvPicPr>
+          <p:cNvPr id="304" name="Gráfico 15" descr="Gráfico 15"/>
+          <p:cNvPicPr>
+            <a:picLocks noChangeAspect="1"/>
+          </p:cNvPicPr>
+          <p:nvPr/>
+        </p:nvPicPr>
+        <p:blipFill>
+          <a:blip r:embed="rId4">
+            <a:extLst/>
+          </a:blip>
+          <a:stretch>
+            <a:fillRect/>
+          </a:stretch>
+        </p:blipFill>
+        <p:spPr>
+          <a:xfrm>
+            <a:off x="4218292" y="3786080"/>
+            <a:ext cx="360001" cy="360001"/>
+          </a:xfrm>
+          <a:prstGeom prst="rect">
+            <a:avLst/>
+          </a:prstGeom>
+          <a:ln w="12700">
+            <a:miter lim="400000"/>
+          </a:ln>
+        </p:spPr>
+      </p:pic>
+      <p:pic>
+        <p:nvPicPr>
+          <p:cNvPr id="305" name="Gráfico 17" descr="Gráfico 17"/>
+          <p:cNvPicPr>
+            <a:picLocks noChangeAspect="1"/>
+          </p:cNvPicPr>
+          <p:nvPr/>
+        </p:nvPicPr>
+        <p:blipFill>
+          <a:blip r:embed="rId5">
+            <a:extLst/>
+          </a:blip>
+          <a:stretch>
+            <a:fillRect/>
+          </a:stretch>
+        </p:blipFill>
+        <p:spPr>
+          <a:xfrm>
+            <a:off x="1365921" y="4333776"/>
+            <a:ext cx="360001" cy="360001"/>
+          </a:xfrm>
+          <a:prstGeom prst="rect">
+            <a:avLst/>
+          </a:prstGeom>
+          <a:ln w="12700">
+            <a:miter lim="400000"/>
+          </a:ln>
+        </p:spPr>
+      </p:pic>
+      <p:pic>
+        <p:nvPicPr>
+          <p:cNvPr id="306" name="Gráfico 2" descr="Gráfico 2"/>
+          <p:cNvPicPr>
+            <a:picLocks noChangeAspect="1"/>
+          </p:cNvPicPr>
+          <p:nvPr/>
+        </p:nvPicPr>
+        <p:blipFill>
+          <a:blip r:embed="rId6">
+            <a:extLst/>
+          </a:blip>
+          <a:stretch>
+            <a:fillRect/>
+          </a:stretch>
+        </p:blipFill>
+        <p:spPr>
+          <a:xfrm>
+            <a:off x="1365921" y="3800404"/>
+            <a:ext cx="360001" cy="360001"/>
+          </a:xfrm>
+          <a:prstGeom prst="rect">
+            <a:avLst/>
+          </a:prstGeom>
+          <a:ln w="12700">
+            <a:miter lim="400000"/>
+          </a:ln>
+        </p:spPr>
+      </p:pic>
+      <p:grpSp>
+        <p:nvGrpSpPr>
+          <p:cNvPr id="311" name="Grupo 5"/>
+          <p:cNvGrpSpPr/>
+          <p:nvPr/>
+        </p:nvGrpSpPr>
+        <p:grpSpPr>
+          <a:xfrm>
+            <a:off x="1771311" y="3781414"/>
+            <a:ext cx="6298731" cy="918538"/>
+            <a:chOff x="0" y="0"/>
+            <a:chExt cx="6298730" cy="918537"/>
+          </a:xfrm>
+        </p:grpSpPr>
+        <p:sp>
+          <p:nvSpPr>
+            <p:cNvPr id="307" name="CuadroTexto 18"/>
+            <p:cNvSpPr txBox="1"/>
+            <p:nvPr/>
+          </p:nvSpPr>
+          <p:spPr>
+            <a:xfrm>
+              <a:off x="2852369" y="0"/>
+              <a:ext cx="3282596" cy="370840"/>
+            </a:xfrm>
+            <a:prstGeom prst="rect">
+              <a:avLst/>
+            </a:prstGeom>
+            <a:noFill/>
+            <a:ln w="12700" cap="flat">
+              <a:noFill/>
+              <a:miter lim="400000"/>
+            </a:ln>
+            <a:effectLst/>
+            <a:extLst>
+              <a:ext uri="{C572A759-6A51-4108-AA02-DFA0A04FC94B}">
+                <ma14:wrappingTextBoxFlag xmlns="" xmlns:m="http://schemas.openxmlformats.org/officeDocument/2006/math" xmlns:a14="http://schemas.microsoft.com/office/drawing/2010/main" xmlns:ma14="http://schemas.microsoft.com/office/mac/drawingml/2011/main" val="1"/>
+              </a:ext>
+            </a:extLst>
+          </p:spPr>
+          <p:txBody>
+            <a:bodyPr wrap="square" lIns="45719" tIns="45719" rIns="45719" bIns="45719" numCol="1" anchor="t">
+              <a:spAutoFit/>
+            </a:bodyPr>
+            <a:lstStyle>
+              <a:lvl1pPr>
+                <a:defRPr>
+                  <a:solidFill>
+                    <a:srgbClr val="FFFFFF"/>
+                  </a:solidFill>
+                  <a:latin typeface="Montserrat Medium"/>
+                  <a:ea typeface="Montserrat Medium"/>
+                  <a:cs typeface="Montserrat Medium"/>
+                  <a:sym typeface="Montserrat Medium"/>
+                </a:defRPr>
+              </a:lvl1pPr>
+            </a:lstStyle>
+            <a:p>
+              <a:r>
+                <a:t>github.com/lemoncode</a:t>
+              </a:r>
+            </a:p>
+          </p:txBody>
+        </p:sp>
+        <p:sp>
+          <p:nvSpPr>
+            <p:cNvPr id="308" name="CuadroTexto 7"/>
+            <p:cNvSpPr txBox="1"/>
+            <p:nvPr/>
+          </p:nvSpPr>
+          <p:spPr>
+            <a:xfrm>
+              <a:off x="0" y="547697"/>
+              <a:ext cx="1972172" cy="370841"/>
+            </a:xfrm>
+            <a:prstGeom prst="rect">
+              <a:avLst/>
+            </a:prstGeom>
+            <a:noFill/>
+            <a:ln w="12700" cap="flat">
+              <a:noFill/>
+              <a:miter lim="400000"/>
+            </a:ln>
+            <a:effectLst/>
+            <a:extLst>
+              <a:ext uri="{C572A759-6A51-4108-AA02-DFA0A04FC94B}">
+                <ma14:wrappingTextBoxFlag xmlns="" xmlns:m="http://schemas.openxmlformats.org/officeDocument/2006/math" xmlns:a14="http://schemas.microsoft.com/office/drawing/2010/main" xmlns:ma14="http://schemas.microsoft.com/office/mac/drawingml/2011/main" val="1"/>
+              </a:ext>
+            </a:extLst>
+          </p:spPr>
+          <p:txBody>
+            <a:bodyPr wrap="square" lIns="45719" tIns="45719" rIns="45719" bIns="45719" numCol="1" anchor="t">
+              <a:spAutoFit/>
+            </a:bodyPr>
+            <a:lstStyle>
+              <a:lvl1pPr>
+                <a:defRPr>
+                  <a:solidFill>
+                    <a:srgbClr val="FFFFFF"/>
+                  </a:solidFill>
+                  <a:latin typeface="Montserrat Medium"/>
+                  <a:ea typeface="Montserrat Medium"/>
+                  <a:cs typeface="Montserrat Medium"/>
+                  <a:sym typeface="Montserrat Medium"/>
+                </a:defRPr>
+              </a:lvl1pPr>
+            </a:lstStyle>
+            <a:p>
+              <a:r>
+                <a:t>@lemoncoders</a:t>
+              </a:r>
+            </a:p>
+          </p:txBody>
+        </p:sp>
+        <p:sp>
+          <p:nvSpPr>
+            <p:cNvPr id="309" name="CuadroTexto 8"/>
+            <p:cNvSpPr txBox="1"/>
+            <p:nvPr/>
+          </p:nvSpPr>
+          <p:spPr>
+            <a:xfrm>
+              <a:off x="2852369" y="543031"/>
+              <a:ext cx="3446362" cy="370841"/>
+            </a:xfrm>
+            <a:prstGeom prst="rect">
+              <a:avLst/>
+            </a:prstGeom>
+            <a:noFill/>
+            <a:ln w="12700" cap="flat">
+              <a:noFill/>
+              <a:miter lim="400000"/>
+            </a:ln>
+            <a:effectLst/>
+            <a:extLst>
+              <a:ext uri="{C572A759-6A51-4108-AA02-DFA0A04FC94B}">
+                <ma14:wrappingTextBoxFlag xmlns="" xmlns:m="http://schemas.openxmlformats.org/officeDocument/2006/math" xmlns:a14="http://schemas.microsoft.com/office/drawing/2010/main" xmlns:ma14="http://schemas.microsoft.com/office/mac/drawingml/2011/main" val="1"/>
+              </a:ext>
+            </a:extLst>
+          </p:spPr>
+          <p:txBody>
+            <a:bodyPr wrap="square" lIns="45719" tIns="45719" rIns="45719" bIns="45719" numCol="1" anchor="t">
+              <a:spAutoFit/>
+            </a:bodyPr>
+            <a:lstStyle>
+              <a:lvl1pPr>
+                <a:defRPr>
+                  <a:solidFill>
+                    <a:srgbClr val="FFFFFF"/>
+                  </a:solidFill>
+                  <a:latin typeface="Montserrat Medium"/>
+                  <a:ea typeface="Montserrat Medium"/>
+                  <a:cs typeface="Montserrat Medium"/>
+                  <a:sym typeface="Montserrat Medium"/>
+                </a:defRPr>
+              </a:lvl1pPr>
+            </a:lstStyle>
+            <a:p>
+              <a:r>
+                <a:t>facebook.com/lemoncoders</a:t>
+              </a:r>
+            </a:p>
+          </p:txBody>
+        </p:sp>
+        <p:sp>
+          <p:nvSpPr>
+            <p:cNvPr id="310" name="CuadroTexto 12"/>
+            <p:cNvSpPr txBox="1"/>
+            <p:nvPr/>
+          </p:nvSpPr>
+          <p:spPr>
+            <a:xfrm>
+              <a:off x="5137" y="14325"/>
+              <a:ext cx="2027658" cy="370840"/>
+            </a:xfrm>
+            <a:prstGeom prst="rect">
+              <a:avLst/>
+            </a:prstGeom>
+            <a:noFill/>
+            <a:ln w="12700" cap="flat">
+              <a:noFill/>
+              <a:miter lim="400000"/>
+            </a:ln>
+            <a:effectLst/>
+            <a:extLst>
+              <a:ext uri="{C572A759-6A51-4108-AA02-DFA0A04FC94B}">
+                <ma14:wrappingTextBoxFlag xmlns="" xmlns:m="http://schemas.openxmlformats.org/officeDocument/2006/math" xmlns:a14="http://schemas.microsoft.com/office/drawing/2010/main" xmlns:ma14="http://schemas.microsoft.com/office/mac/drawingml/2011/main" val="1"/>
+              </a:ext>
+            </a:extLst>
+          </p:spPr>
+          <p:txBody>
+            <a:bodyPr wrap="square" lIns="45719" tIns="45719" rIns="45719" bIns="45719" numCol="1" anchor="t">
+              <a:spAutoFit/>
+            </a:bodyPr>
+            <a:lstStyle>
+              <a:lvl1pPr>
+                <a:defRPr>
+                  <a:solidFill>
+                    <a:srgbClr val="FFFFFF"/>
+                  </a:solidFill>
+                  <a:latin typeface="Montserrat Medium"/>
+                  <a:ea typeface="Montserrat Medium"/>
+                  <a:cs typeface="Montserrat Medium"/>
+                  <a:sym typeface="Montserrat Medium"/>
+                </a:defRPr>
+              </a:lvl1pPr>
+            </a:lstStyle>
+            <a:p>
+              <a:r>
+                <a:t>lemoncode.net</a:t>
+              </a:r>
+            </a:p>
+          </p:txBody>
+        </p:sp>
+      </p:grpSp>
+    </p:spTree>
+  </p:cSld>
+  <p:clrMapOvr>
+    <a:masterClrMapping/>
+  </p:clrMapOvr>
+  <p:transition spd="med"/>
+</p:sld>
+</file>
+
 <file path=ppt/slides/slide2.xml><?xml version="1.0" encoding="utf-8"?>
 <p:sld xmlns:a="http://schemas.openxmlformats.org/drawingml/2006/main" xmlns:r="http://schemas.openxmlformats.org/officeDocument/2006/relationships" xmlns:p="http://schemas.openxmlformats.org/presentationml/2006/main">
   <p:cSld>
@@ -4181,7 +7724,7 @@
           </a:ln>
           <a:extLst>
             <a:ext uri="{C572A759-6A51-4108-AA02-DFA0A04FC94B}">
-              <ma14:wrappingTextBoxFlag xmlns:ma14="http://schemas.microsoft.com/office/mac/drawingml/2011/main" xmlns:a14="http://schemas.microsoft.com/office/drawing/2010/main" xmlns:m="http://schemas.openxmlformats.org/officeDocument/2006/math" xmlns="" val="1"/>
+              <ma14:wrappingTextBoxFlag xmlns="" xmlns:m="http://schemas.openxmlformats.org/officeDocument/2006/math" xmlns:a14="http://schemas.microsoft.com/office/drawing/2010/main" xmlns:ma14="http://schemas.microsoft.com/office/mac/drawingml/2011/main" val="1"/>
             </a:ext>
           </a:extLst>
         </p:spPr>
@@ -4231,7 +7774,7 @@
           </a:ln>
           <a:extLst>
             <a:ext uri="{C572A759-6A51-4108-AA02-DFA0A04FC94B}">
-              <ma14:wrappingTextBoxFlag xmlns:ma14="http://schemas.microsoft.com/office/mac/drawingml/2011/main" xmlns:a14="http://schemas.microsoft.com/office/drawing/2010/main" xmlns:m="http://schemas.openxmlformats.org/officeDocument/2006/math" xmlns="" val="1"/>
+              <ma14:wrappingTextBoxFlag xmlns="" xmlns:m="http://schemas.openxmlformats.org/officeDocument/2006/math" xmlns:a14="http://schemas.microsoft.com/office/drawing/2010/main" xmlns:ma14="http://schemas.microsoft.com/office/mac/drawingml/2011/main" val="1"/>
             </a:ext>
           </a:extLst>
         </p:spPr>
@@ -4411,7 +7954,7 @@
           </a:ln>
           <a:extLst>
             <a:ext uri="{C572A759-6A51-4108-AA02-DFA0A04FC94B}">
-              <ma14:wrappingTextBoxFlag xmlns:ma14="http://schemas.microsoft.com/office/mac/drawingml/2011/main" xmlns:a14="http://schemas.microsoft.com/office/drawing/2010/main" xmlns:m="http://schemas.openxmlformats.org/officeDocument/2006/math" xmlns="" val="1"/>
+              <ma14:wrappingTextBoxFlag xmlns="" xmlns:m="http://schemas.openxmlformats.org/officeDocument/2006/math" xmlns:a14="http://schemas.microsoft.com/office/drawing/2010/main" xmlns:ma14="http://schemas.microsoft.com/office/mac/drawingml/2011/main" val="1"/>
             </a:ext>
           </a:extLst>
         </p:spPr>
@@ -4467,7 +8010,7 @@
           </a:ln>
           <a:extLst>
             <a:ext uri="{C572A759-6A51-4108-AA02-DFA0A04FC94B}">
-              <ma14:wrappingTextBoxFlag xmlns:ma14="http://schemas.microsoft.com/office/mac/drawingml/2011/main" xmlns:a14="http://schemas.microsoft.com/office/drawing/2010/main" xmlns:m="http://schemas.openxmlformats.org/officeDocument/2006/math" xmlns="" val="1"/>
+              <ma14:wrappingTextBoxFlag xmlns="" xmlns:m="http://schemas.openxmlformats.org/officeDocument/2006/math" xmlns:a14="http://schemas.microsoft.com/office/drawing/2010/main" xmlns:ma14="http://schemas.microsoft.com/office/mac/drawingml/2011/main" val="1"/>
             </a:ext>
           </a:extLst>
         </p:spPr>
@@ -4569,7 +8112,7 @@
           </a:ln>
           <a:extLst>
             <a:ext uri="{C572A759-6A51-4108-AA02-DFA0A04FC94B}">
-              <ma14:wrappingTextBoxFlag xmlns:ma14="http://schemas.microsoft.com/office/mac/drawingml/2011/main" xmlns:a14="http://schemas.microsoft.com/office/drawing/2010/main" xmlns:m="http://schemas.openxmlformats.org/officeDocument/2006/math" xmlns="" val="1"/>
+              <ma14:wrappingTextBoxFlag xmlns="" xmlns:m="http://schemas.openxmlformats.org/officeDocument/2006/math" xmlns:a14="http://schemas.microsoft.com/office/drawing/2010/main" xmlns:ma14="http://schemas.microsoft.com/office/mac/drawingml/2011/main" val="1"/>
             </a:ext>
           </a:extLst>
         </p:spPr>
@@ -4619,7 +8162,7 @@
           </a:ln>
           <a:extLst>
             <a:ext uri="{C572A759-6A51-4108-AA02-DFA0A04FC94B}">
-              <ma14:wrappingTextBoxFlag xmlns:ma14="http://schemas.microsoft.com/office/mac/drawingml/2011/main" xmlns:a14="http://schemas.microsoft.com/office/drawing/2010/main" xmlns:m="http://schemas.openxmlformats.org/officeDocument/2006/math" xmlns="" val="1"/>
+              <ma14:wrappingTextBoxFlag xmlns="" xmlns:m="http://schemas.openxmlformats.org/officeDocument/2006/math" xmlns:a14="http://schemas.microsoft.com/office/drawing/2010/main" xmlns:ma14="http://schemas.microsoft.com/office/mac/drawingml/2011/main" val="1"/>
             </a:ext>
           </a:extLst>
         </p:spPr>
@@ -4694,7 +8237,7 @@
           </a:ln>
           <a:extLst>
             <a:ext uri="{C572A759-6A51-4108-AA02-DFA0A04FC94B}">
-              <ma14:wrappingTextBoxFlag xmlns:ma14="http://schemas.microsoft.com/office/mac/drawingml/2011/main" xmlns:a14="http://schemas.microsoft.com/office/drawing/2010/main" xmlns:m="http://schemas.openxmlformats.org/officeDocument/2006/math" xmlns="" val="1"/>
+              <ma14:wrappingTextBoxFlag xmlns="" xmlns:m="http://schemas.openxmlformats.org/officeDocument/2006/math" xmlns:a14="http://schemas.microsoft.com/office/drawing/2010/main" xmlns:ma14="http://schemas.microsoft.com/office/mac/drawingml/2011/main" val="1"/>
             </a:ext>
           </a:extLst>
         </p:spPr>
@@ -4781,7 +8324,7 @@
           </a:ln>
           <a:extLst>
             <a:ext uri="{C572A759-6A51-4108-AA02-DFA0A04FC94B}">
-              <ma14:wrappingTextBoxFlag xmlns:ma14="http://schemas.microsoft.com/office/mac/drawingml/2011/main" xmlns:a14="http://schemas.microsoft.com/office/drawing/2010/main" xmlns:m="http://schemas.openxmlformats.org/officeDocument/2006/math" xmlns="" val="1"/>
+              <ma14:wrappingTextBoxFlag xmlns="" xmlns:m="http://schemas.openxmlformats.org/officeDocument/2006/math" xmlns:a14="http://schemas.microsoft.com/office/drawing/2010/main" xmlns:ma14="http://schemas.microsoft.com/office/mac/drawingml/2011/main" val="1"/>
             </a:ext>
           </a:extLst>
         </p:spPr>
@@ -4841,7 +8384,7 @@
           </a:ln>
           <a:extLst>
             <a:ext uri="{C572A759-6A51-4108-AA02-DFA0A04FC94B}">
-              <ma14:wrappingTextBoxFlag xmlns:ma14="http://schemas.microsoft.com/office/mac/drawingml/2011/main" xmlns:a14="http://schemas.microsoft.com/office/drawing/2010/main" xmlns:m="http://schemas.openxmlformats.org/officeDocument/2006/math" xmlns="" val="1"/>
+              <ma14:wrappingTextBoxFlag xmlns="" xmlns:m="http://schemas.openxmlformats.org/officeDocument/2006/math" xmlns:a14="http://schemas.microsoft.com/office/drawing/2010/main" xmlns:ma14="http://schemas.microsoft.com/office/mac/drawingml/2011/main" val="1"/>
             </a:ext>
           </a:extLst>
         </p:spPr>
@@ -4894,7 +8437,7 @@
           </a:ln>
           <a:extLst>
             <a:ext uri="{C572A759-6A51-4108-AA02-DFA0A04FC94B}">
-              <ma14:wrappingTextBoxFlag xmlns:ma14="http://schemas.microsoft.com/office/mac/drawingml/2011/main" xmlns:a14="http://schemas.microsoft.com/office/drawing/2010/main" xmlns:m="http://schemas.openxmlformats.org/officeDocument/2006/math" xmlns="" val="1"/>
+              <ma14:wrappingTextBoxFlag xmlns="" xmlns:m="http://schemas.openxmlformats.org/officeDocument/2006/math" xmlns:a14="http://schemas.microsoft.com/office/drawing/2010/main" xmlns:ma14="http://schemas.microsoft.com/office/mac/drawingml/2011/main" val="1"/>
             </a:ext>
           </a:extLst>
         </p:spPr>
@@ -4944,7 +8487,7 @@
           </a:ln>
           <a:extLst>
             <a:ext uri="{C572A759-6A51-4108-AA02-DFA0A04FC94B}">
-              <ma14:wrappingTextBoxFlag xmlns:ma14="http://schemas.microsoft.com/office/mac/drawingml/2011/main" xmlns:a14="http://schemas.microsoft.com/office/drawing/2010/main" xmlns:m="http://schemas.openxmlformats.org/officeDocument/2006/math" xmlns="" val="1"/>
+              <ma14:wrappingTextBoxFlag xmlns="" xmlns:m="http://schemas.openxmlformats.org/officeDocument/2006/math" xmlns:a14="http://schemas.microsoft.com/office/drawing/2010/main" xmlns:ma14="http://schemas.microsoft.com/office/mac/drawingml/2011/main" val="1"/>
             </a:ext>
           </a:extLst>
         </p:spPr>
@@ -4994,7 +8537,7 @@
           </a:ln>
           <a:extLst>
             <a:ext uri="{C572A759-6A51-4108-AA02-DFA0A04FC94B}">
-              <ma14:wrappingTextBoxFlag xmlns:ma14="http://schemas.microsoft.com/office/mac/drawingml/2011/main" xmlns:a14="http://schemas.microsoft.com/office/drawing/2010/main" xmlns:m="http://schemas.openxmlformats.org/officeDocument/2006/math" xmlns="" val="1"/>
+              <ma14:wrappingTextBoxFlag xmlns="" xmlns:m="http://schemas.openxmlformats.org/officeDocument/2006/math" xmlns:a14="http://schemas.microsoft.com/office/drawing/2010/main" xmlns:ma14="http://schemas.microsoft.com/office/mac/drawingml/2011/main" val="1"/>
             </a:ext>
           </a:extLst>
         </p:spPr>
@@ -5222,7 +8765,7 @@
             <a:effectLst/>
             <a:extLst>
               <a:ext uri="{C572A759-6A51-4108-AA02-DFA0A04FC94B}">
-                <ma14:wrappingTextBoxFlag xmlns:ma14="http://schemas.microsoft.com/office/mac/drawingml/2011/main" xmlns:a14="http://schemas.microsoft.com/office/drawing/2010/main" xmlns:m="http://schemas.openxmlformats.org/officeDocument/2006/math" xmlns="" val="1"/>
+                <ma14:wrappingTextBoxFlag xmlns="" xmlns:m="http://schemas.openxmlformats.org/officeDocument/2006/math" xmlns:a14="http://schemas.microsoft.com/office/drawing/2010/main" xmlns:ma14="http://schemas.microsoft.com/office/mac/drawingml/2011/main" val="1"/>
               </a:ext>
             </a:extLst>
           </p:spPr>
@@ -5365,7 +8908,7 @@
             <a:effectLst/>
             <a:extLst>
               <a:ext uri="{C572A759-6A51-4108-AA02-DFA0A04FC94B}">
-                <ma14:wrappingTextBoxFlag xmlns:ma14="http://schemas.microsoft.com/office/mac/drawingml/2011/main" xmlns:a14="http://schemas.microsoft.com/office/drawing/2010/main" xmlns:m="http://schemas.openxmlformats.org/officeDocument/2006/math" xmlns="" val="1"/>
+                <ma14:wrappingTextBoxFlag xmlns="" xmlns:m="http://schemas.openxmlformats.org/officeDocument/2006/math" xmlns:a14="http://schemas.microsoft.com/office/drawing/2010/main" xmlns:ma14="http://schemas.microsoft.com/office/mac/drawingml/2011/main" val="1"/>
               </a:ext>
             </a:extLst>
           </p:spPr>
@@ -5493,7 +9036,7 @@
               <a:effectLst/>
               <a:extLst>
                 <a:ext uri="{C572A759-6A51-4108-AA02-DFA0A04FC94B}">
-                  <ma14:wrappingTextBoxFlag xmlns:ma14="http://schemas.microsoft.com/office/mac/drawingml/2011/main" xmlns:a14="http://schemas.microsoft.com/office/drawing/2010/main" xmlns:m="http://schemas.openxmlformats.org/officeDocument/2006/math" xmlns="" val="1"/>
+                  <ma14:wrappingTextBoxFlag xmlns="" xmlns:m="http://schemas.openxmlformats.org/officeDocument/2006/math" xmlns:a14="http://schemas.microsoft.com/office/drawing/2010/main" xmlns:ma14="http://schemas.microsoft.com/office/mac/drawingml/2011/main" val="1"/>
                 </a:ext>
               </a:extLst>
             </p:spPr>
@@ -5605,7 +9148,7 @@
               <a:effectLst/>
               <a:extLst>
                 <a:ext uri="{C572A759-6A51-4108-AA02-DFA0A04FC94B}">
-                  <ma14:wrappingTextBoxFlag xmlns:ma14="http://schemas.microsoft.com/office/mac/drawingml/2011/main" xmlns:a14="http://schemas.microsoft.com/office/drawing/2010/main" xmlns:m="http://schemas.openxmlformats.org/officeDocument/2006/math" xmlns="" val="1"/>
+                  <ma14:wrappingTextBoxFlag xmlns="" xmlns:m="http://schemas.openxmlformats.org/officeDocument/2006/math" xmlns:a14="http://schemas.microsoft.com/office/drawing/2010/main" xmlns:ma14="http://schemas.microsoft.com/office/mac/drawingml/2011/main" val="1"/>
                 </a:ext>
               </a:extLst>
             </p:spPr>
@@ -5657,7 +9200,7 @@
             <a:effectLst/>
             <a:extLst>
               <a:ext uri="{C572A759-6A51-4108-AA02-DFA0A04FC94B}">
-                <ma14:wrappingTextBoxFlag xmlns:ma14="http://schemas.microsoft.com/office/mac/drawingml/2011/main" xmlns:a14="http://schemas.microsoft.com/office/drawing/2010/main" xmlns:m="http://schemas.openxmlformats.org/officeDocument/2006/math" xmlns="" val="1"/>
+                <ma14:wrappingTextBoxFlag xmlns="" xmlns:m="http://schemas.openxmlformats.org/officeDocument/2006/math" xmlns:a14="http://schemas.microsoft.com/office/drawing/2010/main" xmlns:ma14="http://schemas.microsoft.com/office/mac/drawingml/2011/main" val="1"/>
               </a:ext>
             </a:extLst>
           </p:spPr>
@@ -5774,7 +9317,7 @@
             <a:effectLst/>
             <a:extLst>
               <a:ext uri="{C572A759-6A51-4108-AA02-DFA0A04FC94B}">
-                <ma14:wrappingTextBoxFlag xmlns:ma14="http://schemas.microsoft.com/office/mac/drawingml/2011/main" xmlns:a14="http://schemas.microsoft.com/office/drawing/2010/main" xmlns:m="http://schemas.openxmlformats.org/officeDocument/2006/math" xmlns="" val="1"/>
+                <ma14:wrappingTextBoxFlag xmlns="" xmlns:m="http://schemas.openxmlformats.org/officeDocument/2006/math" xmlns:a14="http://schemas.microsoft.com/office/drawing/2010/main" xmlns:ma14="http://schemas.microsoft.com/office/mac/drawingml/2011/main" val="1"/>
               </a:ext>
             </a:extLst>
           </p:spPr>
@@ -5833,7 +9376,7 @@
             <a:effectLst/>
             <a:extLst>
               <a:ext uri="{C572A759-6A51-4108-AA02-DFA0A04FC94B}">
-                <ma14:wrappingTextBoxFlag xmlns:ma14="http://schemas.microsoft.com/office/mac/drawingml/2011/main" xmlns:a14="http://schemas.microsoft.com/office/drawing/2010/main" xmlns:m="http://schemas.openxmlformats.org/officeDocument/2006/math" xmlns="" val="1"/>
+                <ma14:wrappingTextBoxFlag xmlns="" xmlns:m="http://schemas.openxmlformats.org/officeDocument/2006/math" xmlns:a14="http://schemas.microsoft.com/office/drawing/2010/main" xmlns:ma14="http://schemas.microsoft.com/office/mac/drawingml/2011/main" val="1"/>
               </a:ext>
             </a:extLst>
           </p:spPr>
@@ -5951,7 +9494,7 @@
             <a:effectLst/>
             <a:extLst>
               <a:ext uri="{C572A759-6A51-4108-AA02-DFA0A04FC94B}">
-                <ma14:wrappingTextBoxFlag xmlns:ma14="http://schemas.microsoft.com/office/mac/drawingml/2011/main" xmlns:a14="http://schemas.microsoft.com/office/drawing/2010/main" xmlns:m="http://schemas.openxmlformats.org/officeDocument/2006/math" xmlns="" val="1"/>
+                <ma14:wrappingTextBoxFlag xmlns="" xmlns:m="http://schemas.openxmlformats.org/officeDocument/2006/math" xmlns:a14="http://schemas.microsoft.com/office/drawing/2010/main" xmlns:ma14="http://schemas.microsoft.com/office/mac/drawingml/2011/main" val="1"/>
               </a:ext>
             </a:extLst>
           </p:spPr>
@@ -6007,7 +9550,7 @@
             <a:effectLst/>
             <a:extLst>
               <a:ext uri="{C572A759-6A51-4108-AA02-DFA0A04FC94B}">
-                <ma14:wrappingTextBoxFlag xmlns:ma14="http://schemas.microsoft.com/office/mac/drawingml/2011/main" xmlns:a14="http://schemas.microsoft.com/office/drawing/2010/main" xmlns:m="http://schemas.openxmlformats.org/officeDocument/2006/math" xmlns="" val="1"/>
+                <ma14:wrappingTextBoxFlag xmlns="" xmlns:m="http://schemas.openxmlformats.org/officeDocument/2006/math" xmlns:a14="http://schemas.microsoft.com/office/drawing/2010/main" xmlns:ma14="http://schemas.microsoft.com/office/mac/drawingml/2011/main" val="1"/>
               </a:ext>
             </a:extLst>
           </p:spPr>
@@ -6124,7 +9667,7 @@
             <a:effectLst/>
             <a:extLst>
               <a:ext uri="{C572A759-6A51-4108-AA02-DFA0A04FC94B}">
-                <ma14:wrappingTextBoxFlag xmlns:ma14="http://schemas.microsoft.com/office/mac/drawingml/2011/main" xmlns:a14="http://schemas.microsoft.com/office/drawing/2010/main" xmlns:m="http://schemas.openxmlformats.org/officeDocument/2006/math" xmlns="" val="1"/>
+                <ma14:wrappingTextBoxFlag xmlns="" xmlns:m="http://schemas.openxmlformats.org/officeDocument/2006/math" xmlns:a14="http://schemas.microsoft.com/office/drawing/2010/main" xmlns:ma14="http://schemas.microsoft.com/office/mac/drawingml/2011/main" val="1"/>
               </a:ext>
             </a:extLst>
           </p:spPr>
@@ -6175,7 +9718,7 @@
             <a:effectLst/>
             <a:extLst>
               <a:ext uri="{C572A759-6A51-4108-AA02-DFA0A04FC94B}">
-                <ma14:wrappingTextBoxFlag xmlns:ma14="http://schemas.microsoft.com/office/mac/drawingml/2011/main" xmlns:a14="http://schemas.microsoft.com/office/drawing/2010/main" xmlns:m="http://schemas.openxmlformats.org/officeDocument/2006/math" xmlns="" val="1"/>
+                <ma14:wrappingTextBoxFlag xmlns="" xmlns:m="http://schemas.openxmlformats.org/officeDocument/2006/math" xmlns:a14="http://schemas.microsoft.com/office/drawing/2010/main" xmlns:ma14="http://schemas.microsoft.com/office/mac/drawingml/2011/main" val="1"/>
               </a:ext>
             </a:extLst>
           </p:spPr>
@@ -6296,7 +9839,7 @@
             <a:effectLst/>
             <a:extLst>
               <a:ext uri="{C572A759-6A51-4108-AA02-DFA0A04FC94B}">
-                <ma14:wrappingTextBoxFlag xmlns:ma14="http://schemas.microsoft.com/office/mac/drawingml/2011/main" xmlns:a14="http://schemas.microsoft.com/office/drawing/2010/main" xmlns:m="http://schemas.openxmlformats.org/officeDocument/2006/math" xmlns="" val="1"/>
+                <ma14:wrappingTextBoxFlag xmlns="" xmlns:m="http://schemas.openxmlformats.org/officeDocument/2006/math" xmlns:a14="http://schemas.microsoft.com/office/drawing/2010/main" xmlns:ma14="http://schemas.microsoft.com/office/mac/drawingml/2011/main" val="1"/>
               </a:ext>
             </a:extLst>
           </p:spPr>
@@ -6352,7 +9895,7 @@
             <a:effectLst/>
             <a:extLst>
               <a:ext uri="{C572A759-6A51-4108-AA02-DFA0A04FC94B}">
-                <ma14:wrappingTextBoxFlag xmlns:ma14="http://schemas.microsoft.com/office/mac/drawingml/2011/main" xmlns:a14="http://schemas.microsoft.com/office/drawing/2010/main" xmlns:m="http://schemas.openxmlformats.org/officeDocument/2006/math" xmlns="" val="1"/>
+                <ma14:wrappingTextBoxFlag xmlns="" xmlns:m="http://schemas.openxmlformats.org/officeDocument/2006/math" xmlns:a14="http://schemas.microsoft.com/office/drawing/2010/main" xmlns:ma14="http://schemas.microsoft.com/office/mac/drawingml/2011/main" val="1"/>
               </a:ext>
             </a:extLst>
           </p:spPr>
@@ -6470,7 +10013,7 @@
             <a:effectLst/>
             <a:extLst>
               <a:ext uri="{C572A759-6A51-4108-AA02-DFA0A04FC94B}">
-                <ma14:wrappingTextBoxFlag xmlns:ma14="http://schemas.microsoft.com/office/mac/drawingml/2011/main" xmlns:a14="http://schemas.microsoft.com/office/drawing/2010/main" xmlns:m="http://schemas.openxmlformats.org/officeDocument/2006/math" xmlns="" val="1"/>
+                <ma14:wrappingTextBoxFlag xmlns="" xmlns:m="http://schemas.openxmlformats.org/officeDocument/2006/math" xmlns:a14="http://schemas.microsoft.com/office/drawing/2010/main" xmlns:ma14="http://schemas.microsoft.com/office/mac/drawingml/2011/main" val="1"/>
               </a:ext>
             </a:extLst>
           </p:spPr>
@@ -6593,7 +10136,7 @@
               <a:effectLst/>
               <a:extLst>
                 <a:ext uri="{C572A759-6A51-4108-AA02-DFA0A04FC94B}">
-                  <ma14:wrappingTextBoxFlag xmlns:ma14="http://schemas.microsoft.com/office/mac/drawingml/2011/main" xmlns:a14="http://schemas.microsoft.com/office/drawing/2010/main" xmlns:m="http://schemas.openxmlformats.org/officeDocument/2006/math" xmlns="" val="1"/>
+                  <ma14:wrappingTextBoxFlag xmlns="" xmlns:m="http://schemas.openxmlformats.org/officeDocument/2006/math" xmlns:a14="http://schemas.microsoft.com/office/drawing/2010/main" xmlns:ma14="http://schemas.microsoft.com/office/mac/drawingml/2011/main" val="1"/>
                 </a:ext>
               </a:extLst>
             </p:spPr>
@@ -6704,7 +10247,7 @@
               <a:effectLst/>
               <a:extLst>
                 <a:ext uri="{C572A759-6A51-4108-AA02-DFA0A04FC94B}">
-                  <ma14:wrappingTextBoxFlag xmlns:ma14="http://schemas.microsoft.com/office/mac/drawingml/2011/main" xmlns:a14="http://schemas.microsoft.com/office/drawing/2010/main" xmlns:m="http://schemas.openxmlformats.org/officeDocument/2006/math" xmlns="" val="1"/>
+                  <ma14:wrappingTextBoxFlag xmlns="" xmlns:m="http://schemas.openxmlformats.org/officeDocument/2006/math" xmlns:a14="http://schemas.microsoft.com/office/drawing/2010/main" xmlns:ma14="http://schemas.microsoft.com/office/mac/drawingml/2011/main" val="1"/>
                 </a:ext>
               </a:extLst>
             </p:spPr>
@@ -6755,7 +10298,7 @@
             <a:effectLst/>
             <a:extLst>
               <a:ext uri="{C572A759-6A51-4108-AA02-DFA0A04FC94B}">
-                <ma14:wrappingTextBoxFlag xmlns:ma14="http://schemas.microsoft.com/office/mac/drawingml/2011/main" xmlns:a14="http://schemas.microsoft.com/office/drawing/2010/main" xmlns:m="http://schemas.openxmlformats.org/officeDocument/2006/math" xmlns="" val="1"/>
+                <ma14:wrappingTextBoxFlag xmlns="" xmlns:m="http://schemas.openxmlformats.org/officeDocument/2006/math" xmlns:a14="http://schemas.microsoft.com/office/drawing/2010/main" xmlns:ma14="http://schemas.microsoft.com/office/mac/drawingml/2011/main" val="1"/>
               </a:ext>
             </a:extLst>
           </p:spPr>
@@ -6872,7 +10415,7 @@
             <a:effectLst/>
             <a:extLst>
               <a:ext uri="{C572A759-6A51-4108-AA02-DFA0A04FC94B}">
-                <ma14:wrappingTextBoxFlag xmlns:ma14="http://schemas.microsoft.com/office/mac/drawingml/2011/main" xmlns:a14="http://schemas.microsoft.com/office/drawing/2010/main" xmlns:m="http://schemas.openxmlformats.org/officeDocument/2006/math" xmlns="" val="1"/>
+                <ma14:wrappingTextBoxFlag xmlns="" xmlns:m="http://schemas.openxmlformats.org/officeDocument/2006/math" xmlns:a14="http://schemas.microsoft.com/office/drawing/2010/main" xmlns:ma14="http://schemas.microsoft.com/office/mac/drawingml/2011/main" val="1"/>
               </a:ext>
             </a:extLst>
           </p:spPr>
@@ -6983,7 +10526,7 @@
               <a:effectLst/>
               <a:extLst>
                 <a:ext uri="{C572A759-6A51-4108-AA02-DFA0A04FC94B}">
-                  <ma14:wrappingTextBoxFlag xmlns:ma14="http://schemas.microsoft.com/office/mac/drawingml/2011/main" xmlns:a14="http://schemas.microsoft.com/office/drawing/2010/main" xmlns:m="http://schemas.openxmlformats.org/officeDocument/2006/math" xmlns="" val="1"/>
+                  <ma14:wrappingTextBoxFlag xmlns="" xmlns:m="http://schemas.openxmlformats.org/officeDocument/2006/math" xmlns:a14="http://schemas.microsoft.com/office/drawing/2010/main" xmlns:ma14="http://schemas.microsoft.com/office/mac/drawingml/2011/main" val="1"/>
                 </a:ext>
               </a:extLst>
             </p:spPr>
@@ -7094,7 +10637,7 @@
               <a:effectLst/>
               <a:extLst>
                 <a:ext uri="{C572A759-6A51-4108-AA02-DFA0A04FC94B}">
-                  <ma14:wrappingTextBoxFlag xmlns:ma14="http://schemas.microsoft.com/office/mac/drawingml/2011/main" xmlns:a14="http://schemas.microsoft.com/office/drawing/2010/main" xmlns:m="http://schemas.openxmlformats.org/officeDocument/2006/math" xmlns="" val="1"/>
+                  <ma14:wrappingTextBoxFlag xmlns="" xmlns:m="http://schemas.openxmlformats.org/officeDocument/2006/math" xmlns:a14="http://schemas.microsoft.com/office/drawing/2010/main" xmlns:ma14="http://schemas.microsoft.com/office/mac/drawingml/2011/main" val="1"/>
                 </a:ext>
               </a:extLst>
             </p:spPr>
@@ -7145,7 +10688,7 @@
             <a:effectLst/>
             <a:extLst>
               <a:ext uri="{C572A759-6A51-4108-AA02-DFA0A04FC94B}">
-                <ma14:wrappingTextBoxFlag xmlns:ma14="http://schemas.microsoft.com/office/mac/drawingml/2011/main" xmlns:a14="http://schemas.microsoft.com/office/drawing/2010/main" xmlns:m="http://schemas.openxmlformats.org/officeDocument/2006/math" xmlns="" val="1"/>
+                <ma14:wrappingTextBoxFlag xmlns="" xmlns:m="http://schemas.openxmlformats.org/officeDocument/2006/math" xmlns:a14="http://schemas.microsoft.com/office/drawing/2010/main" xmlns:ma14="http://schemas.microsoft.com/office/mac/drawingml/2011/main" val="1"/>
               </a:ext>
             </a:extLst>
           </p:spPr>
@@ -7262,7 +10805,7 @@
             <a:effectLst/>
             <a:extLst>
               <a:ext uri="{C572A759-6A51-4108-AA02-DFA0A04FC94B}">
-                <ma14:wrappingTextBoxFlag xmlns:ma14="http://schemas.microsoft.com/office/mac/drawingml/2011/main" xmlns:a14="http://schemas.microsoft.com/office/drawing/2010/main" xmlns:m="http://schemas.openxmlformats.org/officeDocument/2006/math" xmlns="" val="1"/>
+                <ma14:wrappingTextBoxFlag xmlns="" xmlns:m="http://schemas.openxmlformats.org/officeDocument/2006/math" xmlns:a14="http://schemas.microsoft.com/office/drawing/2010/main" xmlns:ma14="http://schemas.microsoft.com/office/mac/drawingml/2011/main" val="1"/>
               </a:ext>
             </a:extLst>
           </p:spPr>
@@ -7386,7 +10929,7 @@
               <a:effectLst/>
               <a:extLst>
                 <a:ext uri="{C572A759-6A51-4108-AA02-DFA0A04FC94B}">
-                  <ma14:wrappingTextBoxFlag xmlns:ma14="http://schemas.microsoft.com/office/mac/drawingml/2011/main" xmlns:a14="http://schemas.microsoft.com/office/drawing/2010/main" xmlns:m="http://schemas.openxmlformats.org/officeDocument/2006/math" xmlns="" val="1"/>
+                  <ma14:wrappingTextBoxFlag xmlns="" xmlns:m="http://schemas.openxmlformats.org/officeDocument/2006/math" xmlns:a14="http://schemas.microsoft.com/office/drawing/2010/main" xmlns:ma14="http://schemas.microsoft.com/office/mac/drawingml/2011/main" val="1"/>
                 </a:ext>
               </a:extLst>
             </p:spPr>
@@ -7497,7 +11040,7 @@
               <a:effectLst/>
               <a:extLst>
                 <a:ext uri="{C572A759-6A51-4108-AA02-DFA0A04FC94B}">
-                  <ma14:wrappingTextBoxFlag xmlns:ma14="http://schemas.microsoft.com/office/mac/drawingml/2011/main" xmlns:a14="http://schemas.microsoft.com/office/drawing/2010/main" xmlns:m="http://schemas.openxmlformats.org/officeDocument/2006/math" xmlns="" val="1"/>
+                  <ma14:wrappingTextBoxFlag xmlns="" xmlns:m="http://schemas.openxmlformats.org/officeDocument/2006/math" xmlns:a14="http://schemas.microsoft.com/office/drawing/2010/main" xmlns:ma14="http://schemas.microsoft.com/office/mac/drawingml/2011/main" val="1"/>
                 </a:ext>
               </a:extLst>
             </p:spPr>
@@ -7548,7 +11091,7 @@
             <a:effectLst/>
             <a:extLst>
               <a:ext uri="{C572A759-6A51-4108-AA02-DFA0A04FC94B}">
-                <ma14:wrappingTextBoxFlag xmlns:ma14="http://schemas.microsoft.com/office/mac/drawingml/2011/main" xmlns:a14="http://schemas.microsoft.com/office/drawing/2010/main" xmlns:m="http://schemas.openxmlformats.org/officeDocument/2006/math" xmlns="" val="1"/>
+                <ma14:wrappingTextBoxFlag xmlns="" xmlns:m="http://schemas.openxmlformats.org/officeDocument/2006/math" xmlns:a14="http://schemas.microsoft.com/office/drawing/2010/main" xmlns:ma14="http://schemas.microsoft.com/office/mac/drawingml/2011/main" val="1"/>
               </a:ext>
             </a:extLst>
           </p:spPr>
@@ -7596,7 +11139,7 @@
           </a:ln>
           <a:extLst>
             <a:ext uri="{C572A759-6A51-4108-AA02-DFA0A04FC94B}">
-              <ma14:wrappingTextBoxFlag xmlns:ma14="http://schemas.microsoft.com/office/mac/drawingml/2011/main" xmlns:a14="http://schemas.microsoft.com/office/drawing/2010/main" xmlns:m="http://schemas.openxmlformats.org/officeDocument/2006/math" xmlns="" val="1"/>
+              <ma14:wrappingTextBoxFlag xmlns="" xmlns:m="http://schemas.openxmlformats.org/officeDocument/2006/math" xmlns:a14="http://schemas.microsoft.com/office/drawing/2010/main" xmlns:ma14="http://schemas.microsoft.com/office/mac/drawingml/2011/main" val="1"/>
             </a:ext>
           </a:extLst>
         </p:spPr>
@@ -7753,7 +11296,7 @@
           </a:ln>
           <a:extLst>
             <a:ext uri="{C572A759-6A51-4108-AA02-DFA0A04FC94B}">
-              <ma14:wrappingTextBoxFlag xmlns:ma14="http://schemas.microsoft.com/office/mac/drawingml/2011/main" xmlns:a14="http://schemas.microsoft.com/office/drawing/2010/main" xmlns:m="http://schemas.openxmlformats.org/officeDocument/2006/math" xmlns="" val="1"/>
+              <ma14:wrappingTextBoxFlag xmlns="" xmlns:m="http://schemas.openxmlformats.org/officeDocument/2006/math" xmlns:a14="http://schemas.microsoft.com/office/drawing/2010/main" xmlns:ma14="http://schemas.microsoft.com/office/mac/drawingml/2011/main" val="1"/>
             </a:ext>
           </a:extLst>
         </p:spPr>
@@ -7825,7 +11368,7 @@
           </a:ln>
           <a:extLst>
             <a:ext uri="{C572A759-6A51-4108-AA02-DFA0A04FC94B}">
-              <ma14:wrappingTextBoxFlag xmlns:ma14="http://schemas.microsoft.com/office/mac/drawingml/2011/main" xmlns:a14="http://schemas.microsoft.com/office/drawing/2010/main" xmlns:m="http://schemas.openxmlformats.org/officeDocument/2006/math" xmlns="" val="1"/>
+              <ma14:wrappingTextBoxFlag xmlns="" xmlns:m="http://schemas.openxmlformats.org/officeDocument/2006/math" xmlns:a14="http://schemas.microsoft.com/office/drawing/2010/main" xmlns:ma14="http://schemas.microsoft.com/office/mac/drawingml/2011/main" val="1"/>
             </a:ext>
           </a:extLst>
         </p:spPr>
@@ -7897,7 +11440,7 @@
           </a:ln>
           <a:extLst>
             <a:ext uri="{C572A759-6A51-4108-AA02-DFA0A04FC94B}">
-              <ma14:wrappingTextBoxFlag xmlns:ma14="http://schemas.microsoft.com/office/mac/drawingml/2011/main" xmlns:a14="http://schemas.microsoft.com/office/drawing/2010/main" xmlns:m="http://schemas.openxmlformats.org/officeDocument/2006/math" xmlns="" val="1"/>
+              <ma14:wrappingTextBoxFlag xmlns="" xmlns:m="http://schemas.openxmlformats.org/officeDocument/2006/math" xmlns:a14="http://schemas.microsoft.com/office/drawing/2010/main" xmlns:ma14="http://schemas.microsoft.com/office/mac/drawingml/2011/main" val="1"/>
             </a:ext>
           </a:extLst>
         </p:spPr>
@@ -8024,7 +11567,7 @@
           </a:ln>
           <a:extLst>
             <a:ext uri="{C572A759-6A51-4108-AA02-DFA0A04FC94B}">
-              <ma14:wrappingTextBoxFlag xmlns:ma14="http://schemas.microsoft.com/office/mac/drawingml/2011/main" xmlns:a14="http://schemas.microsoft.com/office/drawing/2010/main" xmlns:m="http://schemas.openxmlformats.org/officeDocument/2006/math" xmlns="" val="1"/>
+              <ma14:wrappingTextBoxFlag xmlns="" xmlns:m="http://schemas.openxmlformats.org/officeDocument/2006/math" xmlns:a14="http://schemas.microsoft.com/office/drawing/2010/main" xmlns:ma14="http://schemas.microsoft.com/office/mac/drawingml/2011/main" val="1"/>
             </a:ext>
           </a:extLst>
         </p:spPr>
@@ -8114,7 +11657,7 @@
           </a:ln>
           <a:extLst>
             <a:ext uri="{C572A759-6A51-4108-AA02-DFA0A04FC94B}">
-              <ma14:wrappingTextBoxFlag xmlns:ma14="http://schemas.microsoft.com/office/mac/drawingml/2011/main" xmlns:a14="http://schemas.microsoft.com/office/drawing/2010/main" xmlns:m="http://schemas.openxmlformats.org/officeDocument/2006/math" xmlns="" val="1"/>
+              <ma14:wrappingTextBoxFlag xmlns="" xmlns:m="http://schemas.openxmlformats.org/officeDocument/2006/math" xmlns:a14="http://schemas.microsoft.com/office/drawing/2010/main" xmlns:ma14="http://schemas.microsoft.com/office/mac/drawingml/2011/main" val="1"/>
             </a:ext>
           </a:extLst>
         </p:spPr>
@@ -8163,7 +11706,7 @@
           </a:ln>
           <a:extLst>
             <a:ext uri="{C572A759-6A51-4108-AA02-DFA0A04FC94B}">
-              <ma14:wrappingTextBoxFlag xmlns:ma14="http://schemas.microsoft.com/office/mac/drawingml/2011/main" xmlns:a14="http://schemas.microsoft.com/office/drawing/2010/main" xmlns:m="http://schemas.openxmlformats.org/officeDocument/2006/math" xmlns="" val="1"/>
+              <ma14:wrappingTextBoxFlag xmlns="" xmlns:m="http://schemas.openxmlformats.org/officeDocument/2006/math" xmlns:a14="http://schemas.microsoft.com/office/drawing/2010/main" xmlns:ma14="http://schemas.microsoft.com/office/mac/drawingml/2011/main" val="1"/>
             </a:ext>
           </a:extLst>
         </p:spPr>
@@ -8212,7 +11755,7 @@
           </a:ln>
           <a:extLst>
             <a:ext uri="{C572A759-6A51-4108-AA02-DFA0A04FC94B}">
-              <ma14:wrappingTextBoxFlag xmlns:ma14="http://schemas.microsoft.com/office/mac/drawingml/2011/main" xmlns:a14="http://schemas.microsoft.com/office/drawing/2010/main" xmlns:m="http://schemas.openxmlformats.org/officeDocument/2006/math" xmlns="" val="1"/>
+              <ma14:wrappingTextBoxFlag xmlns="" xmlns:m="http://schemas.openxmlformats.org/officeDocument/2006/math" xmlns:a14="http://schemas.microsoft.com/office/drawing/2010/main" xmlns:ma14="http://schemas.microsoft.com/office/mac/drawingml/2011/main" val="1"/>
             </a:ext>
           </a:extLst>
         </p:spPr>
@@ -8325,7 +11868,7 @@
           </a:ln>
           <a:extLst>
             <a:ext uri="{C572A759-6A51-4108-AA02-DFA0A04FC94B}">
-              <ma14:wrappingTextBoxFlag xmlns:ma14="http://schemas.microsoft.com/office/mac/drawingml/2011/main" xmlns:a14="http://schemas.microsoft.com/office/drawing/2010/main" xmlns:m="http://schemas.openxmlformats.org/officeDocument/2006/math" xmlns="" val="1"/>
+              <ma14:wrappingTextBoxFlag xmlns="" xmlns:m="http://schemas.openxmlformats.org/officeDocument/2006/math" xmlns:a14="http://schemas.microsoft.com/office/drawing/2010/main" xmlns:ma14="http://schemas.microsoft.com/office/mac/drawingml/2011/main" val="1"/>
             </a:ext>
           </a:extLst>
         </p:spPr>
@@ -8919,7 +12462,7 @@
             <a:effectLst/>
             <a:extLst>
               <a:ext uri="{C572A759-6A51-4108-AA02-DFA0A04FC94B}">
-                <ma14:wrappingTextBoxFlag xmlns:ma14="http://schemas.microsoft.com/office/mac/drawingml/2011/main" xmlns:a14="http://schemas.microsoft.com/office/drawing/2010/main" xmlns:m="http://schemas.openxmlformats.org/officeDocument/2006/math" xmlns="" val="1"/>
+                <ma14:wrappingTextBoxFlag xmlns="" xmlns:m="http://schemas.openxmlformats.org/officeDocument/2006/math" xmlns:a14="http://schemas.microsoft.com/office/drawing/2010/main" xmlns:ma14="http://schemas.microsoft.com/office/mac/drawingml/2011/main" val="1"/>
               </a:ext>
             </a:extLst>
           </p:spPr>
@@ -8969,7 +12512,7 @@
             <a:effectLst/>
             <a:extLst>
               <a:ext uri="{C572A759-6A51-4108-AA02-DFA0A04FC94B}">
-                <ma14:wrappingTextBoxFlag xmlns:ma14="http://schemas.microsoft.com/office/mac/drawingml/2011/main" xmlns:a14="http://schemas.microsoft.com/office/drawing/2010/main" xmlns:m="http://schemas.openxmlformats.org/officeDocument/2006/math" xmlns="" val="1"/>
+                <ma14:wrappingTextBoxFlag xmlns="" xmlns:m="http://schemas.openxmlformats.org/officeDocument/2006/math" xmlns:a14="http://schemas.microsoft.com/office/drawing/2010/main" xmlns:ma14="http://schemas.microsoft.com/office/mac/drawingml/2011/main" val="1"/>
               </a:ext>
             </a:extLst>
           </p:spPr>
@@ -9072,7 +12615,7 @@
             <a:effectLst/>
             <a:extLst>
               <a:ext uri="{C572A759-6A51-4108-AA02-DFA0A04FC94B}">
-                <ma14:wrappingTextBoxFlag xmlns:ma14="http://schemas.microsoft.com/office/mac/drawingml/2011/main" xmlns:a14="http://schemas.microsoft.com/office/drawing/2010/main" xmlns:m="http://schemas.openxmlformats.org/officeDocument/2006/math" xmlns="" val="1"/>
+                <ma14:wrappingTextBoxFlag xmlns="" xmlns:m="http://schemas.openxmlformats.org/officeDocument/2006/math" xmlns:a14="http://schemas.microsoft.com/office/drawing/2010/main" xmlns:ma14="http://schemas.microsoft.com/office/mac/drawingml/2011/main" val="1"/>
               </a:ext>
             </a:extLst>
           </p:spPr>
@@ -9122,7 +12665,7 @@
             <a:effectLst/>
             <a:extLst>
               <a:ext uri="{C572A759-6A51-4108-AA02-DFA0A04FC94B}">
-                <ma14:wrappingTextBoxFlag xmlns:ma14="http://schemas.microsoft.com/office/mac/drawingml/2011/main" xmlns:a14="http://schemas.microsoft.com/office/drawing/2010/main" xmlns:m="http://schemas.openxmlformats.org/officeDocument/2006/math" xmlns="" val="1"/>
+                <ma14:wrappingTextBoxFlag xmlns="" xmlns:m="http://schemas.openxmlformats.org/officeDocument/2006/math" xmlns:a14="http://schemas.microsoft.com/office/drawing/2010/main" xmlns:ma14="http://schemas.microsoft.com/office/mac/drawingml/2011/main" val="1"/>
               </a:ext>
             </a:extLst>
           </p:spPr>
@@ -9225,7 +12768,7 @@
             <a:effectLst/>
             <a:extLst>
               <a:ext uri="{C572A759-6A51-4108-AA02-DFA0A04FC94B}">
-                <ma14:wrappingTextBoxFlag xmlns:ma14="http://schemas.microsoft.com/office/mac/drawingml/2011/main" xmlns:a14="http://schemas.microsoft.com/office/drawing/2010/main" xmlns:m="http://schemas.openxmlformats.org/officeDocument/2006/math" xmlns="" val="1"/>
+                <ma14:wrappingTextBoxFlag xmlns="" xmlns:m="http://schemas.openxmlformats.org/officeDocument/2006/math" xmlns:a14="http://schemas.microsoft.com/office/drawing/2010/main" xmlns:ma14="http://schemas.microsoft.com/office/mac/drawingml/2011/main" val="1"/>
               </a:ext>
             </a:extLst>
           </p:spPr>
@@ -9274,7 +12817,7 @@
             <a:effectLst/>
             <a:extLst>
               <a:ext uri="{C572A759-6A51-4108-AA02-DFA0A04FC94B}">
-                <ma14:wrappingTextBoxFlag xmlns:ma14="http://schemas.microsoft.com/office/mac/drawingml/2011/main" xmlns:a14="http://schemas.microsoft.com/office/drawing/2010/main" xmlns:m="http://schemas.openxmlformats.org/officeDocument/2006/math" xmlns="" val="1"/>
+                <ma14:wrappingTextBoxFlag xmlns="" xmlns:m="http://schemas.openxmlformats.org/officeDocument/2006/math" xmlns:a14="http://schemas.microsoft.com/office/drawing/2010/main" xmlns:ma14="http://schemas.microsoft.com/office/mac/drawingml/2011/main" val="1"/>
               </a:ext>
             </a:extLst>
           </p:spPr>
@@ -9377,7 +12920,7 @@
             <a:effectLst/>
             <a:extLst>
               <a:ext uri="{C572A759-6A51-4108-AA02-DFA0A04FC94B}">
-                <ma14:wrappingTextBoxFlag xmlns:ma14="http://schemas.microsoft.com/office/mac/drawingml/2011/main" xmlns:a14="http://schemas.microsoft.com/office/drawing/2010/main" xmlns:m="http://schemas.openxmlformats.org/officeDocument/2006/math" xmlns="" val="1"/>
+                <ma14:wrappingTextBoxFlag xmlns="" xmlns:m="http://schemas.openxmlformats.org/officeDocument/2006/math" xmlns:a14="http://schemas.microsoft.com/office/drawing/2010/main" xmlns:ma14="http://schemas.microsoft.com/office/mac/drawingml/2011/main" val="1"/>
               </a:ext>
             </a:extLst>
           </p:spPr>
@@ -9427,7 +12970,7 @@
             <a:effectLst/>
             <a:extLst>
               <a:ext uri="{C572A759-6A51-4108-AA02-DFA0A04FC94B}">
-                <ma14:wrappingTextBoxFlag xmlns:ma14="http://schemas.microsoft.com/office/mac/drawingml/2011/main" xmlns:a14="http://schemas.microsoft.com/office/drawing/2010/main" xmlns:m="http://schemas.openxmlformats.org/officeDocument/2006/math" xmlns="" val="1"/>
+                <ma14:wrappingTextBoxFlag xmlns="" xmlns:m="http://schemas.openxmlformats.org/officeDocument/2006/math" xmlns:a14="http://schemas.microsoft.com/office/drawing/2010/main" xmlns:ma14="http://schemas.microsoft.com/office/mac/drawingml/2011/main" val="1"/>
               </a:ext>
             </a:extLst>
           </p:spPr>
@@ -9530,7 +13073,7 @@
             <a:effectLst/>
             <a:extLst>
               <a:ext uri="{C572A759-6A51-4108-AA02-DFA0A04FC94B}">
-                <ma14:wrappingTextBoxFlag xmlns:ma14="http://schemas.microsoft.com/office/mac/drawingml/2011/main" xmlns:a14="http://schemas.microsoft.com/office/drawing/2010/main" xmlns:m="http://schemas.openxmlformats.org/officeDocument/2006/math" xmlns="" val="1"/>
+                <ma14:wrappingTextBoxFlag xmlns="" xmlns:m="http://schemas.openxmlformats.org/officeDocument/2006/math" xmlns:a14="http://schemas.microsoft.com/office/drawing/2010/main" xmlns:ma14="http://schemas.microsoft.com/office/mac/drawingml/2011/main" val="1"/>
               </a:ext>
             </a:extLst>
           </p:spPr>
@@ -9580,7 +13123,7 @@
             <a:effectLst/>
             <a:extLst>
               <a:ext uri="{C572A759-6A51-4108-AA02-DFA0A04FC94B}">
-                <ma14:wrappingTextBoxFlag xmlns:ma14="http://schemas.microsoft.com/office/mac/drawingml/2011/main" xmlns:a14="http://schemas.microsoft.com/office/drawing/2010/main" xmlns:m="http://schemas.openxmlformats.org/officeDocument/2006/math" xmlns="" val="1"/>
+                <ma14:wrappingTextBoxFlag xmlns="" xmlns:m="http://schemas.openxmlformats.org/officeDocument/2006/math" xmlns:a14="http://schemas.microsoft.com/office/drawing/2010/main" xmlns:ma14="http://schemas.microsoft.com/office/mac/drawingml/2011/main" val="1"/>
               </a:ext>
             </a:extLst>
           </p:spPr>
@@ -9684,7 +13227,7 @@
             <a:effectLst/>
             <a:extLst>
               <a:ext uri="{C572A759-6A51-4108-AA02-DFA0A04FC94B}">
-                <ma14:wrappingTextBoxFlag xmlns:ma14="http://schemas.microsoft.com/office/mac/drawingml/2011/main" xmlns:a14="http://schemas.microsoft.com/office/drawing/2010/main" xmlns:m="http://schemas.openxmlformats.org/officeDocument/2006/math" xmlns="" val="1"/>
+                <ma14:wrappingTextBoxFlag xmlns="" xmlns:m="http://schemas.openxmlformats.org/officeDocument/2006/math" xmlns:a14="http://schemas.microsoft.com/office/drawing/2010/main" xmlns:ma14="http://schemas.microsoft.com/office/mac/drawingml/2011/main" val="1"/>
               </a:ext>
             </a:extLst>
           </p:spPr>
@@ -9734,7 +13277,7 @@
             <a:effectLst/>
             <a:extLst>
               <a:ext uri="{C572A759-6A51-4108-AA02-DFA0A04FC94B}">
-                <ma14:wrappingTextBoxFlag xmlns:ma14="http://schemas.microsoft.com/office/mac/drawingml/2011/main" xmlns:a14="http://schemas.microsoft.com/office/drawing/2010/main" xmlns:m="http://schemas.openxmlformats.org/officeDocument/2006/math" xmlns="" val="1"/>
+                <ma14:wrappingTextBoxFlag xmlns="" xmlns:m="http://schemas.openxmlformats.org/officeDocument/2006/math" xmlns:a14="http://schemas.microsoft.com/office/drawing/2010/main" xmlns:ma14="http://schemas.microsoft.com/office/mac/drawingml/2011/main" val="1"/>
               </a:ext>
             </a:extLst>
           </p:spPr>
@@ -9837,7 +13380,7 @@
             <a:effectLst/>
             <a:extLst>
               <a:ext uri="{C572A759-6A51-4108-AA02-DFA0A04FC94B}">
-                <ma14:wrappingTextBoxFlag xmlns:ma14="http://schemas.microsoft.com/office/mac/drawingml/2011/main" xmlns:a14="http://schemas.microsoft.com/office/drawing/2010/main" xmlns:m="http://schemas.openxmlformats.org/officeDocument/2006/math" xmlns="" val="1"/>
+                <ma14:wrappingTextBoxFlag xmlns="" xmlns:m="http://schemas.openxmlformats.org/officeDocument/2006/math" xmlns:a14="http://schemas.microsoft.com/office/drawing/2010/main" xmlns:ma14="http://schemas.microsoft.com/office/mac/drawingml/2011/main" val="1"/>
               </a:ext>
             </a:extLst>
           </p:spPr>
@@ -9887,7 +13430,7 @@
             <a:effectLst/>
             <a:extLst>
               <a:ext uri="{C572A759-6A51-4108-AA02-DFA0A04FC94B}">
-                <ma14:wrappingTextBoxFlag xmlns:ma14="http://schemas.microsoft.com/office/mac/drawingml/2011/main" xmlns:a14="http://schemas.microsoft.com/office/drawing/2010/main" xmlns:m="http://schemas.openxmlformats.org/officeDocument/2006/math" xmlns="" val="1"/>
+                <ma14:wrappingTextBoxFlag xmlns="" xmlns:m="http://schemas.openxmlformats.org/officeDocument/2006/math" xmlns:a14="http://schemas.microsoft.com/office/drawing/2010/main" xmlns:ma14="http://schemas.microsoft.com/office/mac/drawingml/2011/main" val="1"/>
               </a:ext>
             </a:extLst>
           </p:spPr>
@@ -9990,7 +13533,7 @@
             <a:effectLst/>
             <a:extLst>
               <a:ext uri="{C572A759-6A51-4108-AA02-DFA0A04FC94B}">
-                <ma14:wrappingTextBoxFlag xmlns:ma14="http://schemas.microsoft.com/office/mac/drawingml/2011/main" xmlns:a14="http://schemas.microsoft.com/office/drawing/2010/main" xmlns:m="http://schemas.openxmlformats.org/officeDocument/2006/math" xmlns="" val="1"/>
+                <ma14:wrappingTextBoxFlag xmlns="" xmlns:m="http://schemas.openxmlformats.org/officeDocument/2006/math" xmlns:a14="http://schemas.microsoft.com/office/drawing/2010/main" xmlns:ma14="http://schemas.microsoft.com/office/mac/drawingml/2011/main" val="1"/>
               </a:ext>
             </a:extLst>
           </p:spPr>
@@ -10040,7 +13583,7 @@
             <a:effectLst/>
             <a:extLst>
               <a:ext uri="{C572A759-6A51-4108-AA02-DFA0A04FC94B}">
-                <ma14:wrappingTextBoxFlag xmlns:ma14="http://schemas.microsoft.com/office/mac/drawingml/2011/main" xmlns:a14="http://schemas.microsoft.com/office/drawing/2010/main" xmlns:m="http://schemas.openxmlformats.org/officeDocument/2006/math" xmlns="" val="1"/>
+                <ma14:wrappingTextBoxFlag xmlns="" xmlns:m="http://schemas.openxmlformats.org/officeDocument/2006/math" xmlns:a14="http://schemas.microsoft.com/office/drawing/2010/main" xmlns:ma14="http://schemas.microsoft.com/office/mac/drawingml/2011/main" val="1"/>
               </a:ext>
             </a:extLst>
           </p:spPr>
@@ -10143,7 +13686,7 @@
             <a:effectLst/>
             <a:extLst>
               <a:ext uri="{C572A759-6A51-4108-AA02-DFA0A04FC94B}">
-                <ma14:wrappingTextBoxFlag xmlns:ma14="http://schemas.microsoft.com/office/mac/drawingml/2011/main" xmlns:a14="http://schemas.microsoft.com/office/drawing/2010/main" xmlns:m="http://schemas.openxmlformats.org/officeDocument/2006/math" xmlns="" val="1"/>
+                <ma14:wrappingTextBoxFlag xmlns="" xmlns:m="http://schemas.openxmlformats.org/officeDocument/2006/math" xmlns:a14="http://schemas.microsoft.com/office/drawing/2010/main" xmlns:ma14="http://schemas.microsoft.com/office/mac/drawingml/2011/main" val="1"/>
               </a:ext>
             </a:extLst>
           </p:spPr>
@@ -10192,7 +13735,7 @@
             <a:effectLst/>
             <a:extLst>
               <a:ext uri="{C572A759-6A51-4108-AA02-DFA0A04FC94B}">
-                <ma14:wrappingTextBoxFlag xmlns:ma14="http://schemas.microsoft.com/office/mac/drawingml/2011/main" xmlns:a14="http://schemas.microsoft.com/office/drawing/2010/main" xmlns:m="http://schemas.openxmlformats.org/officeDocument/2006/math" xmlns="" val="1"/>
+                <ma14:wrappingTextBoxFlag xmlns="" xmlns:m="http://schemas.openxmlformats.org/officeDocument/2006/math" xmlns:a14="http://schemas.microsoft.com/office/drawing/2010/main" xmlns:ma14="http://schemas.microsoft.com/office/mac/drawingml/2011/main" val="1"/>
               </a:ext>
             </a:extLst>
           </p:spPr>
@@ -10388,7 +13931,7 @@
           <a:effectLst/>
           <a:extLst>
             <a:ext uri="{C572A759-6A51-4108-AA02-DFA0A04FC94B}">
-              <ma14:wrappingTextBoxFlag xmlns:ma14="http://schemas.microsoft.com/office/mac/drawingml/2011/main" xmlns:a14="http://schemas.microsoft.com/office/drawing/2010/main" xmlns:m="http://schemas.openxmlformats.org/officeDocument/2006/math" xmlns="" val="1"/>
+              <ma14:wrappingTextBoxFlag xmlns="" xmlns:m="http://schemas.openxmlformats.org/officeDocument/2006/math" xmlns:a14="http://schemas.microsoft.com/office/drawing/2010/main" xmlns:ma14="http://schemas.microsoft.com/office/mac/drawingml/2011/main" val="1"/>
             </a:ext>
           </a:extLst>
         </p:spPr>
@@ -10437,7 +13980,7 @@
           </a:ln>
           <a:extLst>
             <a:ext uri="{C572A759-6A51-4108-AA02-DFA0A04FC94B}">
-              <ma14:wrappingTextBoxFlag xmlns:ma14="http://schemas.microsoft.com/office/mac/drawingml/2011/main" xmlns:a14="http://schemas.microsoft.com/office/drawing/2010/main" xmlns:m="http://schemas.openxmlformats.org/officeDocument/2006/math" xmlns="" val="1"/>
+              <ma14:wrappingTextBoxFlag xmlns="" xmlns:m="http://schemas.openxmlformats.org/officeDocument/2006/math" xmlns:a14="http://schemas.microsoft.com/office/drawing/2010/main" xmlns:ma14="http://schemas.microsoft.com/office/mac/drawingml/2011/main" val="1"/>
             </a:ext>
           </a:extLst>
         </p:spPr>
@@ -10539,7 +14082,7 @@
           <a:effectLst/>
           <a:extLst>
             <a:ext uri="{C572A759-6A51-4108-AA02-DFA0A04FC94B}">
-              <ma14:wrappingTextBoxFlag xmlns:ma14="http://schemas.microsoft.com/office/mac/drawingml/2011/main" xmlns:a14="http://schemas.microsoft.com/office/drawing/2010/main" xmlns:m="http://schemas.openxmlformats.org/officeDocument/2006/math" xmlns="" val="1"/>
+              <ma14:wrappingTextBoxFlag xmlns="" xmlns:m="http://schemas.openxmlformats.org/officeDocument/2006/math" xmlns:a14="http://schemas.microsoft.com/office/drawing/2010/main" xmlns:ma14="http://schemas.microsoft.com/office/mac/drawingml/2011/main" val="1"/>
             </a:ext>
           </a:extLst>
         </p:spPr>
@@ -10875,7 +14418,7 @@
           </a:ln>
           <a:extLst>
             <a:ext uri="{C572A759-6A51-4108-AA02-DFA0A04FC94B}">
-              <ma14:wrappingTextBoxFlag xmlns:ma14="http://schemas.microsoft.com/office/mac/drawingml/2011/main" xmlns:a14="http://schemas.microsoft.com/office/drawing/2010/main" xmlns:m="http://schemas.openxmlformats.org/officeDocument/2006/math" xmlns="" val="1"/>
+              <ma14:wrappingTextBoxFlag xmlns="" xmlns:m="http://schemas.openxmlformats.org/officeDocument/2006/math" xmlns:a14="http://schemas.microsoft.com/office/drawing/2010/main" xmlns:ma14="http://schemas.microsoft.com/office/mac/drawingml/2011/main" val="1"/>
             </a:ext>
           </a:extLst>
         </p:spPr>
@@ -11207,7 +14750,7 @@
           </a:ln>
           <a:extLst>
             <a:ext uri="{C572A759-6A51-4108-AA02-DFA0A04FC94B}">
-              <ma14:wrappingTextBoxFlag xmlns:ma14="http://schemas.microsoft.com/office/mac/drawingml/2011/main" xmlns:a14="http://schemas.microsoft.com/office/drawing/2010/main" xmlns:m="http://schemas.openxmlformats.org/officeDocument/2006/math" xmlns="" val="1"/>
+              <ma14:wrappingTextBoxFlag xmlns="" xmlns:m="http://schemas.openxmlformats.org/officeDocument/2006/math" xmlns:a14="http://schemas.microsoft.com/office/drawing/2010/main" xmlns:ma14="http://schemas.microsoft.com/office/mac/drawingml/2011/main" val="1"/>
             </a:ext>
           </a:extLst>
         </p:spPr>
@@ -11797,7 +15340,7 @@
           </a:ln>
           <a:extLst>
             <a:ext uri="{C572A759-6A51-4108-AA02-DFA0A04FC94B}">
-              <ma14:wrappingTextBoxFlag xmlns:ma14="http://schemas.microsoft.com/office/mac/drawingml/2011/main" xmlns:a14="http://schemas.microsoft.com/office/drawing/2010/main" xmlns:m="http://schemas.openxmlformats.org/officeDocument/2006/math" xmlns="" val="1"/>
+              <ma14:wrappingTextBoxFlag xmlns="" xmlns:m="http://schemas.openxmlformats.org/officeDocument/2006/math" xmlns:a14="http://schemas.microsoft.com/office/drawing/2010/main" xmlns:ma14="http://schemas.microsoft.com/office/mac/drawingml/2011/main" val="1"/>
             </a:ext>
           </a:extLst>
         </p:spPr>
@@ -11918,7 +15461,7 @@
           </a:ln>
           <a:extLst>
             <a:ext uri="{C572A759-6A51-4108-AA02-DFA0A04FC94B}">
-              <ma14:wrappingTextBoxFlag xmlns:ma14="http://schemas.microsoft.com/office/mac/drawingml/2011/main" xmlns:a14="http://schemas.microsoft.com/office/drawing/2010/main" xmlns:m="http://schemas.openxmlformats.org/officeDocument/2006/math" xmlns="" val="1"/>
+              <ma14:wrappingTextBoxFlag xmlns="" xmlns:m="http://schemas.openxmlformats.org/officeDocument/2006/math" xmlns:a14="http://schemas.microsoft.com/office/drawing/2010/main" xmlns:ma14="http://schemas.microsoft.com/office/mac/drawingml/2011/main" val="1"/>
             </a:ext>
           </a:extLst>
         </p:spPr>
@@ -11970,7 +15513,7 @@
           </a:ln>
           <a:extLst>
             <a:ext uri="{C572A759-6A51-4108-AA02-DFA0A04FC94B}">
-              <ma14:wrappingTextBoxFlag xmlns:ma14="http://schemas.microsoft.com/office/mac/drawingml/2011/main" xmlns:a14="http://schemas.microsoft.com/office/drawing/2010/main" xmlns:m="http://schemas.openxmlformats.org/officeDocument/2006/math" xmlns="" val="1"/>
+              <ma14:wrappingTextBoxFlag xmlns="" xmlns:m="http://schemas.openxmlformats.org/officeDocument/2006/math" xmlns:a14="http://schemas.microsoft.com/office/drawing/2010/main" xmlns:ma14="http://schemas.microsoft.com/office/mac/drawingml/2011/main" val="1"/>
             </a:ext>
           </a:extLst>
         </p:spPr>
@@ -12056,7 +15599,7 @@
       </p:grpSpPr>
       <p:sp>
         <p:nvSpPr>
-          <p:cNvPr id="301" name="Rectángulo 3"/>
+          <p:cNvPr id="296" name="Rectángulo 3"/>
           <p:cNvSpPr/>
           <p:nvPr/>
         </p:nvSpPr>
@@ -12090,9 +15633,107 @@
           </a:p>
         </p:txBody>
       </p:sp>
+      <p:sp>
+        <p:nvSpPr>
+          <p:cNvPr id="297" name="Title 1"/>
+          <p:cNvSpPr txBox="1"/>
+          <p:nvPr/>
+        </p:nvSpPr>
+        <p:spPr>
+          <a:xfrm>
+            <a:off x="572754" y="2270924"/>
+            <a:ext cx="8320421" cy="923330"/>
+          </a:xfrm>
+          <a:prstGeom prst="rect">
+            <a:avLst/>
+          </a:prstGeom>
+          <a:ln w="12700">
+            <a:miter lim="400000"/>
+          </a:ln>
+          <a:extLst>
+            <a:ext uri="{C572A759-6A51-4108-AA02-DFA0A04FC94B}">
+              <ma14:wrappingTextBoxFlag xmlns:ma14="http://schemas.microsoft.com/office/mac/drawingml/2011/main" xmlns:a14="http://schemas.microsoft.com/office/drawing/2010/main" xmlns:m="http://schemas.openxmlformats.org/officeDocument/2006/math" xmlns="" val="1"/>
+            </a:ext>
+          </a:extLst>
+        </p:spPr>
+        <p:txBody>
+          <a:bodyPr lIns="0" tIns="0" rIns="0" bIns="0" anchor="t">
+            <a:spAutoFit/>
+          </a:bodyPr>
+          <a:lstStyle>
+            <a:lvl1pPr>
+              <a:tabLst>
+                <a:tab pos="88900" algn="l"/>
+              </a:tabLst>
+              <a:defRPr sz="7200" spc="-300">
+                <a:solidFill>
+                  <a:srgbClr val="242415"/>
+                </a:solidFill>
+                <a:latin typeface="Montserrat SemiBold"/>
+                <a:ea typeface="Montserrat SemiBold"/>
+                <a:cs typeface="Montserrat SemiBold"/>
+                <a:sym typeface="Montserrat SemiBold"/>
+              </a:defRPr>
+            </a:lvl1pPr>
+          </a:lstStyle>
+          <a:p>
+            <a:r>
+              <a:rPr lang="es-ES_tradnl" sz="6000" dirty="0"/>
+              <a:t>Programación funcional</a:t>
+            </a:r>
+          </a:p>
+        </p:txBody>
+      </p:sp>
+      <p:sp>
+        <p:nvSpPr>
+          <p:cNvPr id="298" name="Title 1"/>
+          <p:cNvSpPr txBox="1"/>
+          <p:nvPr/>
+        </p:nvSpPr>
+        <p:spPr>
+          <a:xfrm>
+            <a:off x="647699" y="3442251"/>
+            <a:ext cx="8245476" cy="756001"/>
+          </a:xfrm>
+          <a:prstGeom prst="rect">
+            <a:avLst/>
+          </a:prstGeom>
+          <a:ln w="12700">
+            <a:miter lim="400000"/>
+          </a:ln>
+          <a:extLst>
+            <a:ext uri="{C572A759-6A51-4108-AA02-DFA0A04FC94B}">
+              <ma14:wrappingTextBoxFlag xmlns:ma14="http://schemas.microsoft.com/office/mac/drawingml/2011/main" xmlns:a14="http://schemas.microsoft.com/office/drawing/2010/main" xmlns:m="http://schemas.openxmlformats.org/officeDocument/2006/math" xmlns="" val="1"/>
+            </a:ext>
+          </a:extLst>
+        </p:spPr>
+        <p:txBody>
+          <a:bodyPr lIns="0" tIns="0" rIns="0" bIns="0" anchor="b">
+            <a:normAutofit/>
+          </a:bodyPr>
+          <a:lstStyle>
+            <a:lvl1pPr>
+              <a:defRPr sz="3900" spc="-200">
+                <a:solidFill>
+                  <a:srgbClr val="FFFFFF"/>
+                </a:solidFill>
+                <a:latin typeface="Open Sans"/>
+                <a:ea typeface="Open Sans"/>
+                <a:cs typeface="Open Sans"/>
+                <a:sym typeface="Open Sans"/>
+              </a:defRPr>
+            </a:lvl1pPr>
+          </a:lstStyle>
+          <a:p>
+            <a:r>
+              <a:t>Introducción</a:t>
+            </a:r>
+          </a:p>
+        </p:txBody>
+      </p:sp>
       <p:pic>
         <p:nvPicPr>
-          <p:cNvPr id="302" name="Gráfico 10" descr="Gráfico 10"/>
+          <p:cNvPr id="299" name="Gráfico 9" descr="Gráfico 9"/>
           <p:cNvPicPr>
             <a:picLocks noChangeAspect="1"/>
           </p:cNvPicPr>
@@ -12102,14 +15743,15 @@
           <a:blip r:embed="rId2">
             <a:extLst/>
           </a:blip>
+          <a:srcRect l="50688" r="13872" b="52337"/>
           <a:stretch>
             <a:fillRect/>
           </a:stretch>
         </p:blipFill>
         <p:spPr>
-          <a:xfrm>
-            <a:off x="2207873" y="765889"/>
-            <a:ext cx="4728254" cy="1696294"/>
+          <a:xfrm rot="16200000">
+            <a:off x="7494248" y="3493747"/>
+            <a:ext cx="1701969" cy="1597538"/>
           </a:xfrm>
           <a:prstGeom prst="rect">
             <a:avLst/>
@@ -12119,338 +15761,12 @@
           </a:ln>
         </p:spPr>
       </p:pic>
-      <p:pic>
-        <p:nvPicPr>
-          <p:cNvPr id="303" name="Gráfico 13" descr="Gráfico 13"/>
-          <p:cNvPicPr>
-            <a:picLocks noChangeAspect="1"/>
-          </p:cNvPicPr>
-          <p:nvPr/>
-        </p:nvPicPr>
-        <p:blipFill>
-          <a:blip r:embed="rId3">
-            <a:extLst/>
-          </a:blip>
-          <a:stretch>
-            <a:fillRect/>
-          </a:stretch>
-        </p:blipFill>
-        <p:spPr>
-          <a:xfrm>
-            <a:off x="4218292" y="4329110"/>
-            <a:ext cx="360001" cy="360001"/>
-          </a:xfrm>
-          <a:prstGeom prst="rect">
-            <a:avLst/>
-          </a:prstGeom>
-          <a:ln w="12700">
-            <a:miter lim="400000"/>
-          </a:ln>
-        </p:spPr>
-      </p:pic>
-      <p:pic>
-        <p:nvPicPr>
-          <p:cNvPr id="304" name="Gráfico 15" descr="Gráfico 15"/>
-          <p:cNvPicPr>
-            <a:picLocks noChangeAspect="1"/>
-          </p:cNvPicPr>
-          <p:nvPr/>
-        </p:nvPicPr>
-        <p:blipFill>
-          <a:blip r:embed="rId4">
-            <a:extLst/>
-          </a:blip>
-          <a:stretch>
-            <a:fillRect/>
-          </a:stretch>
-        </p:blipFill>
-        <p:spPr>
-          <a:xfrm>
-            <a:off x="4218292" y="3786080"/>
-            <a:ext cx="360001" cy="360001"/>
-          </a:xfrm>
-          <a:prstGeom prst="rect">
-            <a:avLst/>
-          </a:prstGeom>
-          <a:ln w="12700">
-            <a:miter lim="400000"/>
-          </a:ln>
-        </p:spPr>
-      </p:pic>
-      <p:pic>
-        <p:nvPicPr>
-          <p:cNvPr id="305" name="Gráfico 17" descr="Gráfico 17"/>
-          <p:cNvPicPr>
-            <a:picLocks noChangeAspect="1"/>
-          </p:cNvPicPr>
-          <p:nvPr/>
-        </p:nvPicPr>
-        <p:blipFill>
-          <a:blip r:embed="rId5">
-            <a:extLst/>
-          </a:blip>
-          <a:stretch>
-            <a:fillRect/>
-          </a:stretch>
-        </p:blipFill>
-        <p:spPr>
-          <a:xfrm>
-            <a:off x="1365921" y="4333776"/>
-            <a:ext cx="360001" cy="360001"/>
-          </a:xfrm>
-          <a:prstGeom prst="rect">
-            <a:avLst/>
-          </a:prstGeom>
-          <a:ln w="12700">
-            <a:miter lim="400000"/>
-          </a:ln>
-        </p:spPr>
-      </p:pic>
-      <p:pic>
-        <p:nvPicPr>
-          <p:cNvPr id="306" name="Gráfico 2" descr="Gráfico 2"/>
-          <p:cNvPicPr>
-            <a:picLocks noChangeAspect="1"/>
-          </p:cNvPicPr>
-          <p:nvPr/>
-        </p:nvPicPr>
-        <p:blipFill>
-          <a:blip r:embed="rId6">
-            <a:extLst/>
-          </a:blip>
-          <a:stretch>
-            <a:fillRect/>
-          </a:stretch>
-        </p:blipFill>
-        <p:spPr>
-          <a:xfrm>
-            <a:off x="1365921" y="3800404"/>
-            <a:ext cx="360001" cy="360001"/>
-          </a:xfrm>
-          <a:prstGeom prst="rect">
-            <a:avLst/>
-          </a:prstGeom>
-          <a:ln w="12700">
-            <a:miter lim="400000"/>
-          </a:ln>
-        </p:spPr>
-      </p:pic>
-      <p:grpSp>
-        <p:nvGrpSpPr>
-          <p:cNvPr id="311" name="Grupo 5"/>
-          <p:cNvGrpSpPr/>
-          <p:nvPr/>
-        </p:nvGrpSpPr>
-        <p:grpSpPr>
-          <a:xfrm>
-            <a:off x="1771311" y="3781414"/>
-            <a:ext cx="6298731" cy="918538"/>
-            <a:chOff x="0" y="0"/>
-            <a:chExt cx="6298730" cy="918537"/>
-          </a:xfrm>
-        </p:grpSpPr>
-        <p:sp>
-          <p:nvSpPr>
-            <p:cNvPr id="307" name="CuadroTexto 18"/>
-            <p:cNvSpPr txBox="1"/>
-            <p:nvPr/>
-          </p:nvSpPr>
-          <p:spPr>
-            <a:xfrm>
-              <a:off x="2852369" y="0"/>
-              <a:ext cx="3282596" cy="370840"/>
-            </a:xfrm>
-            <a:prstGeom prst="rect">
-              <a:avLst/>
-            </a:prstGeom>
-            <a:noFill/>
-            <a:ln w="12700" cap="flat">
-              <a:noFill/>
-              <a:miter lim="400000"/>
-            </a:ln>
-            <a:effectLst/>
-            <a:extLst>
-              <a:ext uri="{C572A759-6A51-4108-AA02-DFA0A04FC94B}">
-                <ma14:wrappingTextBoxFlag xmlns:ma14="http://schemas.microsoft.com/office/mac/drawingml/2011/main" xmlns:a14="http://schemas.microsoft.com/office/drawing/2010/main" xmlns:m="http://schemas.openxmlformats.org/officeDocument/2006/math" xmlns="" val="1"/>
-              </a:ext>
-            </a:extLst>
-          </p:spPr>
-          <p:txBody>
-            <a:bodyPr wrap="square" lIns="45719" tIns="45719" rIns="45719" bIns="45719" numCol="1" anchor="t">
-              <a:spAutoFit/>
-            </a:bodyPr>
-            <a:lstStyle>
-              <a:lvl1pPr>
-                <a:defRPr>
-                  <a:solidFill>
-                    <a:srgbClr val="FFFFFF"/>
-                  </a:solidFill>
-                  <a:latin typeface="Montserrat Medium"/>
-                  <a:ea typeface="Montserrat Medium"/>
-                  <a:cs typeface="Montserrat Medium"/>
-                  <a:sym typeface="Montserrat Medium"/>
-                </a:defRPr>
-              </a:lvl1pPr>
-            </a:lstStyle>
-            <a:p>
-              <a:r>
-                <a:t>github.com/lemoncode</a:t>
-              </a:r>
-            </a:p>
-          </p:txBody>
-        </p:sp>
-        <p:sp>
-          <p:nvSpPr>
-            <p:cNvPr id="308" name="CuadroTexto 7"/>
-            <p:cNvSpPr txBox="1"/>
-            <p:nvPr/>
-          </p:nvSpPr>
-          <p:spPr>
-            <a:xfrm>
-              <a:off x="0" y="547697"/>
-              <a:ext cx="1972172" cy="370841"/>
-            </a:xfrm>
-            <a:prstGeom prst="rect">
-              <a:avLst/>
-            </a:prstGeom>
-            <a:noFill/>
-            <a:ln w="12700" cap="flat">
-              <a:noFill/>
-              <a:miter lim="400000"/>
-            </a:ln>
-            <a:effectLst/>
-            <a:extLst>
-              <a:ext uri="{C572A759-6A51-4108-AA02-DFA0A04FC94B}">
-                <ma14:wrappingTextBoxFlag xmlns:ma14="http://schemas.microsoft.com/office/mac/drawingml/2011/main" xmlns:a14="http://schemas.microsoft.com/office/drawing/2010/main" xmlns:m="http://schemas.openxmlformats.org/officeDocument/2006/math" xmlns="" val="1"/>
-              </a:ext>
-            </a:extLst>
-          </p:spPr>
-          <p:txBody>
-            <a:bodyPr wrap="square" lIns="45719" tIns="45719" rIns="45719" bIns="45719" numCol="1" anchor="t">
-              <a:spAutoFit/>
-            </a:bodyPr>
-            <a:lstStyle>
-              <a:lvl1pPr>
-                <a:defRPr>
-                  <a:solidFill>
-                    <a:srgbClr val="FFFFFF"/>
-                  </a:solidFill>
-                  <a:latin typeface="Montserrat Medium"/>
-                  <a:ea typeface="Montserrat Medium"/>
-                  <a:cs typeface="Montserrat Medium"/>
-                  <a:sym typeface="Montserrat Medium"/>
-                </a:defRPr>
-              </a:lvl1pPr>
-            </a:lstStyle>
-            <a:p>
-              <a:r>
-                <a:t>@lemoncoders</a:t>
-              </a:r>
-            </a:p>
-          </p:txBody>
-        </p:sp>
-        <p:sp>
-          <p:nvSpPr>
-            <p:cNvPr id="309" name="CuadroTexto 8"/>
-            <p:cNvSpPr txBox="1"/>
-            <p:nvPr/>
-          </p:nvSpPr>
-          <p:spPr>
-            <a:xfrm>
-              <a:off x="2852369" y="543031"/>
-              <a:ext cx="3446362" cy="370841"/>
-            </a:xfrm>
-            <a:prstGeom prst="rect">
-              <a:avLst/>
-            </a:prstGeom>
-            <a:noFill/>
-            <a:ln w="12700" cap="flat">
-              <a:noFill/>
-              <a:miter lim="400000"/>
-            </a:ln>
-            <a:effectLst/>
-            <a:extLst>
-              <a:ext uri="{C572A759-6A51-4108-AA02-DFA0A04FC94B}">
-                <ma14:wrappingTextBoxFlag xmlns:ma14="http://schemas.microsoft.com/office/mac/drawingml/2011/main" xmlns:a14="http://schemas.microsoft.com/office/drawing/2010/main" xmlns:m="http://schemas.openxmlformats.org/officeDocument/2006/math" xmlns="" val="1"/>
-              </a:ext>
-            </a:extLst>
-          </p:spPr>
-          <p:txBody>
-            <a:bodyPr wrap="square" lIns="45719" tIns="45719" rIns="45719" bIns="45719" numCol="1" anchor="t">
-              <a:spAutoFit/>
-            </a:bodyPr>
-            <a:lstStyle>
-              <a:lvl1pPr>
-                <a:defRPr>
-                  <a:solidFill>
-                    <a:srgbClr val="FFFFFF"/>
-                  </a:solidFill>
-                  <a:latin typeface="Montserrat Medium"/>
-                  <a:ea typeface="Montserrat Medium"/>
-                  <a:cs typeface="Montserrat Medium"/>
-                  <a:sym typeface="Montserrat Medium"/>
-                </a:defRPr>
-              </a:lvl1pPr>
-            </a:lstStyle>
-            <a:p>
-              <a:r>
-                <a:t>facebook.com/lemoncoders</a:t>
-              </a:r>
-            </a:p>
-          </p:txBody>
-        </p:sp>
-        <p:sp>
-          <p:nvSpPr>
-            <p:cNvPr id="310" name="CuadroTexto 12"/>
-            <p:cNvSpPr txBox="1"/>
-            <p:nvPr/>
-          </p:nvSpPr>
-          <p:spPr>
-            <a:xfrm>
-              <a:off x="5137" y="14325"/>
-              <a:ext cx="2027658" cy="370840"/>
-            </a:xfrm>
-            <a:prstGeom prst="rect">
-              <a:avLst/>
-            </a:prstGeom>
-            <a:noFill/>
-            <a:ln w="12700" cap="flat">
-              <a:noFill/>
-              <a:miter lim="400000"/>
-            </a:ln>
-            <a:effectLst/>
-            <a:extLst>
-              <a:ext uri="{C572A759-6A51-4108-AA02-DFA0A04FC94B}">
-                <ma14:wrappingTextBoxFlag xmlns:ma14="http://schemas.microsoft.com/office/mac/drawingml/2011/main" xmlns:a14="http://schemas.microsoft.com/office/drawing/2010/main" xmlns:m="http://schemas.openxmlformats.org/officeDocument/2006/math" xmlns="" val="1"/>
-              </a:ext>
-            </a:extLst>
-          </p:spPr>
-          <p:txBody>
-            <a:bodyPr wrap="square" lIns="45719" tIns="45719" rIns="45719" bIns="45719" numCol="1" anchor="t">
-              <a:spAutoFit/>
-            </a:bodyPr>
-            <a:lstStyle>
-              <a:lvl1pPr>
-                <a:defRPr>
-                  <a:solidFill>
-                    <a:srgbClr val="FFFFFF"/>
-                  </a:solidFill>
-                  <a:latin typeface="Montserrat Medium"/>
-                  <a:ea typeface="Montserrat Medium"/>
-                  <a:cs typeface="Montserrat Medium"/>
-                  <a:sym typeface="Montserrat Medium"/>
-                </a:defRPr>
-              </a:lvl1pPr>
-            </a:lstStyle>
-            <a:p>
-              <a:r>
-                <a:t>lemoncode.net</a:t>
-              </a:r>
-            </a:p>
-          </p:txBody>
-        </p:sp>
-      </p:grpSp>
     </p:spTree>
+    <p:extLst>
+      <p:ext uri="{BB962C8B-B14F-4D97-AF65-F5344CB8AC3E}">
+        <p14:creationId xmlns:p14="http://schemas.microsoft.com/office/powerpoint/2010/main" val="3475292157"/>
+      </p:ext>
+    </p:extLst>
   </p:cSld>
   <p:clrMapOvr>
     <a:masterClrMapping/>

</xml_diff>

<commit_message>
Update wit latest changes. Improved corrections. Added typescript.
</commit_message>
<xml_diff>
--- a/00 teoría/Language Sessions.pptx
+++ b/00 teoría/Language Sessions.pptx
@@ -5,7 +5,7 @@
     <p:sldMasterId id="2147483648" r:id="rId1"/>
   </p:sldMasterIdLst>
   <p:notesMasterIdLst>
-    <p:notesMasterId r:id="rId17"/>
+    <p:notesMasterId r:id="rId21"/>
   </p:notesMasterIdLst>
   <p:sldIdLst>
     <p:sldId id="256" r:id="rId2"/>
@@ -16,13 +16,17 @@
     <p:sldId id="264" r:id="rId7"/>
     <p:sldId id="261" r:id="rId8"/>
     <p:sldId id="262" r:id="rId9"/>
-    <p:sldId id="265" r:id="rId10"/>
-    <p:sldId id="266" r:id="rId11"/>
-    <p:sldId id="269" r:id="rId12"/>
-    <p:sldId id="267" r:id="rId13"/>
-    <p:sldId id="268" r:id="rId14"/>
-    <p:sldId id="270" r:id="rId15"/>
-    <p:sldId id="263" r:id="rId16"/>
+    <p:sldId id="271" r:id="rId10"/>
+    <p:sldId id="272" r:id="rId11"/>
+    <p:sldId id="273" r:id="rId12"/>
+    <p:sldId id="274" r:id="rId13"/>
+    <p:sldId id="265" r:id="rId14"/>
+    <p:sldId id="269" r:id="rId15"/>
+    <p:sldId id="266" r:id="rId16"/>
+    <p:sldId id="267" r:id="rId17"/>
+    <p:sldId id="268" r:id="rId18"/>
+    <p:sldId id="270" r:id="rId19"/>
+    <p:sldId id="263" r:id="rId20"/>
   </p:sldIdLst>
   <p:sldSz cx="9144000" cy="5143500" type="screen16x9"/>
   <p:notesSz cx="6858000" cy="9144000"/>
@@ -353,6 +357,14 @@
 </p:presentation>
 </file>
 
+<file path=ppt/revisionInfo.xml><?xml version="1.0" encoding="utf-8"?>
+<p1510:revInfo xmlns:a="http://schemas.openxmlformats.org/drawingml/2006/main" xmlns:r="http://schemas.openxmlformats.org/officeDocument/2006/relationships" xmlns:p1510="http://schemas.microsoft.com/office/powerpoint/2015/10/main">
+  <p1510:revLst>
+    <p1510:client id="{D2E46F77-11FA-4CBE-8188-11602A501244}" v="10" dt="2018-10-30T18:02:15.156"/>
+  </p1510:revLst>
+</p1510:revInfo>
+</file>
+
 <file path=ppt/notesMasters/notesMaster1.xml><?xml version="1.0" encoding="utf-8"?>
 <p:notesMaster xmlns:a="http://schemas.openxmlformats.org/drawingml/2006/main" xmlns:r="http://schemas.openxmlformats.org/officeDocument/2006/relationships" xmlns:p="http://schemas.openxmlformats.org/presentationml/2006/main">
   <p:cSld>
@@ -711,7 +723,7 @@
           </a:lstStyle>
           <a:p>
             <a:fld id="{86CB4B4D-7CA3-9044-876B-883B54F8677D}" type="slidenum">
-              <a:t>‹#›</a:t>
+              <a:t>‹Nº›</a:t>
             </a:fld>
             <a:endParaRPr/>
           </a:p>
@@ -841,7 +853,7 @@
           <a:lstStyle/>
           <a:p>
             <a:fld id="{86CB4B4D-7CA3-9044-876B-883B54F8677D}" type="slidenum">
-              <a:t>‹#›</a:t>
+              <a:t>‹Nº›</a:t>
             </a:fld>
             <a:endParaRPr/>
           </a:p>
@@ -975,7 +987,7 @@
           <a:lstStyle/>
           <a:p>
             <a:fld id="{86CB4B4D-7CA3-9044-876B-883B54F8677D}" type="slidenum">
-              <a:t>‹#›</a:t>
+              <a:t>‹Nº›</a:t>
             </a:fld>
             <a:endParaRPr/>
           </a:p>
@@ -1105,7 +1117,7 @@
           <a:lstStyle/>
           <a:p>
             <a:fld id="{86CB4B4D-7CA3-9044-876B-883B54F8677D}" type="slidenum">
-              <a:t>‹#›</a:t>
+              <a:t>‹Nº›</a:t>
             </a:fld>
             <a:endParaRPr/>
           </a:p>
@@ -1294,7 +1306,7 @@
           <a:lstStyle/>
           <a:p>
             <a:fld id="{86CB4B4D-7CA3-9044-876B-883B54F8677D}" type="slidenum">
-              <a:t>‹#›</a:t>
+              <a:t>‹Nº›</a:t>
             </a:fld>
             <a:endParaRPr/>
           </a:p>
@@ -1455,7 +1467,7 @@
           <a:lstStyle/>
           <a:p>
             <a:fld id="{86CB4B4D-7CA3-9044-876B-883B54F8677D}" type="slidenum">
-              <a:t>‹#›</a:t>
+              <a:t>‹Nº›</a:t>
             </a:fld>
             <a:endParaRPr/>
           </a:p>
@@ -1649,7 +1661,7 @@
           <a:lstStyle/>
           <a:p>
             <a:fld id="{86CB4B4D-7CA3-9044-876B-883B54F8677D}" type="slidenum">
-              <a:t>‹#›</a:t>
+              <a:t>‹Nº›</a:t>
             </a:fld>
             <a:endParaRPr/>
           </a:p>
@@ -1726,7 +1738,7 @@
           <a:lstStyle/>
           <a:p>
             <a:fld id="{86CB4B4D-7CA3-9044-876B-883B54F8677D}" type="slidenum">
-              <a:t>‹#›</a:t>
+              <a:t>‹Nº›</a:t>
             </a:fld>
             <a:endParaRPr/>
           </a:p>
@@ -1778,7 +1790,7 @@
           <a:lstStyle/>
           <a:p>
             <a:fld id="{86CB4B4D-7CA3-9044-876B-883B54F8677D}" type="slidenum">
-              <a:t>‹#›</a:t>
+              <a:t>‹Nº›</a:t>
             </a:fld>
             <a:endParaRPr/>
           </a:p>
@@ -1949,7 +1961,7 @@
           <a:lstStyle/>
           <a:p>
             <a:fld id="{86CB4B4D-7CA3-9044-876B-883B54F8677D}" type="slidenum">
-              <a:t>‹#›</a:t>
+              <a:t>‹Nº›</a:t>
             </a:fld>
             <a:endParaRPr/>
           </a:p>
@@ -2147,7 +2159,7 @@
           <a:lstStyle/>
           <a:p>
             <a:fld id="{86CB4B4D-7CA3-9044-876B-883B54F8677D}" type="slidenum">
-              <a:t>‹#›</a:t>
+              <a:t>‹Nº›</a:t>
             </a:fld>
             <a:endParaRPr/>
           </a:p>
@@ -2318,7 +2330,7 @@
           <a:lstStyle/>
           <a:p>
             <a:fld id="{86CB4B4D-7CA3-9044-876B-883B54F8677D}" type="slidenum">
-              <a:t>‹#›</a:t>
+              <a:t>‹Nº›</a:t>
             </a:fld>
             <a:endParaRPr/>
           </a:p>
@@ -4168,6 +4180,1833 @@
           </a:lstStyle>
           <a:p>
             <a:r>
+              <a:rPr lang="en-GB"/>
+              <a:t>Características</a:t>
+            </a:r>
+            <a:endParaRPr lang="en-GB" dirty="0"/>
+          </a:p>
+        </p:txBody>
+      </p:sp>
+      <p:sp>
+        <p:nvSpPr>
+          <p:cNvPr id="113" name="Rectángulo 17"/>
+          <p:cNvSpPr/>
+          <p:nvPr/>
+        </p:nvSpPr>
+        <p:spPr>
+          <a:xfrm>
+            <a:off x="0" y="0"/>
+            <a:ext cx="254000" cy="5143500"/>
+          </a:xfrm>
+          <a:prstGeom prst="rect">
+            <a:avLst/>
+          </a:prstGeom>
+          <a:solidFill>
+            <a:srgbClr val="D8D800"/>
+          </a:solidFill>
+          <a:ln w="12700">
+            <a:miter lim="400000"/>
+          </a:ln>
+        </p:spPr>
+        <p:txBody>
+          <a:bodyPr lIns="45719" rIns="45719" anchor="ctr"/>
+          <a:lstStyle/>
+          <a:p>
+            <a:pPr algn="ctr">
+              <a:defRPr>
+                <a:solidFill>
+                  <a:srgbClr val="FFFFFF"/>
+                </a:solidFill>
+              </a:defRPr>
+            </a:pPr>
+            <a:endParaRPr/>
+          </a:p>
+        </p:txBody>
+      </p:sp>
+      <p:sp>
+        <p:nvSpPr>
+          <p:cNvPr id="2" name="TextBox 3">
+            <a:extLst>
+              <a:ext uri="{FF2B5EF4-FFF2-40B4-BE49-F238E27FC236}">
+                <a16:creationId xmlns:a16="http://schemas.microsoft.com/office/drawing/2014/main" id="{F690A08F-CCB4-42CD-B511-499C8E6A85C3}"/>
+              </a:ext>
+            </a:extLst>
+          </p:cNvPr>
+          <p:cNvSpPr txBox="1"/>
+          <p:nvPr/>
+        </p:nvSpPr>
+        <p:spPr>
+          <a:xfrm>
+            <a:off x="900110" y="1722391"/>
+            <a:ext cx="7653195" cy="279401"/>
+          </a:xfrm>
+          <a:prstGeom prst="rect">
+            <a:avLst/>
+          </a:prstGeom>
+          <a:ln w="12700">
+            <a:miter lim="400000"/>
+          </a:ln>
+          <a:extLst>
+            <a:ext uri="{C572A759-6A51-4108-AA02-DFA0A04FC94B}">
+              <ma14:wrappingTextBoxFlag xmlns="" xmlns:m="http://schemas.openxmlformats.org/officeDocument/2006/math" xmlns:a14="http://schemas.microsoft.com/office/drawing/2010/main" xmlns:ma14="http://schemas.microsoft.com/office/mac/drawingml/2011/main" val="1"/>
+            </a:ext>
+          </a:extLst>
+        </p:spPr>
+        <p:txBody>
+          <a:bodyPr lIns="0" tIns="0" rIns="0" bIns="0" anchor="t">
+            <a:spAutoFit/>
+          </a:bodyPr>
+          <a:lstStyle/>
+          <a:p>
+            <a:pPr marL="285750" indent="-285750">
+              <a:buSzPct val="100000"/>
+              <a:buFont typeface="Arial"/>
+              <a:buChar char="•"/>
+              <a:defRPr>
+                <a:solidFill>
+                  <a:srgbClr val="242415"/>
+                </a:solidFill>
+                <a:latin typeface="Open Sans"/>
+                <a:ea typeface="Open Sans"/>
+                <a:cs typeface="Open Sans"/>
+                <a:sym typeface="Open Sans"/>
+              </a:defRPr>
+            </a:pPr>
+            <a:r>
+              <a:rPr lang="en-US"/>
+              <a:t>Convierte código ESNext a ES5 (</a:t>
+            </a:r>
+            <a:r>
+              <a:rPr lang="en-US" i="1"/>
+              <a:t>casi sin polyfills</a:t>
+            </a:r>
+            <a:r>
+              <a:rPr lang="en-US"/>
+              <a:t>)</a:t>
+            </a:r>
+            <a:endParaRPr lang="en-US" dirty="0"/>
+          </a:p>
+        </p:txBody>
+      </p:sp>
+      <p:sp>
+        <p:nvSpPr>
+          <p:cNvPr id="3" name="TextBox 3">
+            <a:extLst>
+              <a:ext uri="{FF2B5EF4-FFF2-40B4-BE49-F238E27FC236}">
+                <a16:creationId xmlns:a16="http://schemas.microsoft.com/office/drawing/2014/main" id="{F8297C39-9EDE-4ED0-AA37-0D780A22784F}"/>
+              </a:ext>
+            </a:extLst>
+          </p:cNvPr>
+          <p:cNvSpPr txBox="1"/>
+          <p:nvPr/>
+        </p:nvSpPr>
+        <p:spPr>
+          <a:xfrm>
+            <a:off x="900112" y="2111613"/>
+            <a:ext cx="7653195" cy="279401"/>
+          </a:xfrm>
+          <a:prstGeom prst="rect">
+            <a:avLst/>
+          </a:prstGeom>
+          <a:ln w="12700">
+            <a:miter lim="400000"/>
+          </a:ln>
+          <a:extLst>
+            <a:ext uri="{C572A759-6A51-4108-AA02-DFA0A04FC94B}">
+              <ma14:wrappingTextBoxFlag xmlns="" xmlns:m="http://schemas.openxmlformats.org/officeDocument/2006/math" xmlns:a14="http://schemas.microsoft.com/office/drawing/2010/main" xmlns:ma14="http://schemas.microsoft.com/office/mac/drawingml/2011/main" val="1"/>
+            </a:ext>
+          </a:extLst>
+        </p:spPr>
+        <p:txBody>
+          <a:bodyPr lIns="0" tIns="0" rIns="0" bIns="0" anchor="t">
+            <a:spAutoFit/>
+          </a:bodyPr>
+          <a:lstStyle/>
+          <a:p>
+            <a:pPr marL="285750" indent="-285750">
+              <a:buSzPct val="100000"/>
+              <a:buFont typeface="Arial"/>
+              <a:buChar char="•"/>
+              <a:defRPr>
+                <a:solidFill>
+                  <a:srgbClr val="242415"/>
+                </a:solidFill>
+                <a:latin typeface="Open Sans"/>
+                <a:ea typeface="Open Sans"/>
+                <a:cs typeface="Open Sans"/>
+                <a:sym typeface="Open Sans"/>
+              </a:defRPr>
+            </a:pPr>
+            <a:r>
+              <a:rPr lang="en-US"/>
+              <a:t>Tipado estático opcional</a:t>
+            </a:r>
+          </a:p>
+        </p:txBody>
+      </p:sp>
+      <p:sp>
+        <p:nvSpPr>
+          <p:cNvPr id="4" name="TextBox 3">
+            <a:extLst>
+              <a:ext uri="{FF2B5EF4-FFF2-40B4-BE49-F238E27FC236}">
+                <a16:creationId xmlns:a16="http://schemas.microsoft.com/office/drawing/2014/main" id="{CDBAADE6-5D1D-4438-A559-8A4576E64C03}"/>
+              </a:ext>
+            </a:extLst>
+          </p:cNvPr>
+          <p:cNvSpPr txBox="1"/>
+          <p:nvPr/>
+        </p:nvSpPr>
+        <p:spPr>
+          <a:xfrm>
+            <a:off x="900112" y="2500835"/>
+            <a:ext cx="7653195" cy="553998"/>
+          </a:xfrm>
+          <a:prstGeom prst="rect">
+            <a:avLst/>
+          </a:prstGeom>
+          <a:ln w="12700">
+            <a:miter lim="400000"/>
+          </a:ln>
+          <a:extLst>
+            <a:ext uri="{C572A759-6A51-4108-AA02-DFA0A04FC94B}">
+              <ma14:wrappingTextBoxFlag xmlns="" xmlns:m="http://schemas.openxmlformats.org/officeDocument/2006/math" xmlns:a14="http://schemas.microsoft.com/office/drawing/2010/main" xmlns:ma14="http://schemas.microsoft.com/office/mac/drawingml/2011/main" val="1"/>
+            </a:ext>
+          </a:extLst>
+        </p:spPr>
+        <p:txBody>
+          <a:bodyPr lIns="0" tIns="0" rIns="0" bIns="0" anchor="t">
+            <a:spAutoFit/>
+          </a:bodyPr>
+          <a:lstStyle>
+            <a:lvl1pPr marL="285750" indent="-285750">
+              <a:buSzPct val="100000"/>
+              <a:buFont typeface="Arial"/>
+              <a:buChar char="•"/>
+              <a:defRPr>
+                <a:solidFill>
+                  <a:srgbClr val="242415"/>
+                </a:solidFill>
+                <a:latin typeface="Open Sans"/>
+                <a:ea typeface="Open Sans"/>
+                <a:cs typeface="Open Sans"/>
+                <a:sym typeface="Open Sans"/>
+              </a:defRPr>
+            </a:lvl1pPr>
+          </a:lstStyle>
+          <a:p>
+            <a:r>
+              <a:rPr lang="en-GB">
+                <a:solidFill>
+                  <a:srgbClr val="000000"/>
+                </a:solidFill>
+              </a:rPr>
+              <a:t>Azúcar sintáctico (e.g.  </a:t>
+            </a:r>
+            <a:r>
+              <a:rPr lang="en-GB" i="1">
+                <a:solidFill>
+                  <a:srgbClr val="000000"/>
+                </a:solidFill>
+              </a:rPr>
+              <a:t>transform-class-properties)</a:t>
+            </a:r>
+          </a:p>
+          <a:p>
+            <a:endParaRPr lang="en-GB" dirty="0">
+              <a:solidFill>
+                <a:srgbClr val="000000"/>
+              </a:solidFill>
+            </a:endParaRPr>
+          </a:p>
+        </p:txBody>
+      </p:sp>
+      <p:sp>
+        <p:nvSpPr>
+          <p:cNvPr id="5" name="TextBox 3">
+            <a:extLst>
+              <a:ext uri="{FF2B5EF4-FFF2-40B4-BE49-F238E27FC236}">
+                <a16:creationId xmlns:a16="http://schemas.microsoft.com/office/drawing/2014/main" id="{E73360E9-93BB-47C9-BD8B-787F0215F172}"/>
+              </a:ext>
+            </a:extLst>
+          </p:cNvPr>
+          <p:cNvSpPr txBox="1"/>
+          <p:nvPr/>
+        </p:nvSpPr>
+        <p:spPr>
+          <a:xfrm>
+            <a:off x="900110" y="943947"/>
+            <a:ext cx="7653195" cy="279401"/>
+          </a:xfrm>
+          <a:prstGeom prst="rect">
+            <a:avLst/>
+          </a:prstGeom>
+          <a:ln w="12700">
+            <a:miter lim="400000"/>
+          </a:ln>
+          <a:extLst>
+            <a:ext uri="{C572A759-6A51-4108-AA02-DFA0A04FC94B}">
+              <ma14:wrappingTextBoxFlag xmlns="" xmlns:m="http://schemas.openxmlformats.org/officeDocument/2006/math" xmlns:a14="http://schemas.microsoft.com/office/drawing/2010/main" xmlns:ma14="http://schemas.microsoft.com/office/mac/drawingml/2011/main" val="1"/>
+            </a:ext>
+          </a:extLst>
+        </p:spPr>
+        <p:txBody>
+          <a:bodyPr lIns="0" tIns="0" rIns="0" bIns="0" anchor="t">
+            <a:spAutoFit/>
+          </a:bodyPr>
+          <a:lstStyle>
+            <a:lvl1pPr marL="285750" indent="-285750">
+              <a:buSzPct val="100000"/>
+              <a:buFont typeface="Arial"/>
+              <a:buChar char="•"/>
+              <a:defRPr>
+                <a:solidFill>
+                  <a:srgbClr val="242415"/>
+                </a:solidFill>
+                <a:latin typeface="Open Sans"/>
+                <a:ea typeface="Open Sans"/>
+                <a:cs typeface="Open Sans"/>
+                <a:sym typeface="Open Sans"/>
+              </a:defRPr>
+            </a:lvl1pPr>
+          </a:lstStyle>
+          <a:p>
+            <a:r>
+              <a:rPr lang="en-GB"/>
+              <a:t>Errores en tiempo de compilación</a:t>
+            </a:r>
+            <a:endParaRPr lang="en-GB" err="1"/>
+          </a:p>
+        </p:txBody>
+      </p:sp>
+      <p:sp>
+        <p:nvSpPr>
+          <p:cNvPr id="6" name="TextBox 3">
+            <a:extLst>
+              <a:ext uri="{FF2B5EF4-FFF2-40B4-BE49-F238E27FC236}">
+                <a16:creationId xmlns:a16="http://schemas.microsoft.com/office/drawing/2014/main" id="{1251CE56-D5F5-4261-A35B-3D6CA8D9363D}"/>
+              </a:ext>
+            </a:extLst>
+          </p:cNvPr>
+          <p:cNvSpPr txBox="1"/>
+          <p:nvPr/>
+        </p:nvSpPr>
+        <p:spPr>
+          <a:xfrm>
+            <a:off x="900110" y="1333169"/>
+            <a:ext cx="7653195" cy="276999"/>
+          </a:xfrm>
+          <a:prstGeom prst="rect">
+            <a:avLst/>
+          </a:prstGeom>
+          <a:ln w="12700">
+            <a:miter lim="400000"/>
+          </a:ln>
+          <a:extLst>
+            <a:ext uri="{C572A759-6A51-4108-AA02-DFA0A04FC94B}">
+              <ma14:wrappingTextBoxFlag xmlns="" xmlns:m="http://schemas.openxmlformats.org/officeDocument/2006/math" xmlns:a14="http://schemas.microsoft.com/office/drawing/2010/main" xmlns:ma14="http://schemas.microsoft.com/office/mac/drawingml/2011/main" val="1"/>
+            </a:ext>
+          </a:extLst>
+        </p:spPr>
+        <p:txBody>
+          <a:bodyPr lIns="0" tIns="0" rIns="0" bIns="0" anchor="t">
+            <a:spAutoFit/>
+          </a:bodyPr>
+          <a:lstStyle>
+            <a:lvl1pPr marL="285750" indent="-285750">
+              <a:buSzPct val="100000"/>
+              <a:buFont typeface="Arial"/>
+              <a:buChar char="•"/>
+              <a:defRPr>
+                <a:solidFill>
+                  <a:srgbClr val="242415"/>
+                </a:solidFill>
+                <a:latin typeface="Open Sans"/>
+                <a:ea typeface="Open Sans"/>
+                <a:cs typeface="Open Sans"/>
+                <a:sym typeface="Open Sans"/>
+              </a:defRPr>
+            </a:lvl1pPr>
+          </a:lstStyle>
+          <a:p>
+            <a:r>
+              <a:rPr lang="en-US">
+                <a:solidFill>
+                  <a:srgbClr val="000000"/>
+                </a:solidFill>
+              </a:rPr>
+              <a:t>Sintáxis ES2015 y posterior</a:t>
+            </a:r>
+            <a:endParaRPr lang="en-GB" i="1"/>
+          </a:p>
+        </p:txBody>
+      </p:sp>
+      <p:sp>
+        <p:nvSpPr>
+          <p:cNvPr id="7" name="TextBox 3">
+            <a:extLst>
+              <a:ext uri="{FF2B5EF4-FFF2-40B4-BE49-F238E27FC236}">
+                <a16:creationId xmlns:a16="http://schemas.microsoft.com/office/drawing/2014/main" id="{B8304F32-D02C-44C9-9E2C-F7EE3374CB62}"/>
+              </a:ext>
+            </a:extLst>
+          </p:cNvPr>
+          <p:cNvSpPr txBox="1"/>
+          <p:nvPr/>
+        </p:nvSpPr>
+        <p:spPr>
+          <a:xfrm>
+            <a:off x="900112" y="2890058"/>
+            <a:ext cx="7653195" cy="279401"/>
+          </a:xfrm>
+          <a:prstGeom prst="rect">
+            <a:avLst/>
+          </a:prstGeom>
+          <a:ln w="12700">
+            <a:miter lim="400000"/>
+          </a:ln>
+          <a:extLst>
+            <a:ext uri="{C572A759-6A51-4108-AA02-DFA0A04FC94B}">
+              <ma14:wrappingTextBoxFlag xmlns="" xmlns:m="http://schemas.openxmlformats.org/officeDocument/2006/math" xmlns:a14="http://schemas.microsoft.com/office/drawing/2010/main" xmlns:ma14="http://schemas.microsoft.com/office/mac/drawingml/2011/main" val="1"/>
+            </a:ext>
+          </a:extLst>
+        </p:spPr>
+        <p:txBody>
+          <a:bodyPr lIns="0" tIns="0" rIns="0" bIns="0" anchor="t">
+            <a:spAutoFit/>
+          </a:bodyPr>
+          <a:lstStyle/>
+          <a:p>
+            <a:pPr marL="285750" indent="-285750">
+              <a:buSzPct val="100000"/>
+              <a:buFont typeface="Arial"/>
+              <a:buChar char="•"/>
+              <a:defRPr>
+                <a:solidFill>
+                  <a:srgbClr val="242415"/>
+                </a:solidFill>
+                <a:latin typeface="Open Sans"/>
+                <a:ea typeface="Open Sans"/>
+                <a:cs typeface="Open Sans"/>
+                <a:sym typeface="Open Sans"/>
+              </a:defRPr>
+            </a:pPr>
+            <a:endParaRPr lang="en-US" dirty="0"/>
+          </a:p>
+        </p:txBody>
+      </p:sp>
+      <p:sp>
+        <p:nvSpPr>
+          <p:cNvPr id="8" name="TextBox 3">
+            <a:extLst>
+              <a:ext uri="{FF2B5EF4-FFF2-40B4-BE49-F238E27FC236}">
+                <a16:creationId xmlns:a16="http://schemas.microsoft.com/office/drawing/2014/main" id="{F46CD173-39DD-4D21-8347-51D6DEB34691}"/>
+              </a:ext>
+            </a:extLst>
+          </p:cNvPr>
+          <p:cNvSpPr txBox="1"/>
+          <p:nvPr/>
+        </p:nvSpPr>
+        <p:spPr>
+          <a:xfrm>
+            <a:off x="900112" y="3279280"/>
+            <a:ext cx="7653195" cy="276999"/>
+          </a:xfrm>
+          <a:prstGeom prst="rect">
+            <a:avLst/>
+          </a:prstGeom>
+          <a:ln w="12700">
+            <a:miter lim="400000"/>
+          </a:ln>
+          <a:extLst>
+            <a:ext uri="{C572A759-6A51-4108-AA02-DFA0A04FC94B}">
+              <ma14:wrappingTextBoxFlag xmlns="" xmlns:m="http://schemas.openxmlformats.org/officeDocument/2006/math" xmlns:a14="http://schemas.microsoft.com/office/drawing/2010/main" xmlns:ma14="http://schemas.microsoft.com/office/mac/drawingml/2011/main" val="1"/>
+            </a:ext>
+          </a:extLst>
+        </p:spPr>
+        <p:txBody>
+          <a:bodyPr lIns="0" tIns="0" rIns="0" bIns="0" anchor="t">
+            <a:spAutoFit/>
+          </a:bodyPr>
+          <a:lstStyle/>
+          <a:p>
+            <a:pPr marL="285750" indent="-285750">
+              <a:buSzPct val="100000"/>
+              <a:buFont typeface="Arial"/>
+              <a:buChar char="•"/>
+              <a:defRPr>
+                <a:solidFill>
+                  <a:srgbClr val="242415"/>
+                </a:solidFill>
+                <a:latin typeface="Open Sans"/>
+                <a:ea typeface="Open Sans"/>
+                <a:cs typeface="Open Sans"/>
+                <a:sym typeface="Open Sans"/>
+              </a:defRPr>
+            </a:pPr>
+            <a:endParaRPr lang="en-US" dirty="0"/>
+          </a:p>
+        </p:txBody>
+      </p:sp>
+      <p:sp>
+        <p:nvSpPr>
+          <p:cNvPr id="9" name="TextBox 3">
+            <a:extLst>
+              <a:ext uri="{FF2B5EF4-FFF2-40B4-BE49-F238E27FC236}">
+                <a16:creationId xmlns:a16="http://schemas.microsoft.com/office/drawing/2014/main" id="{F322B547-8EBF-4910-B2C5-45844AF78EE5}"/>
+              </a:ext>
+            </a:extLst>
+          </p:cNvPr>
+          <p:cNvSpPr txBox="1"/>
+          <p:nvPr/>
+        </p:nvSpPr>
+        <p:spPr>
+          <a:xfrm>
+            <a:off x="900112" y="4020746"/>
+            <a:ext cx="7653195" cy="279401"/>
+          </a:xfrm>
+          <a:prstGeom prst="rect">
+            <a:avLst/>
+          </a:prstGeom>
+          <a:ln w="12700">
+            <a:miter lim="400000"/>
+          </a:ln>
+          <a:extLst>
+            <a:ext uri="{C572A759-6A51-4108-AA02-DFA0A04FC94B}">
+              <ma14:wrappingTextBoxFlag xmlns="" xmlns:m="http://schemas.openxmlformats.org/officeDocument/2006/math" xmlns:a14="http://schemas.microsoft.com/office/drawing/2010/main" xmlns:ma14="http://schemas.microsoft.com/office/mac/drawingml/2011/main" val="1"/>
+            </a:ext>
+          </a:extLst>
+        </p:spPr>
+        <p:txBody>
+          <a:bodyPr lIns="0" tIns="0" rIns="0" bIns="0" anchor="t">
+            <a:spAutoFit/>
+          </a:bodyPr>
+          <a:lstStyle>
+            <a:lvl1pPr marL="285750" indent="-285750">
+              <a:buSzPct val="100000"/>
+              <a:buFont typeface="Arial"/>
+              <a:buChar char="•"/>
+              <a:defRPr>
+                <a:solidFill>
+                  <a:srgbClr val="242415"/>
+                </a:solidFill>
+                <a:latin typeface="Open Sans"/>
+                <a:ea typeface="Open Sans"/>
+                <a:cs typeface="Open Sans"/>
+                <a:sym typeface="Open Sans"/>
+              </a:defRPr>
+            </a:lvl1pPr>
+          </a:lstStyle>
+          <a:p>
+            <a:endParaRPr lang="en-US" dirty="0"/>
+          </a:p>
+        </p:txBody>
+      </p:sp>
+      <p:sp>
+        <p:nvSpPr>
+          <p:cNvPr id="12" name="TextBox 3">
+            <a:extLst>
+              <a:ext uri="{FF2B5EF4-FFF2-40B4-BE49-F238E27FC236}">
+                <a16:creationId xmlns:a16="http://schemas.microsoft.com/office/drawing/2014/main" id="{21BB56F7-04AF-46C0-9E61-650C58BCF6C6}"/>
+              </a:ext>
+            </a:extLst>
+          </p:cNvPr>
+          <p:cNvSpPr txBox="1"/>
+          <p:nvPr/>
+        </p:nvSpPr>
+        <p:spPr>
+          <a:xfrm>
+            <a:off x="900112" y="3653092"/>
+            <a:ext cx="7653195" cy="276999"/>
+          </a:xfrm>
+          <a:prstGeom prst="rect">
+            <a:avLst/>
+          </a:prstGeom>
+          <a:ln w="12700">
+            <a:miter lim="400000"/>
+          </a:ln>
+          <a:extLst>
+            <a:ext uri="{C572A759-6A51-4108-AA02-DFA0A04FC94B}">
+              <ma14:wrappingTextBoxFlag xmlns:ma14="http://schemas.microsoft.com/office/mac/drawingml/2011/main" xmlns:a14="http://schemas.microsoft.com/office/drawing/2010/main" xmlns:m="http://schemas.openxmlformats.org/officeDocument/2006/math" xmlns="" val="1"/>
+            </a:ext>
+          </a:extLst>
+        </p:spPr>
+        <p:txBody>
+          <a:bodyPr lIns="0" tIns="0" rIns="0" bIns="0" anchor="t">
+            <a:spAutoFit/>
+          </a:bodyPr>
+          <a:lstStyle/>
+          <a:p>
+            <a:pPr marL="285750" indent="-285750">
+              <a:buSzPct val="100000"/>
+              <a:buFont typeface="Arial"/>
+              <a:buChar char="•"/>
+              <a:defRPr>
+                <a:solidFill>
+                  <a:srgbClr val="242415"/>
+                </a:solidFill>
+                <a:latin typeface="Open Sans"/>
+                <a:ea typeface="Open Sans"/>
+                <a:cs typeface="Open Sans"/>
+                <a:sym typeface="Open Sans"/>
+              </a:defRPr>
+            </a:pPr>
+            <a:endParaRPr lang="en-US" dirty="0"/>
+          </a:p>
+        </p:txBody>
+      </p:sp>
+    </p:spTree>
+    <p:extLst>
+      <p:ext uri="{BB962C8B-B14F-4D97-AF65-F5344CB8AC3E}">
+        <p14:creationId xmlns:p14="http://schemas.microsoft.com/office/powerpoint/2010/main" val="2215201917"/>
+      </p:ext>
+    </p:extLst>
+  </p:cSld>
+  <p:clrMapOvr>
+    <a:masterClrMapping/>
+  </p:clrMapOvr>
+  <p:transition spd="med"/>
+</p:sld>
+</file>
+
+<file path=ppt/slides/slide11.xml><?xml version="1.0" encoding="utf-8"?>
+<p:sld xmlns:a="http://schemas.openxmlformats.org/drawingml/2006/main" xmlns:r="http://schemas.openxmlformats.org/officeDocument/2006/relationships" xmlns:p="http://schemas.openxmlformats.org/presentationml/2006/main">
+  <p:cSld>
+    <p:spTree>
+      <p:nvGrpSpPr>
+        <p:cNvPr id="1" name=""/>
+        <p:cNvGrpSpPr/>
+        <p:nvPr/>
+      </p:nvGrpSpPr>
+      <p:grpSpPr>
+        <a:xfrm>
+          <a:off x="0" y="0"/>
+          <a:ext cx="0" cy="0"/>
+          <a:chOff x="0" y="0"/>
+          <a:chExt cx="0" cy="0"/>
+        </a:xfrm>
+      </p:grpSpPr>
+      <p:sp>
+        <p:nvSpPr>
+          <p:cNvPr id="153" name="Title 1"/>
+          <p:cNvSpPr txBox="1">
+            <a:spLocks noGrp="1"/>
+          </p:cNvSpPr>
+          <p:nvPr>
+            <p:ph type="title"/>
+          </p:nvPr>
+        </p:nvSpPr>
+        <p:spPr>
+          <a:xfrm>
+            <a:off x="647699" y="-1628"/>
+            <a:ext cx="8245476" cy="810659"/>
+          </a:xfrm>
+          <a:prstGeom prst="rect">
+            <a:avLst/>
+          </a:prstGeom>
+        </p:spPr>
+        <p:txBody>
+          <a:bodyPr lIns="0" tIns="0" rIns="0" bIns="0" anchor="b"/>
+          <a:lstStyle>
+            <a:lvl1pPr>
+              <a:defRPr sz="4000" spc="-300">
+                <a:solidFill>
+                  <a:srgbClr val="242415"/>
+                </a:solidFill>
+                <a:latin typeface="Montserrat SemiBold"/>
+                <a:ea typeface="Montserrat SemiBold"/>
+                <a:cs typeface="Montserrat SemiBold"/>
+                <a:sym typeface="Montserrat SemiBold"/>
+              </a:defRPr>
+            </a:lvl1pPr>
+          </a:lstStyle>
+          <a:p>
+            <a:r>
+              <a:rPr lang="es-ES" dirty="0" err="1"/>
+              <a:t>Transpilación</a:t>
+            </a:r>
+            <a:endParaRPr dirty="0"/>
+          </a:p>
+        </p:txBody>
+      </p:sp>
+      <p:sp>
+        <p:nvSpPr>
+          <p:cNvPr id="154" name="Rectángulo 17"/>
+          <p:cNvSpPr/>
+          <p:nvPr/>
+        </p:nvSpPr>
+        <p:spPr>
+          <a:xfrm>
+            <a:off x="0" y="0"/>
+            <a:ext cx="254000" cy="5143500"/>
+          </a:xfrm>
+          <a:prstGeom prst="rect">
+            <a:avLst/>
+          </a:prstGeom>
+          <a:solidFill>
+            <a:srgbClr val="D8D800"/>
+          </a:solidFill>
+          <a:ln w="12700">
+            <a:miter lim="400000"/>
+          </a:ln>
+        </p:spPr>
+        <p:txBody>
+          <a:bodyPr lIns="45719" rIns="45719" anchor="ctr"/>
+          <a:lstStyle/>
+          <a:p>
+            <a:pPr algn="ctr">
+              <a:defRPr>
+                <a:solidFill>
+                  <a:srgbClr val="FFFFFF"/>
+                </a:solidFill>
+              </a:defRPr>
+            </a:pPr>
+            <a:endParaRPr/>
+          </a:p>
+        </p:txBody>
+      </p:sp>
+      <p:pic>
+        <p:nvPicPr>
+          <p:cNvPr id="5" name="Picture 5" descr="A black sign with white text&#10;&#10;Description generated with high confidence">
+            <a:extLst>
+              <a:ext uri="{FF2B5EF4-FFF2-40B4-BE49-F238E27FC236}">
+                <a16:creationId xmlns:a16="http://schemas.microsoft.com/office/drawing/2014/main" id="{E140C8F8-7011-4374-B962-CB91F27799D2}"/>
+              </a:ext>
+            </a:extLst>
+          </p:cNvPr>
+          <p:cNvPicPr>
+            <a:picLocks noChangeAspect="1"/>
+          </p:cNvPicPr>
+          <p:nvPr/>
+        </p:nvPicPr>
+        <p:blipFill>
+          <a:blip r:embed="rId2"/>
+          <a:stretch>
+            <a:fillRect/>
+          </a:stretch>
+        </p:blipFill>
+        <p:spPr>
+          <a:xfrm>
+            <a:off x="648930" y="1080589"/>
+            <a:ext cx="7149280" cy="3697620"/>
+          </a:xfrm>
+          <a:prstGeom prst="rect">
+            <a:avLst/>
+          </a:prstGeom>
+        </p:spPr>
+      </p:pic>
+    </p:spTree>
+    <p:extLst>
+      <p:ext uri="{BB962C8B-B14F-4D97-AF65-F5344CB8AC3E}">
+        <p14:creationId xmlns:p14="http://schemas.microsoft.com/office/powerpoint/2010/main" val="2170674360"/>
+      </p:ext>
+    </p:extLst>
+  </p:cSld>
+  <p:clrMapOvr>
+    <a:masterClrMapping/>
+  </p:clrMapOvr>
+  <p:transition spd="med"/>
+</p:sld>
+</file>
+
+<file path=ppt/slides/slide12.xml><?xml version="1.0" encoding="utf-8"?>
+<p:sld xmlns:a="http://schemas.openxmlformats.org/drawingml/2006/main" xmlns:r="http://schemas.openxmlformats.org/officeDocument/2006/relationships" xmlns:p="http://schemas.openxmlformats.org/presentationml/2006/main">
+  <p:cSld>
+    <p:spTree>
+      <p:nvGrpSpPr>
+        <p:cNvPr id="1" name=""/>
+        <p:cNvGrpSpPr/>
+        <p:nvPr/>
+      </p:nvGrpSpPr>
+      <p:grpSpPr>
+        <a:xfrm>
+          <a:off x="0" y="0"/>
+          <a:ext cx="0" cy="0"/>
+          <a:chOff x="0" y="0"/>
+          <a:chExt cx="0" cy="0"/>
+        </a:xfrm>
+      </p:grpSpPr>
+      <p:pic>
+        <p:nvPicPr>
+          <p:cNvPr id="292" name="Imagen 5" descr="Imagen 5"/>
+          <p:cNvPicPr>
+            <a:picLocks/>
+          </p:cNvPicPr>
+          <p:nvPr/>
+        </p:nvPicPr>
+        <p:blipFill>
+          <a:blip r:embed="rId2">
+            <a:extLst/>
+          </a:blip>
+          <a:stretch>
+            <a:fillRect/>
+          </a:stretch>
+        </p:blipFill>
+        <p:spPr>
+          <a:xfrm>
+            <a:off x="2740790" y="788750"/>
+            <a:ext cx="3810001" cy="2143126"/>
+          </a:xfrm>
+          <a:prstGeom prst="rect">
+            <a:avLst/>
+          </a:prstGeom>
+          <a:ln w="12700">
+            <a:miter lim="400000"/>
+          </a:ln>
+        </p:spPr>
+      </p:pic>
+      <p:sp>
+        <p:nvSpPr>
+          <p:cNvPr id="293" name="Rectángulo 6"/>
+          <p:cNvSpPr/>
+          <p:nvPr/>
+        </p:nvSpPr>
+        <p:spPr>
+          <a:xfrm rot="5400000">
+            <a:off x="4426749" y="2036654"/>
+            <a:ext cx="252001" cy="3395926"/>
+          </a:xfrm>
+          <a:prstGeom prst="rect">
+            <a:avLst/>
+          </a:prstGeom>
+          <a:solidFill>
+            <a:srgbClr val="D8D800"/>
+          </a:solidFill>
+          <a:ln w="12700">
+            <a:miter lim="400000"/>
+          </a:ln>
+        </p:spPr>
+        <p:txBody>
+          <a:bodyPr lIns="45719" rIns="45719" anchor="ctr"/>
+          <a:lstStyle/>
+          <a:p>
+            <a:pPr algn="ctr">
+              <a:defRPr>
+                <a:solidFill>
+                  <a:srgbClr val="FFFFFF"/>
+                </a:solidFill>
+              </a:defRPr>
+            </a:pPr>
+            <a:endParaRPr/>
+          </a:p>
+        </p:txBody>
+      </p:sp>
+      <p:sp>
+        <p:nvSpPr>
+          <p:cNvPr id="294" name="Title 1"/>
+          <p:cNvSpPr txBox="1"/>
+          <p:nvPr/>
+        </p:nvSpPr>
+        <p:spPr>
+          <a:xfrm>
+            <a:off x="2854787" y="3044164"/>
+            <a:ext cx="3434425" cy="609601"/>
+          </a:xfrm>
+          <a:prstGeom prst="rect">
+            <a:avLst/>
+          </a:prstGeom>
+          <a:ln w="12700">
+            <a:miter lim="400000"/>
+          </a:ln>
+          <a:extLst>
+            <a:ext uri="{C572A759-6A51-4108-AA02-DFA0A04FC94B}">
+              <ma14:wrappingTextBoxFlag xmlns:ma14="http://schemas.microsoft.com/office/mac/drawingml/2011/main" xmlns:a14="http://schemas.microsoft.com/office/drawing/2010/main" xmlns:m="http://schemas.openxmlformats.org/officeDocument/2006/math" xmlns="" val="1"/>
+            </a:ext>
+          </a:extLst>
+        </p:spPr>
+        <p:txBody>
+          <a:bodyPr lIns="0" tIns="0" rIns="0" bIns="0">
+            <a:spAutoFit/>
+          </a:bodyPr>
+          <a:lstStyle>
+            <a:lvl1pPr algn="ctr">
+              <a:tabLst>
+                <a:tab pos="88900" algn="l"/>
+              </a:tabLst>
+              <a:defRPr sz="4000" spc="-300">
+                <a:solidFill>
+                  <a:srgbClr val="242415"/>
+                </a:solidFill>
+                <a:latin typeface="Montserrat SemiBold"/>
+                <a:ea typeface="Montserrat SemiBold"/>
+                <a:cs typeface="Montserrat SemiBold"/>
+                <a:sym typeface="Montserrat SemiBold"/>
+              </a:defRPr>
+            </a:lvl1pPr>
+          </a:lstStyle>
+          <a:p>
+            <a:r>
+              <a:rPr dirty="0"/>
+              <a:t>A por </a:t>
+            </a:r>
+            <a:r>
+              <a:rPr dirty="0" err="1"/>
+              <a:t>código</a:t>
+            </a:r>
+            <a:r>
+              <a:rPr dirty="0"/>
+              <a:t> !!!</a:t>
+            </a:r>
+          </a:p>
+        </p:txBody>
+      </p:sp>
+    </p:spTree>
+    <p:extLst>
+      <p:ext uri="{BB962C8B-B14F-4D97-AF65-F5344CB8AC3E}">
+        <p14:creationId xmlns:p14="http://schemas.microsoft.com/office/powerpoint/2010/main" val="1065653312"/>
+      </p:ext>
+    </p:extLst>
+  </p:cSld>
+  <p:clrMapOvr>
+    <a:masterClrMapping/>
+  </p:clrMapOvr>
+  <p:transition spd="med"/>
+</p:sld>
+</file>
+
+<file path=ppt/slides/slide13.xml><?xml version="1.0" encoding="utf-8"?>
+<p:sld xmlns:a="http://schemas.openxmlformats.org/drawingml/2006/main" xmlns:r="http://schemas.openxmlformats.org/officeDocument/2006/relationships" xmlns:p="http://schemas.openxmlformats.org/presentationml/2006/main">
+  <p:cSld>
+    <p:spTree>
+      <p:nvGrpSpPr>
+        <p:cNvPr id="1" name=""/>
+        <p:cNvGrpSpPr/>
+        <p:nvPr/>
+      </p:nvGrpSpPr>
+      <p:grpSpPr>
+        <a:xfrm>
+          <a:off x="0" y="0"/>
+          <a:ext cx="0" cy="0"/>
+          <a:chOff x="0" y="0"/>
+          <a:chExt cx="0" cy="0"/>
+        </a:xfrm>
+      </p:grpSpPr>
+      <p:sp>
+        <p:nvSpPr>
+          <p:cNvPr id="296" name="Rectángulo 3"/>
+          <p:cNvSpPr/>
+          <p:nvPr/>
+        </p:nvSpPr>
+        <p:spPr>
+          <a:xfrm>
+            <a:off x="0" y="3443907"/>
+            <a:ext cx="9144000" cy="1699593"/>
+          </a:xfrm>
+          <a:prstGeom prst="rect">
+            <a:avLst/>
+          </a:prstGeom>
+          <a:solidFill>
+            <a:srgbClr val="D8D800"/>
+          </a:solidFill>
+          <a:ln w="12700">
+            <a:miter lim="400000"/>
+          </a:ln>
+        </p:spPr>
+        <p:txBody>
+          <a:bodyPr lIns="45719" rIns="45719" anchor="ctr"/>
+          <a:lstStyle/>
+          <a:p>
+            <a:pPr algn="ctr">
+              <a:defRPr>
+                <a:solidFill>
+                  <a:srgbClr val="FFFFFF"/>
+                </a:solidFill>
+              </a:defRPr>
+            </a:pPr>
+            <a:endParaRPr/>
+          </a:p>
+        </p:txBody>
+      </p:sp>
+      <p:sp>
+        <p:nvSpPr>
+          <p:cNvPr id="298" name="Title 1"/>
+          <p:cNvSpPr txBox="1"/>
+          <p:nvPr/>
+        </p:nvSpPr>
+        <p:spPr>
+          <a:xfrm>
+            <a:off x="647699" y="3442251"/>
+            <a:ext cx="8245476" cy="756001"/>
+          </a:xfrm>
+          <a:prstGeom prst="rect">
+            <a:avLst/>
+          </a:prstGeom>
+          <a:ln w="12700">
+            <a:miter lim="400000"/>
+          </a:ln>
+          <a:extLst>
+            <a:ext uri="{C572A759-6A51-4108-AA02-DFA0A04FC94B}">
+              <ma14:wrappingTextBoxFlag xmlns:ma14="http://schemas.microsoft.com/office/mac/drawingml/2011/main" xmlns:a14="http://schemas.microsoft.com/office/drawing/2010/main" xmlns:m="http://schemas.openxmlformats.org/officeDocument/2006/math" xmlns="" val="1"/>
+            </a:ext>
+          </a:extLst>
+        </p:spPr>
+        <p:txBody>
+          <a:bodyPr lIns="0" tIns="0" rIns="0" bIns="0" anchor="b">
+            <a:normAutofit/>
+          </a:bodyPr>
+          <a:lstStyle>
+            <a:lvl1pPr>
+              <a:defRPr sz="3900" spc="-200">
+                <a:solidFill>
+                  <a:srgbClr val="FFFFFF"/>
+                </a:solidFill>
+                <a:latin typeface="Open Sans"/>
+                <a:ea typeface="Open Sans"/>
+                <a:cs typeface="Open Sans"/>
+                <a:sym typeface="Open Sans"/>
+              </a:defRPr>
+            </a:lvl1pPr>
+          </a:lstStyle>
+          <a:p>
+            <a:r>
+              <a:t>Introducción</a:t>
+            </a:r>
+          </a:p>
+        </p:txBody>
+      </p:sp>
+      <p:pic>
+        <p:nvPicPr>
+          <p:cNvPr id="299" name="Gráfico 9" descr="Gráfico 9"/>
+          <p:cNvPicPr>
+            <a:picLocks noChangeAspect="1"/>
+          </p:cNvPicPr>
+          <p:nvPr/>
+        </p:nvPicPr>
+        <p:blipFill>
+          <a:blip r:embed="rId2">
+            <a:extLst/>
+          </a:blip>
+          <a:srcRect l="50688" r="13872" b="52337"/>
+          <a:stretch>
+            <a:fillRect/>
+          </a:stretch>
+        </p:blipFill>
+        <p:spPr>
+          <a:xfrm rot="16200000">
+            <a:off x="7494248" y="3493747"/>
+            <a:ext cx="1701969" cy="1597538"/>
+          </a:xfrm>
+          <a:prstGeom prst="rect">
+            <a:avLst/>
+          </a:prstGeom>
+          <a:ln w="12700">
+            <a:miter lim="400000"/>
+          </a:ln>
+        </p:spPr>
+      </p:pic>
+      <p:sp>
+        <p:nvSpPr>
+          <p:cNvPr id="6" name="Title 1">
+            <a:extLst>
+              <a:ext uri="{FF2B5EF4-FFF2-40B4-BE49-F238E27FC236}">
+                <a16:creationId xmlns:a16="http://schemas.microsoft.com/office/drawing/2014/main" id="{888EA11C-10A6-488F-9439-066972C1E00B}"/>
+              </a:ext>
+            </a:extLst>
+          </p:cNvPr>
+          <p:cNvSpPr txBox="1"/>
+          <p:nvPr/>
+        </p:nvSpPr>
+        <p:spPr>
+          <a:xfrm>
+            <a:off x="572754" y="1152968"/>
+            <a:ext cx="8320421" cy="2215991"/>
+          </a:xfrm>
+          <a:prstGeom prst="rect">
+            <a:avLst/>
+          </a:prstGeom>
+          <a:ln w="12700">
+            <a:miter lim="400000"/>
+          </a:ln>
+          <a:extLst>
+            <a:ext uri="{C572A759-6A51-4108-AA02-DFA0A04FC94B}">
+              <ma14:wrappingTextBoxFlag xmlns="" xmlns:m="http://schemas.openxmlformats.org/officeDocument/2006/math" xmlns:a14="http://schemas.microsoft.com/office/drawing/2010/main" xmlns:ma14="http://schemas.microsoft.com/office/mac/drawingml/2011/main" val="1"/>
+            </a:ext>
+          </a:extLst>
+        </p:spPr>
+        <p:txBody>
+          <a:bodyPr lIns="0" tIns="0" rIns="0" bIns="0">
+            <a:spAutoFit/>
+          </a:bodyPr>
+          <a:lstStyle>
+            <a:lvl1pPr>
+              <a:tabLst>
+                <a:tab pos="88900" algn="l"/>
+              </a:tabLst>
+              <a:defRPr sz="7200" spc="-300">
+                <a:solidFill>
+                  <a:srgbClr val="242415"/>
+                </a:solidFill>
+                <a:latin typeface="Montserrat SemiBold"/>
+                <a:ea typeface="Montserrat SemiBold"/>
+                <a:cs typeface="Montserrat SemiBold"/>
+                <a:sym typeface="Montserrat SemiBold"/>
+              </a:defRPr>
+            </a:lvl1pPr>
+          </a:lstStyle>
+          <a:p>
+            <a:r>
+              <a:rPr lang="es-ES_tradnl" dirty="0"/>
+              <a:t>Programación Funcional</a:t>
+            </a:r>
+            <a:endParaRPr dirty="0"/>
+          </a:p>
+        </p:txBody>
+      </p:sp>
+    </p:spTree>
+    <p:extLst>
+      <p:ext uri="{BB962C8B-B14F-4D97-AF65-F5344CB8AC3E}">
+        <p14:creationId xmlns:p14="http://schemas.microsoft.com/office/powerpoint/2010/main" val="3475292157"/>
+      </p:ext>
+    </p:extLst>
+  </p:cSld>
+  <p:clrMapOvr>
+    <a:masterClrMapping/>
+  </p:clrMapOvr>
+  <p:transition spd="med"/>
+</p:sld>
+</file>
+
+<file path=ppt/slides/slide14.xml><?xml version="1.0" encoding="utf-8"?>
+<p:sld xmlns:a="http://schemas.openxmlformats.org/drawingml/2006/main" xmlns:r="http://schemas.openxmlformats.org/officeDocument/2006/relationships" xmlns:p="http://schemas.openxmlformats.org/presentationml/2006/main">
+  <p:cSld>
+    <p:spTree>
+      <p:nvGrpSpPr>
+        <p:cNvPr id="1" name=""/>
+        <p:cNvGrpSpPr/>
+        <p:nvPr/>
+      </p:nvGrpSpPr>
+      <p:grpSpPr>
+        <a:xfrm>
+          <a:off x="0" y="0"/>
+          <a:ext cx="0" cy="0"/>
+          <a:chOff x="0" y="0"/>
+          <a:chExt cx="0" cy="0"/>
+        </a:xfrm>
+      </p:grpSpPr>
+      <p:sp>
+        <p:nvSpPr>
+          <p:cNvPr id="112" name="Title 1"/>
+          <p:cNvSpPr txBox="1">
+            <a:spLocks noGrp="1"/>
+          </p:cNvSpPr>
+          <p:nvPr>
+            <p:ph type="title"/>
+          </p:nvPr>
+        </p:nvSpPr>
+        <p:spPr>
+          <a:xfrm>
+            <a:off x="647699" y="-1628"/>
+            <a:ext cx="8245476" cy="810659"/>
+          </a:xfrm>
+          <a:prstGeom prst="rect">
+            <a:avLst/>
+          </a:prstGeom>
+        </p:spPr>
+        <p:txBody>
+          <a:bodyPr lIns="0" tIns="0" rIns="0" bIns="0" anchor="b"/>
+          <a:lstStyle>
+            <a:lvl1pPr>
+              <a:defRPr sz="4000" spc="-300">
+                <a:solidFill>
+                  <a:srgbClr val="242415"/>
+                </a:solidFill>
+                <a:latin typeface="Montserrat SemiBold"/>
+                <a:ea typeface="Montserrat SemiBold"/>
+                <a:cs typeface="Montserrat SemiBold"/>
+                <a:sym typeface="Montserrat SemiBold"/>
+              </a:defRPr>
+            </a:lvl1pPr>
+          </a:lstStyle>
+          <a:p>
+            <a:r>
+              <a:rPr lang="en-GB" dirty="0"/>
+              <a:t>Agenda</a:t>
+            </a:r>
+          </a:p>
+        </p:txBody>
+      </p:sp>
+      <p:sp>
+        <p:nvSpPr>
+          <p:cNvPr id="113" name="Rectángulo 17"/>
+          <p:cNvSpPr/>
+          <p:nvPr/>
+        </p:nvSpPr>
+        <p:spPr>
+          <a:xfrm>
+            <a:off x="0" y="0"/>
+            <a:ext cx="254000" cy="5143500"/>
+          </a:xfrm>
+          <a:prstGeom prst="rect">
+            <a:avLst/>
+          </a:prstGeom>
+          <a:solidFill>
+            <a:srgbClr val="D8D800"/>
+          </a:solidFill>
+          <a:ln w="12700">
+            <a:miter lim="400000"/>
+          </a:ln>
+        </p:spPr>
+        <p:txBody>
+          <a:bodyPr lIns="45719" rIns="45719" anchor="ctr"/>
+          <a:lstStyle/>
+          <a:p>
+            <a:pPr algn="ctr">
+              <a:defRPr>
+                <a:solidFill>
+                  <a:srgbClr val="FFFFFF"/>
+                </a:solidFill>
+              </a:defRPr>
+            </a:pPr>
+            <a:endParaRPr/>
+          </a:p>
+        </p:txBody>
+      </p:sp>
+      <p:sp>
+        <p:nvSpPr>
+          <p:cNvPr id="2" name="TextBox 3">
+            <a:extLst>
+              <a:ext uri="{FF2B5EF4-FFF2-40B4-BE49-F238E27FC236}">
+                <a16:creationId xmlns:a16="http://schemas.microsoft.com/office/drawing/2014/main" id="{F690A08F-CCB4-42CD-B511-499C8E6A85C3}"/>
+              </a:ext>
+            </a:extLst>
+          </p:cNvPr>
+          <p:cNvSpPr txBox="1"/>
+          <p:nvPr/>
+        </p:nvSpPr>
+        <p:spPr>
+          <a:xfrm>
+            <a:off x="900110" y="1722391"/>
+            <a:ext cx="7653195" cy="279401"/>
+          </a:xfrm>
+          <a:prstGeom prst="rect">
+            <a:avLst/>
+          </a:prstGeom>
+          <a:ln w="12700">
+            <a:miter lim="400000"/>
+          </a:ln>
+          <a:extLst>
+            <a:ext uri="{C572A759-6A51-4108-AA02-DFA0A04FC94B}">
+              <ma14:wrappingTextBoxFlag xmlns="" xmlns:m="http://schemas.openxmlformats.org/officeDocument/2006/math" xmlns:a14="http://schemas.microsoft.com/office/drawing/2010/main" xmlns:ma14="http://schemas.microsoft.com/office/mac/drawingml/2011/main" val="1"/>
+            </a:ext>
+          </a:extLst>
+        </p:spPr>
+        <p:txBody>
+          <a:bodyPr lIns="0" tIns="0" rIns="0" bIns="0" anchor="t">
+            <a:spAutoFit/>
+          </a:bodyPr>
+          <a:lstStyle/>
+          <a:p>
+            <a:pPr marL="285750" indent="-285750">
+              <a:buSzPct val="100000"/>
+              <a:buFont typeface="Arial"/>
+              <a:buChar char="•"/>
+              <a:defRPr>
+                <a:solidFill>
+                  <a:srgbClr val="242415"/>
+                </a:solidFill>
+                <a:latin typeface="Open Sans"/>
+                <a:ea typeface="Open Sans"/>
+                <a:cs typeface="Open Sans"/>
+                <a:sym typeface="Open Sans"/>
+              </a:defRPr>
+            </a:pPr>
+            <a:r>
+              <a:rPr lang="en-US" dirty="0"/>
+              <a:t>FP vs OOP</a:t>
+            </a:r>
+          </a:p>
+        </p:txBody>
+      </p:sp>
+      <p:sp>
+        <p:nvSpPr>
+          <p:cNvPr id="3" name="TextBox 3">
+            <a:extLst>
+              <a:ext uri="{FF2B5EF4-FFF2-40B4-BE49-F238E27FC236}">
+                <a16:creationId xmlns:a16="http://schemas.microsoft.com/office/drawing/2014/main" id="{F8297C39-9EDE-4ED0-AA37-0D780A22784F}"/>
+              </a:ext>
+            </a:extLst>
+          </p:cNvPr>
+          <p:cNvSpPr txBox="1"/>
+          <p:nvPr/>
+        </p:nvSpPr>
+        <p:spPr>
+          <a:xfrm>
+            <a:off x="900112" y="2111613"/>
+            <a:ext cx="7653195" cy="279401"/>
+          </a:xfrm>
+          <a:prstGeom prst="rect">
+            <a:avLst/>
+          </a:prstGeom>
+          <a:ln w="12700">
+            <a:miter lim="400000"/>
+          </a:ln>
+          <a:extLst>
+            <a:ext uri="{C572A759-6A51-4108-AA02-DFA0A04FC94B}">
+              <ma14:wrappingTextBoxFlag xmlns="" xmlns:m="http://schemas.openxmlformats.org/officeDocument/2006/math" xmlns:a14="http://schemas.microsoft.com/office/drawing/2010/main" xmlns:ma14="http://schemas.microsoft.com/office/mac/drawingml/2011/main" val="1"/>
+            </a:ext>
+          </a:extLst>
+        </p:spPr>
+        <p:txBody>
+          <a:bodyPr lIns="0" tIns="0" rIns="0" bIns="0" anchor="t">
+            <a:spAutoFit/>
+          </a:bodyPr>
+          <a:lstStyle/>
+          <a:p>
+            <a:pPr marL="285750" indent="-285750">
+              <a:buSzPct val="100000"/>
+              <a:buFont typeface="Arial"/>
+              <a:buChar char="•"/>
+              <a:defRPr>
+                <a:solidFill>
+                  <a:srgbClr val="242415"/>
+                </a:solidFill>
+                <a:latin typeface="Open Sans"/>
+                <a:ea typeface="Open Sans"/>
+                <a:cs typeface="Open Sans"/>
+                <a:sym typeface="Open Sans"/>
+              </a:defRPr>
+            </a:pPr>
+            <a:r>
+              <a:rPr lang="en-US" dirty="0"/>
+              <a:t>Demo </a:t>
+            </a:r>
+            <a:r>
+              <a:rPr lang="en-US" dirty="0" err="1"/>
+              <a:t>métodos</a:t>
+            </a:r>
+            <a:r>
+              <a:rPr lang="en-US" dirty="0"/>
+              <a:t> de arrays</a:t>
+            </a:r>
+          </a:p>
+        </p:txBody>
+      </p:sp>
+      <p:sp>
+        <p:nvSpPr>
+          <p:cNvPr id="4" name="TextBox 3">
+            <a:extLst>
+              <a:ext uri="{FF2B5EF4-FFF2-40B4-BE49-F238E27FC236}">
+                <a16:creationId xmlns:a16="http://schemas.microsoft.com/office/drawing/2014/main" id="{CDBAADE6-5D1D-4438-A559-8A4576E64C03}"/>
+              </a:ext>
+            </a:extLst>
+          </p:cNvPr>
+          <p:cNvSpPr txBox="1"/>
+          <p:nvPr/>
+        </p:nvSpPr>
+        <p:spPr>
+          <a:xfrm>
+            <a:off x="900112" y="2500835"/>
+            <a:ext cx="7653195" cy="279401"/>
+          </a:xfrm>
+          <a:prstGeom prst="rect">
+            <a:avLst/>
+          </a:prstGeom>
+          <a:ln w="12700">
+            <a:miter lim="400000"/>
+          </a:ln>
+          <a:extLst>
+            <a:ext uri="{C572A759-6A51-4108-AA02-DFA0A04FC94B}">
+              <ma14:wrappingTextBoxFlag xmlns="" xmlns:m="http://schemas.openxmlformats.org/officeDocument/2006/math" xmlns:a14="http://schemas.microsoft.com/office/drawing/2010/main" xmlns:ma14="http://schemas.microsoft.com/office/mac/drawingml/2011/main" val="1"/>
+            </a:ext>
+          </a:extLst>
+        </p:spPr>
+        <p:txBody>
+          <a:bodyPr lIns="0" tIns="0" rIns="0" bIns="0" anchor="t">
+            <a:spAutoFit/>
+          </a:bodyPr>
+          <a:lstStyle>
+            <a:lvl1pPr marL="285750" indent="-285750">
+              <a:buSzPct val="100000"/>
+              <a:buFont typeface="Arial"/>
+              <a:buChar char="•"/>
+              <a:defRPr>
+                <a:solidFill>
+                  <a:srgbClr val="242415"/>
+                </a:solidFill>
+                <a:latin typeface="Open Sans"/>
+                <a:ea typeface="Open Sans"/>
+                <a:cs typeface="Open Sans"/>
+                <a:sym typeface="Open Sans"/>
+              </a:defRPr>
+            </a:lvl1pPr>
+          </a:lstStyle>
+          <a:p>
+            <a:r>
+              <a:rPr lang="en-US" dirty="0"/>
+              <a:t>Demo </a:t>
+            </a:r>
+            <a:r>
+              <a:rPr lang="en-US" dirty="0" err="1"/>
+              <a:t>recursividad</a:t>
+            </a:r>
+          </a:p>
+        </p:txBody>
+      </p:sp>
+      <p:sp>
+        <p:nvSpPr>
+          <p:cNvPr id="5" name="TextBox 3">
+            <a:extLst>
+              <a:ext uri="{FF2B5EF4-FFF2-40B4-BE49-F238E27FC236}">
+                <a16:creationId xmlns:a16="http://schemas.microsoft.com/office/drawing/2014/main" id="{E73360E9-93BB-47C9-BD8B-787F0215F172}"/>
+              </a:ext>
+            </a:extLst>
+          </p:cNvPr>
+          <p:cNvSpPr txBox="1"/>
+          <p:nvPr/>
+        </p:nvSpPr>
+        <p:spPr>
+          <a:xfrm>
+            <a:off x="900110" y="943947"/>
+            <a:ext cx="7653195" cy="279401"/>
+          </a:xfrm>
+          <a:prstGeom prst="rect">
+            <a:avLst/>
+          </a:prstGeom>
+          <a:ln w="12700">
+            <a:miter lim="400000"/>
+          </a:ln>
+          <a:extLst>
+            <a:ext uri="{C572A759-6A51-4108-AA02-DFA0A04FC94B}">
+              <ma14:wrappingTextBoxFlag xmlns="" xmlns:m="http://schemas.openxmlformats.org/officeDocument/2006/math" xmlns:a14="http://schemas.microsoft.com/office/drawing/2010/main" xmlns:ma14="http://schemas.microsoft.com/office/mac/drawingml/2011/main" val="1"/>
+            </a:ext>
+          </a:extLst>
+        </p:spPr>
+        <p:txBody>
+          <a:bodyPr lIns="0" tIns="0" rIns="0" bIns="0" anchor="t">
+            <a:spAutoFit/>
+          </a:bodyPr>
+          <a:lstStyle>
+            <a:lvl1pPr marL="285750" indent="-285750">
+              <a:buSzPct val="100000"/>
+              <a:buFont typeface="Arial"/>
+              <a:buChar char="•"/>
+              <a:defRPr>
+                <a:solidFill>
+                  <a:srgbClr val="242415"/>
+                </a:solidFill>
+                <a:latin typeface="Open Sans"/>
+                <a:ea typeface="Open Sans"/>
+                <a:cs typeface="Open Sans"/>
+                <a:sym typeface="Open Sans"/>
+              </a:defRPr>
+            </a:lvl1pPr>
+          </a:lstStyle>
+          <a:p>
+            <a:r>
+              <a:rPr lang="en-GB" dirty="0"/>
+              <a:t>¿</a:t>
+            </a:r>
+            <a:r>
+              <a:rPr lang="en-GB" dirty="0" err="1"/>
+              <a:t>Qué</a:t>
+            </a:r>
+            <a:r>
+              <a:rPr lang="en-GB" dirty="0"/>
+              <a:t> es la </a:t>
+            </a:r>
+            <a:r>
+              <a:rPr lang="en-GB" dirty="0" err="1"/>
+              <a:t>programación</a:t>
+            </a:r>
+            <a:r>
+              <a:rPr lang="en-GB" dirty="0"/>
+              <a:t> </a:t>
+            </a:r>
+            <a:r>
+              <a:rPr lang="en-GB" dirty="0" err="1"/>
+              <a:t>funcional</a:t>
+            </a:r>
+            <a:r>
+              <a:rPr lang="en-GB" dirty="0"/>
+              <a:t>?</a:t>
+            </a:r>
+            <a:endParaRPr lang="en-GB" dirty="0" err="1"/>
+          </a:p>
+        </p:txBody>
+      </p:sp>
+      <p:sp>
+        <p:nvSpPr>
+          <p:cNvPr id="6" name="TextBox 3">
+            <a:extLst>
+              <a:ext uri="{FF2B5EF4-FFF2-40B4-BE49-F238E27FC236}">
+                <a16:creationId xmlns:a16="http://schemas.microsoft.com/office/drawing/2014/main" id="{1251CE56-D5F5-4261-A35B-3D6CA8D9363D}"/>
+              </a:ext>
+            </a:extLst>
+          </p:cNvPr>
+          <p:cNvSpPr txBox="1"/>
+          <p:nvPr/>
+        </p:nvSpPr>
+        <p:spPr>
+          <a:xfrm>
+            <a:off x="900110" y="1333169"/>
+            <a:ext cx="7653195" cy="279401"/>
+          </a:xfrm>
+          <a:prstGeom prst="rect">
+            <a:avLst/>
+          </a:prstGeom>
+          <a:ln w="12700">
+            <a:miter lim="400000"/>
+          </a:ln>
+          <a:extLst>
+            <a:ext uri="{C572A759-6A51-4108-AA02-DFA0A04FC94B}">
+              <ma14:wrappingTextBoxFlag xmlns="" xmlns:m="http://schemas.openxmlformats.org/officeDocument/2006/math" xmlns:a14="http://schemas.microsoft.com/office/drawing/2010/main" xmlns:ma14="http://schemas.microsoft.com/office/mac/drawingml/2011/main" val="1"/>
+            </a:ext>
+          </a:extLst>
+        </p:spPr>
+        <p:txBody>
+          <a:bodyPr lIns="0" tIns="0" rIns="0" bIns="0" anchor="t">
+            <a:spAutoFit/>
+          </a:bodyPr>
+          <a:lstStyle>
+            <a:lvl1pPr marL="285750" indent="-285750">
+              <a:buSzPct val="100000"/>
+              <a:buFont typeface="Arial"/>
+              <a:buChar char="•"/>
+              <a:defRPr>
+                <a:solidFill>
+                  <a:srgbClr val="242415"/>
+                </a:solidFill>
+                <a:latin typeface="Open Sans"/>
+                <a:ea typeface="Open Sans"/>
+                <a:cs typeface="Open Sans"/>
+                <a:sym typeface="Open Sans"/>
+              </a:defRPr>
+            </a:lvl1pPr>
+          </a:lstStyle>
+          <a:p>
+            <a:r>
+              <a:rPr lang="en-GB" dirty="0" err="1"/>
+              <a:t>Características</a:t>
+            </a:r>
+          </a:p>
+        </p:txBody>
+      </p:sp>
+      <p:sp>
+        <p:nvSpPr>
+          <p:cNvPr id="7" name="TextBox 3">
+            <a:extLst>
+              <a:ext uri="{FF2B5EF4-FFF2-40B4-BE49-F238E27FC236}">
+                <a16:creationId xmlns:a16="http://schemas.microsoft.com/office/drawing/2014/main" id="{B8304F32-D02C-44C9-9E2C-F7EE3374CB62}"/>
+              </a:ext>
+            </a:extLst>
+          </p:cNvPr>
+          <p:cNvSpPr txBox="1"/>
+          <p:nvPr/>
+        </p:nvSpPr>
+        <p:spPr>
+          <a:xfrm>
+            <a:off x="900112" y="2890058"/>
+            <a:ext cx="7653195" cy="279401"/>
+          </a:xfrm>
+          <a:prstGeom prst="rect">
+            <a:avLst/>
+          </a:prstGeom>
+          <a:ln w="12700">
+            <a:miter lim="400000"/>
+          </a:ln>
+          <a:extLst>
+            <a:ext uri="{C572A759-6A51-4108-AA02-DFA0A04FC94B}">
+              <ma14:wrappingTextBoxFlag xmlns="" xmlns:m="http://schemas.openxmlformats.org/officeDocument/2006/math" xmlns:a14="http://schemas.microsoft.com/office/drawing/2010/main" xmlns:ma14="http://schemas.microsoft.com/office/mac/drawingml/2011/main" val="1"/>
+            </a:ext>
+          </a:extLst>
+        </p:spPr>
+        <p:txBody>
+          <a:bodyPr lIns="0" tIns="0" rIns="0" bIns="0" anchor="t">
+            <a:spAutoFit/>
+          </a:bodyPr>
+          <a:lstStyle/>
+          <a:p>
+            <a:pPr marL="285750" indent="-285750">
+              <a:buSzPct val="100000"/>
+              <a:buFont typeface="Arial"/>
+              <a:buChar char="•"/>
+              <a:defRPr>
+                <a:solidFill>
+                  <a:srgbClr val="242415"/>
+                </a:solidFill>
+                <a:latin typeface="Open Sans"/>
+                <a:ea typeface="Open Sans"/>
+                <a:cs typeface="Open Sans"/>
+                <a:sym typeface="Open Sans"/>
+              </a:defRPr>
+            </a:pPr>
+            <a:r>
+              <a:rPr lang="en-US" dirty="0"/>
+              <a:t>Demo </a:t>
+            </a:r>
+            <a:r>
+              <a:rPr lang="en-US" dirty="0" err="1"/>
+              <a:t>composición</a:t>
+            </a:r>
+          </a:p>
+        </p:txBody>
+      </p:sp>
+      <p:sp>
+        <p:nvSpPr>
+          <p:cNvPr id="8" name="TextBox 3">
+            <a:extLst>
+              <a:ext uri="{FF2B5EF4-FFF2-40B4-BE49-F238E27FC236}">
+                <a16:creationId xmlns:a16="http://schemas.microsoft.com/office/drawing/2014/main" id="{F46CD173-39DD-4D21-8347-51D6DEB34691}"/>
+              </a:ext>
+            </a:extLst>
+          </p:cNvPr>
+          <p:cNvSpPr txBox="1"/>
+          <p:nvPr/>
+        </p:nvSpPr>
+        <p:spPr>
+          <a:xfrm>
+            <a:off x="900112" y="3279280"/>
+            <a:ext cx="7653195" cy="276999"/>
+          </a:xfrm>
+          <a:prstGeom prst="rect">
+            <a:avLst/>
+          </a:prstGeom>
+          <a:ln w="12700">
+            <a:miter lim="400000"/>
+          </a:ln>
+          <a:extLst>
+            <a:ext uri="{C572A759-6A51-4108-AA02-DFA0A04FC94B}">
+              <ma14:wrappingTextBoxFlag xmlns="" xmlns:m="http://schemas.openxmlformats.org/officeDocument/2006/math" xmlns:a14="http://schemas.microsoft.com/office/drawing/2010/main" xmlns:ma14="http://schemas.microsoft.com/office/mac/drawingml/2011/main" val="1"/>
+            </a:ext>
+          </a:extLst>
+        </p:spPr>
+        <p:txBody>
+          <a:bodyPr lIns="0" tIns="0" rIns="0" bIns="0" anchor="t">
+            <a:spAutoFit/>
+          </a:bodyPr>
+          <a:lstStyle/>
+          <a:p>
+            <a:pPr marL="285750" indent="-285750">
+              <a:buSzPct val="100000"/>
+              <a:buFont typeface="Arial"/>
+              <a:buChar char="•"/>
+              <a:defRPr>
+                <a:solidFill>
+                  <a:srgbClr val="242415"/>
+                </a:solidFill>
+                <a:latin typeface="Open Sans"/>
+                <a:ea typeface="Open Sans"/>
+                <a:cs typeface="Open Sans"/>
+                <a:sym typeface="Open Sans"/>
+              </a:defRPr>
+            </a:pPr>
+            <a:r>
+              <a:rPr lang="en-US" dirty="0"/>
+              <a:t>Demo curry</a:t>
+            </a:r>
+          </a:p>
+        </p:txBody>
+      </p:sp>
+      <p:sp>
+        <p:nvSpPr>
+          <p:cNvPr id="9" name="TextBox 3">
+            <a:extLst>
+              <a:ext uri="{FF2B5EF4-FFF2-40B4-BE49-F238E27FC236}">
+                <a16:creationId xmlns:a16="http://schemas.microsoft.com/office/drawing/2014/main" id="{F322B547-8EBF-4910-B2C5-45844AF78EE5}"/>
+              </a:ext>
+            </a:extLst>
+          </p:cNvPr>
+          <p:cNvSpPr txBox="1"/>
+          <p:nvPr/>
+        </p:nvSpPr>
+        <p:spPr>
+          <a:xfrm>
+            <a:off x="900112" y="4020746"/>
+            <a:ext cx="7653195" cy="279401"/>
+          </a:xfrm>
+          <a:prstGeom prst="rect">
+            <a:avLst/>
+          </a:prstGeom>
+          <a:ln w="12700">
+            <a:miter lim="400000"/>
+          </a:ln>
+          <a:extLst>
+            <a:ext uri="{C572A759-6A51-4108-AA02-DFA0A04FC94B}">
+              <ma14:wrappingTextBoxFlag xmlns="" xmlns:m="http://schemas.openxmlformats.org/officeDocument/2006/math" xmlns:a14="http://schemas.microsoft.com/office/drawing/2010/main" xmlns:ma14="http://schemas.microsoft.com/office/mac/drawingml/2011/main" val="1"/>
+            </a:ext>
+          </a:extLst>
+        </p:spPr>
+        <p:txBody>
+          <a:bodyPr lIns="0" tIns="0" rIns="0" bIns="0" anchor="t">
+            <a:spAutoFit/>
+          </a:bodyPr>
+          <a:lstStyle>
+            <a:lvl1pPr marL="285750" indent="-285750">
+              <a:buSzPct val="100000"/>
+              <a:buFont typeface="Arial"/>
+              <a:buChar char="•"/>
+              <a:defRPr>
+                <a:solidFill>
+                  <a:srgbClr val="242415"/>
+                </a:solidFill>
+                <a:latin typeface="Open Sans"/>
+                <a:ea typeface="Open Sans"/>
+                <a:cs typeface="Open Sans"/>
+                <a:sym typeface="Open Sans"/>
+              </a:defRPr>
+            </a:lvl1pPr>
+          </a:lstStyle>
+          <a:p>
+            <a:r>
+              <a:rPr lang="en-US" dirty="0"/>
+              <a:t>Demo </a:t>
+            </a:r>
+            <a:r>
+              <a:rPr lang="en-US" dirty="0" err="1"/>
+              <a:t>resolución</a:t>
+            </a:r>
+            <a:r>
+              <a:rPr lang="en-US" dirty="0"/>
+              <a:t> </a:t>
+            </a:r>
+            <a:r>
+              <a:rPr lang="en-US" dirty="0" err="1"/>
+              <a:t>FizzBuzz</a:t>
+            </a:r>
+            <a:r>
+              <a:rPr lang="en-US" dirty="0"/>
+              <a:t> de forma </a:t>
+            </a:r>
+            <a:r>
+              <a:rPr lang="en-US" dirty="0" err="1"/>
+              <a:t>funcional</a:t>
+            </a:r>
+          </a:p>
+        </p:txBody>
+      </p:sp>
+      <p:sp>
+        <p:nvSpPr>
+          <p:cNvPr id="12" name="TextBox 3">
+            <a:extLst>
+              <a:ext uri="{FF2B5EF4-FFF2-40B4-BE49-F238E27FC236}">
+                <a16:creationId xmlns:a16="http://schemas.microsoft.com/office/drawing/2014/main" id="{21BB56F7-04AF-46C0-9E61-650C58BCF6C6}"/>
+              </a:ext>
+            </a:extLst>
+          </p:cNvPr>
+          <p:cNvSpPr txBox="1"/>
+          <p:nvPr/>
+        </p:nvSpPr>
+        <p:spPr>
+          <a:xfrm>
+            <a:off x="900112" y="3653092"/>
+            <a:ext cx="7653195" cy="276999"/>
+          </a:xfrm>
+          <a:prstGeom prst="rect">
+            <a:avLst/>
+          </a:prstGeom>
+          <a:ln w="12700">
+            <a:miter lim="400000"/>
+          </a:ln>
+          <a:extLst>
+            <a:ext uri="{C572A759-6A51-4108-AA02-DFA0A04FC94B}">
+              <ma14:wrappingTextBoxFlag xmlns:ma14="http://schemas.microsoft.com/office/mac/drawingml/2011/main" xmlns:a14="http://schemas.microsoft.com/office/drawing/2010/main" xmlns:m="http://schemas.openxmlformats.org/officeDocument/2006/math" xmlns="" val="1"/>
+            </a:ext>
+          </a:extLst>
+        </p:spPr>
+        <p:txBody>
+          <a:bodyPr lIns="0" tIns="0" rIns="0" bIns="0" anchor="t">
+            <a:spAutoFit/>
+          </a:bodyPr>
+          <a:lstStyle/>
+          <a:p>
+            <a:pPr marL="285750" indent="-285750">
+              <a:buSzPct val="100000"/>
+              <a:buFont typeface="Arial"/>
+              <a:buChar char="•"/>
+              <a:defRPr>
+                <a:solidFill>
+                  <a:srgbClr val="242415"/>
+                </a:solidFill>
+                <a:latin typeface="Open Sans"/>
+                <a:ea typeface="Open Sans"/>
+                <a:cs typeface="Open Sans"/>
+                <a:sym typeface="Open Sans"/>
+              </a:defRPr>
+            </a:pPr>
+            <a:r>
+              <a:rPr lang="en-US" dirty="0"/>
+              <a:t>Demo </a:t>
+            </a:r>
+            <a:r>
+              <a:rPr lang="en-US" dirty="0" err="1"/>
+              <a:t>aplicación</a:t>
+            </a:r>
+            <a:r>
+              <a:rPr lang="en-US" dirty="0"/>
+              <a:t> </a:t>
+            </a:r>
+            <a:r>
+              <a:rPr lang="en-US" dirty="0" err="1"/>
+              <a:t>parcial</a:t>
+            </a:r>
+          </a:p>
+        </p:txBody>
+      </p:sp>
+    </p:spTree>
+    <p:extLst>
+      <p:ext uri="{BB962C8B-B14F-4D97-AF65-F5344CB8AC3E}">
+        <p14:creationId xmlns:p14="http://schemas.microsoft.com/office/powerpoint/2010/main" val="801211613"/>
+      </p:ext>
+    </p:extLst>
+  </p:cSld>
+  <p:clrMapOvr>
+    <a:masterClrMapping/>
+  </p:clrMapOvr>
+  <p:transition spd="med"/>
+</p:sld>
+</file>
+
+<file path=ppt/slides/slide15.xml><?xml version="1.0" encoding="utf-8"?>
+<p:sld xmlns:a="http://schemas.openxmlformats.org/drawingml/2006/main" xmlns:r="http://schemas.openxmlformats.org/officeDocument/2006/relationships" xmlns:p="http://schemas.openxmlformats.org/presentationml/2006/main">
+  <p:cSld>
+    <p:spTree>
+      <p:nvGrpSpPr>
+        <p:cNvPr id="1" name=""/>
+        <p:cNvGrpSpPr/>
+        <p:nvPr/>
+      </p:nvGrpSpPr>
+      <p:grpSpPr>
+        <a:xfrm>
+          <a:off x="0" y="0"/>
+          <a:ext cx="0" cy="0"/>
+          <a:chOff x="0" y="0"/>
+          <a:chExt cx="0" cy="0"/>
+        </a:xfrm>
+      </p:grpSpPr>
+      <p:sp>
+        <p:nvSpPr>
+          <p:cNvPr id="112" name="Title 1"/>
+          <p:cNvSpPr txBox="1">
+            <a:spLocks noGrp="1"/>
+          </p:cNvSpPr>
+          <p:nvPr>
+            <p:ph type="title"/>
+          </p:nvPr>
+        </p:nvSpPr>
+        <p:spPr>
+          <a:xfrm>
+            <a:off x="647699" y="-1628"/>
+            <a:ext cx="8245476" cy="810659"/>
+          </a:xfrm>
+          <a:prstGeom prst="rect">
+            <a:avLst/>
+          </a:prstGeom>
+        </p:spPr>
+        <p:txBody>
+          <a:bodyPr lIns="0" tIns="0" rIns="0" bIns="0" anchor="b"/>
+          <a:lstStyle>
+            <a:lvl1pPr>
+              <a:defRPr sz="4000" spc="-300">
+                <a:solidFill>
+                  <a:srgbClr val="242415"/>
+                </a:solidFill>
+                <a:latin typeface="Montserrat SemiBold"/>
+                <a:ea typeface="Montserrat SemiBold"/>
+                <a:cs typeface="Montserrat SemiBold"/>
+                <a:sym typeface="Montserrat SemiBold"/>
+              </a:defRPr>
+            </a:lvl1pPr>
+          </a:lstStyle>
+          <a:p>
+            <a:r>
               <a:rPr lang="en-GB" dirty="0"/>
               <a:t>¿</a:t>
             </a:r>
@@ -4934,7 +6773,7 @@
 </p:sld>
 </file>
 
-<file path=ppt/slides/slide11.xml><?xml version="1.0" encoding="utf-8"?>
+<file path=ppt/slides/slide16.xml><?xml version="1.0" encoding="utf-8"?>
 <p:sld xmlns:a="http://schemas.openxmlformats.org/drawingml/2006/main" xmlns:r="http://schemas.openxmlformats.org/officeDocument/2006/relationships" xmlns:p="http://schemas.openxmlformats.org/presentationml/2006/main">
   <p:cSld>
     <p:spTree>
@@ -4987,8 +6826,8 @@
           </a:lstStyle>
           <a:p>
             <a:r>
-              <a:rPr lang="en-GB" dirty="0"/>
-              <a:t>Agenda</a:t>
+              <a:rPr lang="en-GB" dirty="0" err="1"/>
+              <a:t>Características</a:t>
             </a:r>
           </a:p>
         </p:txBody>
@@ -5079,8 +6918,32 @@
               </a:defRPr>
             </a:pPr>
             <a:r>
+              <a:rPr lang="en-US" dirty="0" err="1"/>
+              <a:t>Funciones</a:t>
+            </a:r>
+            <a:r>
               <a:rPr lang="en-US" dirty="0"/>
-              <a:t>FP vs OOP</a:t>
+              <a:t> </a:t>
+            </a:r>
+            <a:r>
+              <a:rPr lang="en-US" dirty="0" err="1"/>
+              <a:t>puras</a:t>
+            </a:r>
+            <a:r>
+              <a:rPr lang="en-US" dirty="0"/>
+              <a:t>, </a:t>
+            </a:r>
+            <a:r>
+              <a:rPr lang="en-US" dirty="0" err="1"/>
+              <a:t>transparencia</a:t>
+            </a:r>
+            <a:r>
+              <a:rPr lang="en-US" dirty="0"/>
+              <a:t> </a:t>
+            </a:r>
+            <a:r>
+              <a:rPr lang="en-US" dirty="0" err="1"/>
+              <a:t>referencial</a:t>
             </a:r>
           </a:p>
         </p:txBody>
@@ -5135,16 +6998,8 @@
               </a:defRPr>
             </a:pPr>
             <a:r>
-              <a:rPr lang="en-US" dirty="0"/>
-              <a:t>Demo </a:t>
-            </a:r>
-            <a:r>
               <a:rPr lang="en-US" dirty="0" err="1"/>
-              <a:t>métodos</a:t>
-            </a:r>
-            <a:r>
-              <a:rPr lang="en-US" dirty="0"/>
-              <a:t> de arrays</a:t>
+              <a:t>Recursividad</a:t>
             </a:r>
           </a:p>
         </p:txBody>
@@ -5200,12 +7055,24 @@
           </a:lstStyle>
           <a:p>
             <a:r>
+              <a:rPr lang="en-US" dirty="0" err="1"/>
+              <a:t>Estructuras</a:t>
+            </a:r>
+            <a:r>
               <a:rPr lang="en-US" dirty="0"/>
-              <a:t>Demo </a:t>
+              <a:t> de </a:t>
             </a:r>
             <a:r>
               <a:rPr lang="en-US" dirty="0" err="1"/>
-              <a:t>recursividad</a:t>
+              <a:t>datos</a:t>
+            </a:r>
+            <a:r>
+              <a:rPr lang="en-US" dirty="0"/>
+              <a:t> </a:t>
+            </a:r>
+            <a:r>
+              <a:rPr lang="en-US" dirty="0" err="1"/>
+              <a:t>algebraicas</a:t>
             </a:r>
           </a:p>
         </p:txBody>
@@ -5261,20 +7128,16 @@
           </a:lstStyle>
           <a:p>
             <a:r>
+              <a:rPr lang="en-GB" dirty="0" err="1"/>
+              <a:t>Funciones</a:t>
+            </a:r>
+            <a:r>
               <a:rPr lang="en-GB" dirty="0"/>
-              <a:t>¿</a:t>
+              <a:t> </a:t>
             </a:r>
             <a:r>
               <a:rPr lang="en-GB" dirty="0" err="1"/>
-              <a:t>Qué</a:t>
-            </a:r>
-            <a:r>
-              <a:rPr lang="en-GB" dirty="0"/>
-              <a:t> es la </a:t>
-            </a:r>
-            <a:r>
-              <a:rPr lang="en-GB" dirty="0" err="1"/>
-              <a:t>programación</a:t>
+              <a:t>como</a:t>
             </a:r>
             <a:r>
               <a:rPr lang="en-GB" dirty="0"/>
@@ -5282,7 +7145,15 @@
             </a:r>
             <a:r>
               <a:rPr lang="en-GB" dirty="0" err="1"/>
-              <a:t>funcional</a:t>
+              <a:t>ciudadanos</a:t>
+            </a:r>
+            <a:r>
+              <a:rPr lang="en-GB" dirty="0"/>
+              <a:t> de primer y alto </a:t>
+            </a:r>
+            <a:r>
+              <a:rPr lang="en-GB" dirty="0" err="1"/>
+              <a:t>orden</a:t>
             </a:r>
           </a:p>
         </p:txBody>
@@ -5339,7 +7210,7 @@
           <a:p>
             <a:r>
               <a:rPr lang="en-GB" dirty="0" err="1"/>
-              <a:t>Características</a:t>
+              <a:t>Inmutabilidad</a:t>
             </a:r>
           </a:p>
         </p:txBody>
@@ -5394,12 +7265,8 @@
               </a:defRPr>
             </a:pPr>
             <a:r>
-              <a:rPr lang="en-US" dirty="0"/>
-              <a:t>Demo </a:t>
-            </a:r>
-            <a:r>
-              <a:rPr lang="en-US" dirty="0" err="1"/>
-              <a:t>composición</a:t>
+              <a:rPr lang="en-US" i="1" dirty="0"/>
+              <a:t>Pattern matching</a:t>
             </a:r>
           </a:p>
         </p:txBody>
@@ -5454,8 +7321,28 @@
               </a:defRPr>
             </a:pPr>
             <a:r>
+              <a:rPr lang="en-US" dirty="0" err="1"/>
+              <a:t>Evaluación</a:t>
+            </a:r>
+            <a:r>
               <a:rPr lang="en-US" dirty="0"/>
-              <a:t>Demo curry</a:t>
+              <a:t> </a:t>
+            </a:r>
+            <a:r>
+              <a:rPr lang="en-US" dirty="0" err="1"/>
+              <a:t>perezosa</a:t>
+            </a:r>
+            <a:r>
+              <a:rPr lang="en-US" dirty="0"/>
+              <a:t> (</a:t>
+            </a:r>
+            <a:r>
+              <a:rPr lang="en-US" i="1" dirty="0"/>
+              <a:t>lazy evaluation</a:t>
+            </a:r>
+            <a:r>
+              <a:rPr lang="en-US" dirty="0"/>
+              <a:t>)</a:t>
             </a:r>
           </a:p>
         </p:txBody>
@@ -5474,7 +7361,7 @@
         </p:nvSpPr>
         <p:spPr>
           <a:xfrm>
-            <a:off x="900112" y="4020746"/>
+            <a:off x="900112" y="3733200"/>
             <a:ext cx="7653195" cy="279401"/>
           </a:xfrm>
           <a:prstGeom prst="rect">
@@ -5511,12 +7398,8 @@
           </a:lstStyle>
           <a:p>
             <a:r>
-              <a:rPr lang="en-US" dirty="0"/>
-              <a:t>Demo </a:t>
-            </a:r>
-            <a:r>
               <a:rPr lang="en-US" dirty="0" err="1"/>
-              <a:t>resolución</a:t>
+              <a:t>Programación</a:t>
             </a:r>
             <a:r>
               <a:rPr lang="en-US" dirty="0"/>
@@ -5524,15 +7407,7 @@
             </a:r>
             <a:r>
               <a:rPr lang="en-US" dirty="0" err="1"/>
-              <a:t>FizzBuzz</a:t>
-            </a:r>
-            <a:r>
-              <a:rPr lang="en-US" dirty="0"/>
-              <a:t> de forma </a:t>
-            </a:r>
-            <a:r>
-              <a:rPr lang="en-US" dirty="0" err="1"/>
-              <a:t>funcional</a:t>
+              <a:t>declarativa</a:t>
             </a:r>
           </a:p>
         </p:txBody>
@@ -5542,7 +7417,7 @@
           <p:cNvPr id="12" name="TextBox 3">
             <a:extLst>
               <a:ext uri="{FF2B5EF4-FFF2-40B4-BE49-F238E27FC236}">
-                <a16:creationId xmlns:a16="http://schemas.microsoft.com/office/drawing/2014/main" id="{21BB56F7-04AF-46C0-9E61-650C58BCF6C6}"/>
+                <a16:creationId xmlns:a16="http://schemas.microsoft.com/office/drawing/2014/main" id="{15793B19-E925-4DC1-B9E7-68B580AEF1AB}"/>
               </a:ext>
             </a:extLst>
           </p:cNvPr>
@@ -5551,75 +7426,7 @@
         </p:nvSpPr>
         <p:spPr>
           <a:xfrm>
-            <a:off x="900112" y="3653092"/>
-            <a:ext cx="7653195" cy="276999"/>
-          </a:xfrm>
-          <a:prstGeom prst="rect">
-            <a:avLst/>
-          </a:prstGeom>
-          <a:ln w="12700">
-            <a:miter lim="400000"/>
-          </a:ln>
-          <a:extLst>
-            <a:ext uri="{C572A759-6A51-4108-AA02-DFA0A04FC94B}">
-              <ma14:wrappingTextBoxFlag xmlns:ma14="http://schemas.microsoft.com/office/mac/drawingml/2011/main" xmlns:a14="http://schemas.microsoft.com/office/drawing/2010/main" xmlns:m="http://schemas.openxmlformats.org/officeDocument/2006/math" xmlns="" val="1"/>
-            </a:ext>
-          </a:extLst>
-        </p:spPr>
-        <p:txBody>
-          <a:bodyPr lIns="0" tIns="0" rIns="0" bIns="0" anchor="t">
-            <a:spAutoFit/>
-          </a:bodyPr>
-          <a:lstStyle/>
-          <a:p>
-            <a:pPr marL="285750" indent="-285750">
-              <a:buSzPct val="100000"/>
-              <a:buFont typeface="Arial"/>
-              <a:buChar char="•"/>
-              <a:defRPr>
-                <a:solidFill>
-                  <a:srgbClr val="242415"/>
-                </a:solidFill>
-                <a:latin typeface="Open Sans"/>
-                <a:ea typeface="Open Sans"/>
-                <a:cs typeface="Open Sans"/>
-                <a:sym typeface="Open Sans"/>
-              </a:defRPr>
-            </a:pPr>
-            <a:r>
-              <a:rPr lang="en-US" dirty="0"/>
-              <a:t>Demo </a:t>
-            </a:r>
-            <a:r>
-              <a:rPr lang="en-US" dirty="0" err="1"/>
-              <a:t>aplicación</a:t>
-            </a:r>
-            <a:r>
-              <a:rPr lang="en-US" dirty="0"/>
-              <a:t> </a:t>
-            </a:r>
-            <a:r>
-              <a:rPr lang="en-US" dirty="0" err="1"/>
-              <a:t>parcial</a:t>
-            </a:r>
-          </a:p>
-        </p:txBody>
-      </p:sp>
-      <p:sp>
-        <p:nvSpPr>
-          <p:cNvPr id="13" name="TextBox 3">
-            <a:extLst>
-              <a:ext uri="{FF2B5EF4-FFF2-40B4-BE49-F238E27FC236}">
-                <a16:creationId xmlns:a16="http://schemas.microsoft.com/office/drawing/2014/main" id="{0EAF63FC-9A3B-4C34-9D6D-4B765384AF8D}"/>
-              </a:ext>
-            </a:extLst>
-          </p:cNvPr>
-          <p:cNvSpPr txBox="1"/>
-          <p:nvPr/>
-        </p:nvSpPr>
-        <p:spPr>
-          <a:xfrm>
-            <a:off x="900111" y="4387368"/>
+            <a:off x="900111" y="4142954"/>
             <a:ext cx="7653195" cy="279401"/>
           </a:xfrm>
           <a:prstGeom prst="rect">
@@ -5656,717 +7463,6 @@
           </a:lstStyle>
           <a:p>
             <a:r>
-              <a:rPr lang="en-US" dirty="0"/>
-              <a:t>Demo transducers</a:t>
-            </a:r>
-            <a:endParaRPr lang="en-US" dirty="0" err="1"/>
-          </a:p>
-        </p:txBody>
-      </p:sp>
-    </p:spTree>
-    <p:extLst>
-      <p:ext uri="{BB962C8B-B14F-4D97-AF65-F5344CB8AC3E}">
-        <p14:creationId xmlns:p14="http://schemas.microsoft.com/office/powerpoint/2010/main" val="801211613"/>
-      </p:ext>
-    </p:extLst>
-  </p:cSld>
-  <p:clrMapOvr>
-    <a:masterClrMapping/>
-  </p:clrMapOvr>
-  <p:transition spd="med"/>
-</p:sld>
-</file>
-
-<file path=ppt/slides/slide12.xml><?xml version="1.0" encoding="utf-8"?>
-<p:sld xmlns:a="http://schemas.openxmlformats.org/drawingml/2006/main" xmlns:r="http://schemas.openxmlformats.org/officeDocument/2006/relationships" xmlns:p="http://schemas.openxmlformats.org/presentationml/2006/main">
-  <p:cSld>
-    <p:spTree>
-      <p:nvGrpSpPr>
-        <p:cNvPr id="1" name=""/>
-        <p:cNvGrpSpPr/>
-        <p:nvPr/>
-      </p:nvGrpSpPr>
-      <p:grpSpPr>
-        <a:xfrm>
-          <a:off x="0" y="0"/>
-          <a:ext cx="0" cy="0"/>
-          <a:chOff x="0" y="0"/>
-          <a:chExt cx="0" cy="0"/>
-        </a:xfrm>
-      </p:grpSpPr>
-      <p:sp>
-        <p:nvSpPr>
-          <p:cNvPr id="112" name="Title 1"/>
-          <p:cNvSpPr txBox="1">
-            <a:spLocks noGrp="1"/>
-          </p:cNvSpPr>
-          <p:nvPr>
-            <p:ph type="title"/>
-          </p:nvPr>
-        </p:nvSpPr>
-        <p:spPr>
-          <a:xfrm>
-            <a:off x="647699" y="-1628"/>
-            <a:ext cx="8245476" cy="810659"/>
-          </a:xfrm>
-          <a:prstGeom prst="rect">
-            <a:avLst/>
-          </a:prstGeom>
-        </p:spPr>
-        <p:txBody>
-          <a:bodyPr lIns="0" tIns="0" rIns="0" bIns="0" anchor="b"/>
-          <a:lstStyle>
-            <a:lvl1pPr>
-              <a:defRPr sz="4000" spc="-300">
-                <a:solidFill>
-                  <a:srgbClr val="242415"/>
-                </a:solidFill>
-                <a:latin typeface="Montserrat SemiBold"/>
-                <a:ea typeface="Montserrat SemiBold"/>
-                <a:cs typeface="Montserrat SemiBold"/>
-                <a:sym typeface="Montserrat SemiBold"/>
-              </a:defRPr>
-            </a:lvl1pPr>
-          </a:lstStyle>
-          <a:p>
-            <a:r>
-              <a:rPr lang="en-GB" dirty="0" err="1"/>
-              <a:t>Características</a:t>
-            </a:r>
-          </a:p>
-        </p:txBody>
-      </p:sp>
-      <p:sp>
-        <p:nvSpPr>
-          <p:cNvPr id="113" name="Rectángulo 17"/>
-          <p:cNvSpPr/>
-          <p:nvPr/>
-        </p:nvSpPr>
-        <p:spPr>
-          <a:xfrm>
-            <a:off x="0" y="0"/>
-            <a:ext cx="254000" cy="5143500"/>
-          </a:xfrm>
-          <a:prstGeom prst="rect">
-            <a:avLst/>
-          </a:prstGeom>
-          <a:solidFill>
-            <a:srgbClr val="D8D800"/>
-          </a:solidFill>
-          <a:ln w="12700">
-            <a:miter lim="400000"/>
-          </a:ln>
-        </p:spPr>
-        <p:txBody>
-          <a:bodyPr lIns="45719" rIns="45719" anchor="ctr"/>
-          <a:lstStyle/>
-          <a:p>
-            <a:pPr algn="ctr">
-              <a:defRPr>
-                <a:solidFill>
-                  <a:srgbClr val="FFFFFF"/>
-                </a:solidFill>
-              </a:defRPr>
-            </a:pPr>
-            <a:endParaRPr/>
-          </a:p>
-        </p:txBody>
-      </p:sp>
-      <p:sp>
-        <p:nvSpPr>
-          <p:cNvPr id="2" name="TextBox 3">
-            <a:extLst>
-              <a:ext uri="{FF2B5EF4-FFF2-40B4-BE49-F238E27FC236}">
-                <a16:creationId xmlns:a16="http://schemas.microsoft.com/office/drawing/2014/main" id="{F690A08F-CCB4-42CD-B511-499C8E6A85C3}"/>
-              </a:ext>
-            </a:extLst>
-          </p:cNvPr>
-          <p:cNvSpPr txBox="1"/>
-          <p:nvPr/>
-        </p:nvSpPr>
-        <p:spPr>
-          <a:xfrm>
-            <a:off x="900110" y="1722391"/>
-            <a:ext cx="7653195" cy="279401"/>
-          </a:xfrm>
-          <a:prstGeom prst="rect">
-            <a:avLst/>
-          </a:prstGeom>
-          <a:ln w="12700">
-            <a:miter lim="400000"/>
-          </a:ln>
-          <a:extLst>
-            <a:ext uri="{C572A759-6A51-4108-AA02-DFA0A04FC94B}">
-              <ma14:wrappingTextBoxFlag xmlns="" xmlns:m="http://schemas.openxmlformats.org/officeDocument/2006/math" xmlns:a14="http://schemas.microsoft.com/office/drawing/2010/main" xmlns:ma14="http://schemas.microsoft.com/office/mac/drawingml/2011/main" val="1"/>
-            </a:ext>
-          </a:extLst>
-        </p:spPr>
-        <p:txBody>
-          <a:bodyPr lIns="0" tIns="0" rIns="0" bIns="0" anchor="t">
-            <a:spAutoFit/>
-          </a:bodyPr>
-          <a:lstStyle/>
-          <a:p>
-            <a:pPr marL="285750" indent="-285750">
-              <a:buSzPct val="100000"/>
-              <a:buFont typeface="Arial"/>
-              <a:buChar char="•"/>
-              <a:defRPr>
-                <a:solidFill>
-                  <a:srgbClr val="242415"/>
-                </a:solidFill>
-                <a:latin typeface="Open Sans"/>
-                <a:ea typeface="Open Sans"/>
-                <a:cs typeface="Open Sans"/>
-                <a:sym typeface="Open Sans"/>
-              </a:defRPr>
-            </a:pPr>
-            <a:r>
-              <a:rPr lang="en-US" dirty="0" err="1"/>
-              <a:t>Funciones</a:t>
-            </a:r>
-            <a:r>
-              <a:rPr lang="en-US" dirty="0"/>
-              <a:t> </a:t>
-            </a:r>
-            <a:r>
-              <a:rPr lang="en-US" dirty="0" err="1"/>
-              <a:t>puras</a:t>
-            </a:r>
-            <a:r>
-              <a:rPr lang="en-US" dirty="0"/>
-              <a:t>, </a:t>
-            </a:r>
-            <a:r>
-              <a:rPr lang="en-US" dirty="0" err="1"/>
-              <a:t>transparencia</a:t>
-            </a:r>
-            <a:r>
-              <a:rPr lang="en-US" dirty="0"/>
-              <a:t> </a:t>
-            </a:r>
-            <a:r>
-              <a:rPr lang="en-US" dirty="0" err="1"/>
-              <a:t>referencial</a:t>
-            </a:r>
-          </a:p>
-        </p:txBody>
-      </p:sp>
-      <p:sp>
-        <p:nvSpPr>
-          <p:cNvPr id="3" name="TextBox 3">
-            <a:extLst>
-              <a:ext uri="{FF2B5EF4-FFF2-40B4-BE49-F238E27FC236}">
-                <a16:creationId xmlns:a16="http://schemas.microsoft.com/office/drawing/2014/main" id="{F8297C39-9EDE-4ED0-AA37-0D780A22784F}"/>
-              </a:ext>
-            </a:extLst>
-          </p:cNvPr>
-          <p:cNvSpPr txBox="1"/>
-          <p:nvPr/>
-        </p:nvSpPr>
-        <p:spPr>
-          <a:xfrm>
-            <a:off x="900112" y="2111613"/>
-            <a:ext cx="7653195" cy="279401"/>
-          </a:xfrm>
-          <a:prstGeom prst="rect">
-            <a:avLst/>
-          </a:prstGeom>
-          <a:ln w="12700">
-            <a:miter lim="400000"/>
-          </a:ln>
-          <a:extLst>
-            <a:ext uri="{C572A759-6A51-4108-AA02-DFA0A04FC94B}">
-              <ma14:wrappingTextBoxFlag xmlns="" xmlns:m="http://schemas.openxmlformats.org/officeDocument/2006/math" xmlns:a14="http://schemas.microsoft.com/office/drawing/2010/main" xmlns:ma14="http://schemas.microsoft.com/office/mac/drawingml/2011/main" val="1"/>
-            </a:ext>
-          </a:extLst>
-        </p:spPr>
-        <p:txBody>
-          <a:bodyPr lIns="0" tIns="0" rIns="0" bIns="0" anchor="t">
-            <a:spAutoFit/>
-          </a:bodyPr>
-          <a:lstStyle/>
-          <a:p>
-            <a:pPr marL="285750" indent="-285750">
-              <a:buSzPct val="100000"/>
-              <a:buFont typeface="Arial"/>
-              <a:buChar char="•"/>
-              <a:defRPr>
-                <a:solidFill>
-                  <a:srgbClr val="242415"/>
-                </a:solidFill>
-                <a:latin typeface="Open Sans"/>
-                <a:ea typeface="Open Sans"/>
-                <a:cs typeface="Open Sans"/>
-                <a:sym typeface="Open Sans"/>
-              </a:defRPr>
-            </a:pPr>
-            <a:r>
-              <a:rPr lang="en-US" dirty="0" err="1"/>
-              <a:t>Recursividad</a:t>
-            </a:r>
-          </a:p>
-        </p:txBody>
-      </p:sp>
-      <p:sp>
-        <p:nvSpPr>
-          <p:cNvPr id="4" name="TextBox 3">
-            <a:extLst>
-              <a:ext uri="{FF2B5EF4-FFF2-40B4-BE49-F238E27FC236}">
-                <a16:creationId xmlns:a16="http://schemas.microsoft.com/office/drawing/2014/main" id="{CDBAADE6-5D1D-4438-A559-8A4576E64C03}"/>
-              </a:ext>
-            </a:extLst>
-          </p:cNvPr>
-          <p:cNvSpPr txBox="1"/>
-          <p:nvPr/>
-        </p:nvSpPr>
-        <p:spPr>
-          <a:xfrm>
-            <a:off x="900112" y="2500835"/>
-            <a:ext cx="7653195" cy="279401"/>
-          </a:xfrm>
-          <a:prstGeom prst="rect">
-            <a:avLst/>
-          </a:prstGeom>
-          <a:ln w="12700">
-            <a:miter lim="400000"/>
-          </a:ln>
-          <a:extLst>
-            <a:ext uri="{C572A759-6A51-4108-AA02-DFA0A04FC94B}">
-              <ma14:wrappingTextBoxFlag xmlns="" xmlns:m="http://schemas.openxmlformats.org/officeDocument/2006/math" xmlns:a14="http://schemas.microsoft.com/office/drawing/2010/main" xmlns:ma14="http://schemas.microsoft.com/office/mac/drawingml/2011/main" val="1"/>
-            </a:ext>
-          </a:extLst>
-        </p:spPr>
-        <p:txBody>
-          <a:bodyPr lIns="0" tIns="0" rIns="0" bIns="0" anchor="t">
-            <a:spAutoFit/>
-          </a:bodyPr>
-          <a:lstStyle>
-            <a:lvl1pPr marL="285750" indent="-285750">
-              <a:buSzPct val="100000"/>
-              <a:buFont typeface="Arial"/>
-              <a:buChar char="•"/>
-              <a:defRPr>
-                <a:solidFill>
-                  <a:srgbClr val="242415"/>
-                </a:solidFill>
-                <a:latin typeface="Open Sans"/>
-                <a:ea typeface="Open Sans"/>
-                <a:cs typeface="Open Sans"/>
-                <a:sym typeface="Open Sans"/>
-              </a:defRPr>
-            </a:lvl1pPr>
-          </a:lstStyle>
-          <a:p>
-            <a:r>
-              <a:rPr lang="en-US" dirty="0" err="1"/>
-              <a:t>Estructuras</a:t>
-            </a:r>
-            <a:r>
-              <a:rPr lang="en-US" dirty="0"/>
-              <a:t> de </a:t>
-            </a:r>
-            <a:r>
-              <a:rPr lang="en-US" dirty="0" err="1"/>
-              <a:t>datos</a:t>
-            </a:r>
-            <a:r>
-              <a:rPr lang="en-US" dirty="0"/>
-              <a:t> </a:t>
-            </a:r>
-            <a:r>
-              <a:rPr lang="en-US" dirty="0" err="1"/>
-              <a:t>algebraicas</a:t>
-            </a:r>
-          </a:p>
-        </p:txBody>
-      </p:sp>
-      <p:sp>
-        <p:nvSpPr>
-          <p:cNvPr id="5" name="TextBox 3">
-            <a:extLst>
-              <a:ext uri="{FF2B5EF4-FFF2-40B4-BE49-F238E27FC236}">
-                <a16:creationId xmlns:a16="http://schemas.microsoft.com/office/drawing/2014/main" id="{E73360E9-93BB-47C9-BD8B-787F0215F172}"/>
-              </a:ext>
-            </a:extLst>
-          </p:cNvPr>
-          <p:cNvSpPr txBox="1"/>
-          <p:nvPr/>
-        </p:nvSpPr>
-        <p:spPr>
-          <a:xfrm>
-            <a:off x="900110" y="943947"/>
-            <a:ext cx="7653195" cy="279401"/>
-          </a:xfrm>
-          <a:prstGeom prst="rect">
-            <a:avLst/>
-          </a:prstGeom>
-          <a:ln w="12700">
-            <a:miter lim="400000"/>
-          </a:ln>
-          <a:extLst>
-            <a:ext uri="{C572A759-6A51-4108-AA02-DFA0A04FC94B}">
-              <ma14:wrappingTextBoxFlag xmlns="" xmlns:m="http://schemas.openxmlformats.org/officeDocument/2006/math" xmlns:a14="http://schemas.microsoft.com/office/drawing/2010/main" xmlns:ma14="http://schemas.microsoft.com/office/mac/drawingml/2011/main" val="1"/>
-            </a:ext>
-          </a:extLst>
-        </p:spPr>
-        <p:txBody>
-          <a:bodyPr lIns="0" tIns="0" rIns="0" bIns="0" anchor="t">
-            <a:spAutoFit/>
-          </a:bodyPr>
-          <a:lstStyle>
-            <a:lvl1pPr marL="285750" indent="-285750">
-              <a:buSzPct val="100000"/>
-              <a:buFont typeface="Arial"/>
-              <a:buChar char="•"/>
-              <a:defRPr>
-                <a:solidFill>
-                  <a:srgbClr val="242415"/>
-                </a:solidFill>
-                <a:latin typeface="Open Sans"/>
-                <a:ea typeface="Open Sans"/>
-                <a:cs typeface="Open Sans"/>
-                <a:sym typeface="Open Sans"/>
-              </a:defRPr>
-            </a:lvl1pPr>
-          </a:lstStyle>
-          <a:p>
-            <a:r>
-              <a:rPr lang="en-GB" dirty="0" err="1"/>
-              <a:t>Funciones</a:t>
-            </a:r>
-            <a:r>
-              <a:rPr lang="en-GB" dirty="0"/>
-              <a:t> </a:t>
-            </a:r>
-            <a:r>
-              <a:rPr lang="en-GB" dirty="0" err="1"/>
-              <a:t>como</a:t>
-            </a:r>
-            <a:r>
-              <a:rPr lang="en-GB" dirty="0"/>
-              <a:t> </a:t>
-            </a:r>
-            <a:r>
-              <a:rPr lang="en-GB" dirty="0" err="1"/>
-              <a:t>ciudadanos</a:t>
-            </a:r>
-            <a:r>
-              <a:rPr lang="en-GB" dirty="0"/>
-              <a:t> de primer y alto </a:t>
-            </a:r>
-            <a:r>
-              <a:rPr lang="en-GB" dirty="0" err="1"/>
-              <a:t>orden</a:t>
-            </a:r>
-          </a:p>
-        </p:txBody>
-      </p:sp>
-      <p:sp>
-        <p:nvSpPr>
-          <p:cNvPr id="6" name="TextBox 3">
-            <a:extLst>
-              <a:ext uri="{FF2B5EF4-FFF2-40B4-BE49-F238E27FC236}">
-                <a16:creationId xmlns:a16="http://schemas.microsoft.com/office/drawing/2014/main" id="{1251CE56-D5F5-4261-A35B-3D6CA8D9363D}"/>
-              </a:ext>
-            </a:extLst>
-          </p:cNvPr>
-          <p:cNvSpPr txBox="1"/>
-          <p:nvPr/>
-        </p:nvSpPr>
-        <p:spPr>
-          <a:xfrm>
-            <a:off x="900110" y="1333169"/>
-            <a:ext cx="7653195" cy="279401"/>
-          </a:xfrm>
-          <a:prstGeom prst="rect">
-            <a:avLst/>
-          </a:prstGeom>
-          <a:ln w="12700">
-            <a:miter lim="400000"/>
-          </a:ln>
-          <a:extLst>
-            <a:ext uri="{C572A759-6A51-4108-AA02-DFA0A04FC94B}">
-              <ma14:wrappingTextBoxFlag xmlns="" xmlns:m="http://schemas.openxmlformats.org/officeDocument/2006/math" xmlns:a14="http://schemas.microsoft.com/office/drawing/2010/main" xmlns:ma14="http://schemas.microsoft.com/office/mac/drawingml/2011/main" val="1"/>
-            </a:ext>
-          </a:extLst>
-        </p:spPr>
-        <p:txBody>
-          <a:bodyPr lIns="0" tIns="0" rIns="0" bIns="0" anchor="t">
-            <a:spAutoFit/>
-          </a:bodyPr>
-          <a:lstStyle>
-            <a:lvl1pPr marL="285750" indent="-285750">
-              <a:buSzPct val="100000"/>
-              <a:buFont typeface="Arial"/>
-              <a:buChar char="•"/>
-              <a:defRPr>
-                <a:solidFill>
-                  <a:srgbClr val="242415"/>
-                </a:solidFill>
-                <a:latin typeface="Open Sans"/>
-                <a:ea typeface="Open Sans"/>
-                <a:cs typeface="Open Sans"/>
-                <a:sym typeface="Open Sans"/>
-              </a:defRPr>
-            </a:lvl1pPr>
-          </a:lstStyle>
-          <a:p>
-            <a:r>
-              <a:rPr lang="en-GB" dirty="0" err="1"/>
-              <a:t>Inmutabilidad</a:t>
-            </a:r>
-          </a:p>
-        </p:txBody>
-      </p:sp>
-      <p:sp>
-        <p:nvSpPr>
-          <p:cNvPr id="7" name="TextBox 3">
-            <a:extLst>
-              <a:ext uri="{FF2B5EF4-FFF2-40B4-BE49-F238E27FC236}">
-                <a16:creationId xmlns:a16="http://schemas.microsoft.com/office/drawing/2014/main" id="{B8304F32-D02C-44C9-9E2C-F7EE3374CB62}"/>
-              </a:ext>
-            </a:extLst>
-          </p:cNvPr>
-          <p:cNvSpPr txBox="1"/>
-          <p:nvPr/>
-        </p:nvSpPr>
-        <p:spPr>
-          <a:xfrm>
-            <a:off x="900112" y="2890058"/>
-            <a:ext cx="7653195" cy="279401"/>
-          </a:xfrm>
-          <a:prstGeom prst="rect">
-            <a:avLst/>
-          </a:prstGeom>
-          <a:ln w="12700">
-            <a:miter lim="400000"/>
-          </a:ln>
-          <a:extLst>
-            <a:ext uri="{C572A759-6A51-4108-AA02-DFA0A04FC94B}">
-              <ma14:wrappingTextBoxFlag xmlns="" xmlns:m="http://schemas.openxmlformats.org/officeDocument/2006/math" xmlns:a14="http://schemas.microsoft.com/office/drawing/2010/main" xmlns:ma14="http://schemas.microsoft.com/office/mac/drawingml/2011/main" val="1"/>
-            </a:ext>
-          </a:extLst>
-        </p:spPr>
-        <p:txBody>
-          <a:bodyPr lIns="0" tIns="0" rIns="0" bIns="0" anchor="t">
-            <a:spAutoFit/>
-          </a:bodyPr>
-          <a:lstStyle/>
-          <a:p>
-            <a:pPr marL="285750" indent="-285750">
-              <a:buSzPct val="100000"/>
-              <a:buFont typeface="Arial"/>
-              <a:buChar char="•"/>
-              <a:defRPr>
-                <a:solidFill>
-                  <a:srgbClr val="242415"/>
-                </a:solidFill>
-                <a:latin typeface="Open Sans"/>
-                <a:ea typeface="Open Sans"/>
-                <a:cs typeface="Open Sans"/>
-                <a:sym typeface="Open Sans"/>
-              </a:defRPr>
-            </a:pPr>
-            <a:r>
-              <a:rPr lang="en-US" i="1" dirty="0"/>
-              <a:t>Pattern matching</a:t>
-            </a:r>
-          </a:p>
-        </p:txBody>
-      </p:sp>
-      <p:sp>
-        <p:nvSpPr>
-          <p:cNvPr id="8" name="TextBox 3">
-            <a:extLst>
-              <a:ext uri="{FF2B5EF4-FFF2-40B4-BE49-F238E27FC236}">
-                <a16:creationId xmlns:a16="http://schemas.microsoft.com/office/drawing/2014/main" id="{F46CD173-39DD-4D21-8347-51D6DEB34691}"/>
-              </a:ext>
-            </a:extLst>
-          </p:cNvPr>
-          <p:cNvSpPr txBox="1"/>
-          <p:nvPr/>
-        </p:nvSpPr>
-        <p:spPr>
-          <a:xfrm>
-            <a:off x="900112" y="3279280"/>
-            <a:ext cx="7653195" cy="276999"/>
-          </a:xfrm>
-          <a:prstGeom prst="rect">
-            <a:avLst/>
-          </a:prstGeom>
-          <a:ln w="12700">
-            <a:miter lim="400000"/>
-          </a:ln>
-          <a:extLst>
-            <a:ext uri="{C572A759-6A51-4108-AA02-DFA0A04FC94B}">
-              <ma14:wrappingTextBoxFlag xmlns="" xmlns:m="http://schemas.openxmlformats.org/officeDocument/2006/math" xmlns:a14="http://schemas.microsoft.com/office/drawing/2010/main" xmlns:ma14="http://schemas.microsoft.com/office/mac/drawingml/2011/main" val="1"/>
-            </a:ext>
-          </a:extLst>
-        </p:spPr>
-        <p:txBody>
-          <a:bodyPr lIns="0" tIns="0" rIns="0" bIns="0" anchor="t">
-            <a:spAutoFit/>
-          </a:bodyPr>
-          <a:lstStyle/>
-          <a:p>
-            <a:pPr marL="285750" indent="-285750">
-              <a:buSzPct val="100000"/>
-              <a:buFont typeface="Arial"/>
-              <a:buChar char="•"/>
-              <a:defRPr>
-                <a:solidFill>
-                  <a:srgbClr val="242415"/>
-                </a:solidFill>
-                <a:latin typeface="Open Sans"/>
-                <a:ea typeface="Open Sans"/>
-                <a:cs typeface="Open Sans"/>
-                <a:sym typeface="Open Sans"/>
-              </a:defRPr>
-            </a:pPr>
-            <a:r>
-              <a:rPr lang="en-US" dirty="0" err="1"/>
-              <a:t>Evaluación</a:t>
-            </a:r>
-            <a:r>
-              <a:rPr lang="en-US" dirty="0"/>
-              <a:t> </a:t>
-            </a:r>
-            <a:r>
-              <a:rPr lang="en-US" dirty="0" err="1"/>
-              <a:t>perezosa</a:t>
-            </a:r>
-            <a:r>
-              <a:rPr lang="en-US" dirty="0"/>
-              <a:t> (</a:t>
-            </a:r>
-            <a:r>
-              <a:rPr lang="en-US" i="1" dirty="0"/>
-              <a:t>lazy evaluation</a:t>
-            </a:r>
-            <a:r>
-              <a:rPr lang="en-US" dirty="0"/>
-              <a:t>)</a:t>
-            </a:r>
-          </a:p>
-        </p:txBody>
-      </p:sp>
-      <p:sp>
-        <p:nvSpPr>
-          <p:cNvPr id="9" name="TextBox 3">
-            <a:extLst>
-              <a:ext uri="{FF2B5EF4-FFF2-40B4-BE49-F238E27FC236}">
-                <a16:creationId xmlns:a16="http://schemas.microsoft.com/office/drawing/2014/main" id="{F322B547-8EBF-4910-B2C5-45844AF78EE5}"/>
-              </a:ext>
-            </a:extLst>
-          </p:cNvPr>
-          <p:cNvSpPr txBox="1"/>
-          <p:nvPr/>
-        </p:nvSpPr>
-        <p:spPr>
-          <a:xfrm>
-            <a:off x="900112" y="3733200"/>
-            <a:ext cx="7653195" cy="279401"/>
-          </a:xfrm>
-          <a:prstGeom prst="rect">
-            <a:avLst/>
-          </a:prstGeom>
-          <a:ln w="12700">
-            <a:miter lim="400000"/>
-          </a:ln>
-          <a:extLst>
-            <a:ext uri="{C572A759-6A51-4108-AA02-DFA0A04FC94B}">
-              <ma14:wrappingTextBoxFlag xmlns="" xmlns:m="http://schemas.openxmlformats.org/officeDocument/2006/math" xmlns:a14="http://schemas.microsoft.com/office/drawing/2010/main" xmlns:ma14="http://schemas.microsoft.com/office/mac/drawingml/2011/main" val="1"/>
-            </a:ext>
-          </a:extLst>
-        </p:spPr>
-        <p:txBody>
-          <a:bodyPr lIns="0" tIns="0" rIns="0" bIns="0" anchor="t">
-            <a:spAutoFit/>
-          </a:bodyPr>
-          <a:lstStyle>
-            <a:lvl1pPr marL="285750" indent="-285750">
-              <a:buSzPct val="100000"/>
-              <a:buFont typeface="Arial"/>
-              <a:buChar char="•"/>
-              <a:defRPr>
-                <a:solidFill>
-                  <a:srgbClr val="242415"/>
-                </a:solidFill>
-                <a:latin typeface="Open Sans"/>
-                <a:ea typeface="Open Sans"/>
-                <a:cs typeface="Open Sans"/>
-                <a:sym typeface="Open Sans"/>
-              </a:defRPr>
-            </a:lvl1pPr>
-          </a:lstStyle>
-          <a:p>
-            <a:r>
-              <a:rPr lang="en-US" dirty="0" err="1"/>
-              <a:t>Programación</a:t>
-            </a:r>
-            <a:r>
-              <a:rPr lang="en-US" dirty="0"/>
-              <a:t> </a:t>
-            </a:r>
-            <a:r>
-              <a:rPr lang="en-US" dirty="0" err="1"/>
-              <a:t>declarativa</a:t>
-            </a:r>
-          </a:p>
-        </p:txBody>
-      </p:sp>
-      <p:sp>
-        <p:nvSpPr>
-          <p:cNvPr id="12" name="TextBox 3">
-            <a:extLst>
-              <a:ext uri="{FF2B5EF4-FFF2-40B4-BE49-F238E27FC236}">
-                <a16:creationId xmlns:a16="http://schemas.microsoft.com/office/drawing/2014/main" id="{15793B19-E925-4DC1-B9E7-68B580AEF1AB}"/>
-              </a:ext>
-            </a:extLst>
-          </p:cNvPr>
-          <p:cNvSpPr txBox="1"/>
-          <p:nvPr/>
-        </p:nvSpPr>
-        <p:spPr>
-          <a:xfrm>
-            <a:off x="900111" y="4142954"/>
-            <a:ext cx="7653195" cy="279401"/>
-          </a:xfrm>
-          <a:prstGeom prst="rect">
-            <a:avLst/>
-          </a:prstGeom>
-          <a:ln w="12700">
-            <a:miter lim="400000"/>
-          </a:ln>
-          <a:extLst>
-            <a:ext uri="{C572A759-6A51-4108-AA02-DFA0A04FC94B}">
-              <ma14:wrappingTextBoxFlag xmlns:ma14="http://schemas.microsoft.com/office/mac/drawingml/2011/main" xmlns:a14="http://schemas.microsoft.com/office/drawing/2010/main" xmlns:m="http://schemas.openxmlformats.org/officeDocument/2006/math" xmlns="" val="1"/>
-            </a:ext>
-          </a:extLst>
-        </p:spPr>
-        <p:txBody>
-          <a:bodyPr lIns="0" tIns="0" rIns="0" bIns="0" anchor="t">
-            <a:spAutoFit/>
-          </a:bodyPr>
-          <a:lstStyle>
-            <a:lvl1pPr marL="285750" indent="-285750">
-              <a:buSzPct val="100000"/>
-              <a:buFont typeface="Arial"/>
-              <a:buChar char="•"/>
-              <a:defRPr>
-                <a:solidFill>
-                  <a:srgbClr val="242415"/>
-                </a:solidFill>
-                <a:latin typeface="Open Sans"/>
-                <a:ea typeface="Open Sans"/>
-                <a:cs typeface="Open Sans"/>
-                <a:sym typeface="Open Sans"/>
-              </a:defRPr>
-            </a:lvl1pPr>
-          </a:lstStyle>
-          <a:p>
-            <a:r>
               <a:rPr lang="en-US" dirty="0" err="1"/>
               <a:t>Guardas</a:t>
             </a:r>
@@ -6416,7 +7512,7 @@
 </p:sld>
 </file>
 
-<file path=ppt/slides/slide13.xml><?xml version="1.0" encoding="utf-8"?>
+<file path=ppt/slides/slide17.xml><?xml version="1.0" encoding="utf-8"?>
 <p:sld xmlns:a="http://schemas.openxmlformats.org/drawingml/2006/main" xmlns:r="http://schemas.openxmlformats.org/officeDocument/2006/relationships" xmlns:p="http://schemas.openxmlformats.org/presentationml/2006/main">
   <p:cSld>
     <p:spTree>
@@ -7079,7 +8175,7 @@
 </p:sld>
 </file>
 
-<file path=ppt/slides/slide14.xml><?xml version="1.0" encoding="utf-8"?>
+<file path=ppt/slides/slide18.xml><?xml version="1.0" encoding="utf-8"?>
 <p:sld xmlns:a="http://schemas.openxmlformats.org/drawingml/2006/main" xmlns:r="http://schemas.openxmlformats.org/officeDocument/2006/relationships" xmlns:p="http://schemas.openxmlformats.org/presentationml/2006/main">
   <p:cSld>
     <p:spTree>
@@ -7133,8 +8229,8 @@
         </p:nvSpPr>
         <p:spPr>
           <a:xfrm rot="5400000">
-            <a:off x="4426749" y="2036654"/>
-            <a:ext cx="252001" cy="3395926"/>
+            <a:off x="4448672" y="2225691"/>
+            <a:ext cx="252001" cy="3017856"/>
           </a:xfrm>
           <a:prstGeom prst="rect">
             <a:avLst/>
@@ -7207,7 +8303,7 @@
           <a:p>
             <a:r>
               <a:rPr lang="en-GB" dirty="0"/>
-              <a:t>Demo time</a:t>
+              <a:t>Demo time </a:t>
             </a:r>
             <a:r>
               <a:rPr dirty="0"/>
@@ -7230,7 +8326,7 @@
 </p:sld>
 </file>
 
-<file path=ppt/slides/slide15.xml><?xml version="1.0" encoding="utf-8"?>
+<file path=ppt/slides/slide19.xml><?xml version="1.0" encoding="utf-8"?>
 <p:sld xmlns:a="http://schemas.openxmlformats.org/drawingml/2006/main" xmlns:r="http://schemas.openxmlformats.org/officeDocument/2006/relationships" xmlns:p="http://schemas.openxmlformats.org/presentationml/2006/main">
   <p:cSld>
     <p:spTree>
@@ -9741,6 +10837,7 @@
             </a:lstStyle>
             <a:p>
               <a:r>
+                <a:rPr dirty="0"/>
                 <a:t>1998</a:t>
               </a:r>
             </a:p>
@@ -12840,7 +13937,32 @@
             </a:lstStyle>
             <a:p>
               <a:r>
-                <a:t>No sólo se puede utilizar para Desarrollo Web</a:t>
+                <a:rPr dirty="0"/>
+                <a:t>No </a:t>
+              </a:r>
+              <a:r>
+                <a:rPr dirty="0" err="1"/>
+                <a:t>sólo</a:t>
+              </a:r>
+              <a:r>
+                <a:rPr dirty="0"/>
+                <a:t> se </a:t>
+              </a:r>
+              <a:r>
+                <a:rPr dirty="0" err="1"/>
+                <a:t>puede</a:t>
+              </a:r>
+              <a:r>
+                <a:rPr dirty="0"/>
+                <a:t> </a:t>
+              </a:r>
+              <a:r>
+                <a:rPr dirty="0" err="1"/>
+                <a:t>utilizar</a:t>
+              </a:r>
+              <a:r>
+                <a:rPr dirty="0"/>
+                <a:t> para Desarrollo Web</a:t>
               </a:r>
             </a:p>
           </p:txBody>
@@ -15599,14 +16721,57 @@
       </p:grpSpPr>
       <p:sp>
         <p:nvSpPr>
-          <p:cNvPr id="296" name="Rectángulo 3"/>
+          <p:cNvPr id="112" name="Title 1"/>
+          <p:cNvSpPr txBox="1">
+            <a:spLocks noGrp="1"/>
+          </p:cNvSpPr>
+          <p:nvPr>
+            <p:ph type="title"/>
+          </p:nvPr>
+        </p:nvSpPr>
+        <p:spPr>
+          <a:xfrm>
+            <a:off x="647699" y="-1628"/>
+            <a:ext cx="8245476" cy="810659"/>
+          </a:xfrm>
+          <a:prstGeom prst="rect">
+            <a:avLst/>
+          </a:prstGeom>
+        </p:spPr>
+        <p:txBody>
+          <a:bodyPr lIns="0" tIns="0" rIns="0" bIns="0" anchor="b"/>
+          <a:lstStyle>
+            <a:lvl1pPr>
+              <a:defRPr sz="4000" spc="-300">
+                <a:solidFill>
+                  <a:srgbClr val="242415"/>
+                </a:solidFill>
+                <a:latin typeface="Montserrat SemiBold"/>
+                <a:ea typeface="Montserrat SemiBold"/>
+                <a:cs typeface="Montserrat SemiBold"/>
+                <a:sym typeface="Montserrat SemiBold"/>
+              </a:defRPr>
+            </a:lvl1pPr>
+          </a:lstStyle>
+          <a:p>
+            <a:r>
+              <a:rPr lang="en-GB"/>
+              <a:t>Qué es TypeScript?</a:t>
+            </a:r>
+            <a:endParaRPr lang="en-GB" dirty="0"/>
+          </a:p>
+        </p:txBody>
+      </p:sp>
+      <p:sp>
+        <p:nvSpPr>
+          <p:cNvPr id="113" name="Rectángulo 17"/>
           <p:cNvSpPr/>
           <p:nvPr/>
         </p:nvSpPr>
         <p:spPr>
           <a:xfrm>
-            <a:off x="0" y="3443907"/>
-            <a:ext cx="9144000" cy="1699593"/>
+            <a:off x="0" y="0"/>
+            <a:ext cx="254000" cy="5143500"/>
           </a:xfrm>
           <a:prstGeom prst="rect">
             <a:avLst/>
@@ -15635,14 +16800,133 @@
       </p:sp>
       <p:sp>
         <p:nvSpPr>
-          <p:cNvPr id="297" name="Title 1"/>
+          <p:cNvPr id="2" name="TextBox 3">
+            <a:extLst>
+              <a:ext uri="{FF2B5EF4-FFF2-40B4-BE49-F238E27FC236}">
+                <a16:creationId xmlns:a16="http://schemas.microsoft.com/office/drawing/2014/main" id="{F690A08F-CCB4-42CD-B511-499C8E6A85C3}"/>
+              </a:ext>
+            </a:extLst>
+          </p:cNvPr>
           <p:cNvSpPr txBox="1"/>
           <p:nvPr/>
         </p:nvSpPr>
         <p:spPr>
           <a:xfrm>
-            <a:off x="572754" y="2270924"/>
-            <a:ext cx="8320421" cy="923330"/>
+            <a:off x="900110" y="1722391"/>
+            <a:ext cx="7653195" cy="279401"/>
+          </a:xfrm>
+          <a:prstGeom prst="rect">
+            <a:avLst/>
+          </a:prstGeom>
+          <a:ln w="12700">
+            <a:miter lim="400000"/>
+          </a:ln>
+          <a:extLst>
+            <a:ext uri="{C572A759-6A51-4108-AA02-DFA0A04FC94B}">
+              <ma14:wrappingTextBoxFlag xmlns:ma14="http://schemas.microsoft.com/office/mac/drawingml/2011/main" xmlns:a14="http://schemas.microsoft.com/office/drawing/2010/main" xmlns:m="http://schemas.openxmlformats.org/officeDocument/2006/math" xmlns="" val="1"/>
+            </a:ext>
+          </a:extLst>
+        </p:spPr>
+        <p:txBody>
+          <a:bodyPr lIns="0" tIns="0" rIns="0" bIns="0" anchor="t">
+            <a:spAutoFit/>
+          </a:bodyPr>
+          <a:lstStyle/>
+          <a:p>
+            <a:pPr marL="285750" indent="-285750">
+              <a:buSzPct val="100000"/>
+              <a:buFont typeface="Arial"/>
+              <a:buChar char="•"/>
+              <a:defRPr>
+                <a:solidFill>
+                  <a:srgbClr val="242415"/>
+                </a:solidFill>
+                <a:latin typeface="Open Sans"/>
+                <a:ea typeface="Open Sans"/>
+                <a:cs typeface="Open Sans"/>
+                <a:sym typeface="Open Sans"/>
+              </a:defRPr>
+            </a:pPr>
+            <a:r>
+              <a:rPr lang="en-US"/>
+              <a:t>Diseñado para desarrollo de grandes aplicaciones</a:t>
+            </a:r>
+            <a:endParaRPr lang="en-US" dirty="0"/>
+          </a:p>
+        </p:txBody>
+      </p:sp>
+      <p:sp>
+        <p:nvSpPr>
+          <p:cNvPr id="3" name="TextBox 3">
+            <a:extLst>
+              <a:ext uri="{FF2B5EF4-FFF2-40B4-BE49-F238E27FC236}">
+                <a16:creationId xmlns:a16="http://schemas.microsoft.com/office/drawing/2014/main" id="{F8297C39-9EDE-4ED0-AA37-0D780A22784F}"/>
+              </a:ext>
+            </a:extLst>
+          </p:cNvPr>
+          <p:cNvSpPr txBox="1"/>
+          <p:nvPr/>
+        </p:nvSpPr>
+        <p:spPr>
+          <a:xfrm>
+            <a:off x="900112" y="2111613"/>
+            <a:ext cx="7653195" cy="279401"/>
+          </a:xfrm>
+          <a:prstGeom prst="rect">
+            <a:avLst/>
+          </a:prstGeom>
+          <a:ln w="12700">
+            <a:miter lim="400000"/>
+          </a:ln>
+          <a:extLst>
+            <a:ext uri="{C572A759-6A51-4108-AA02-DFA0A04FC94B}">
+              <ma14:wrappingTextBoxFlag xmlns:ma14="http://schemas.microsoft.com/office/mac/drawingml/2011/main" xmlns:a14="http://schemas.microsoft.com/office/drawing/2010/main" xmlns:m="http://schemas.openxmlformats.org/officeDocument/2006/math" xmlns="" val="1"/>
+            </a:ext>
+          </a:extLst>
+        </p:spPr>
+        <p:txBody>
+          <a:bodyPr lIns="0" tIns="0" rIns="0" bIns="0" anchor="t">
+            <a:spAutoFit/>
+          </a:bodyPr>
+          <a:lstStyle/>
+          <a:p>
+            <a:pPr marL="285750" indent="-285750">
+              <a:buSzPct val="100000"/>
+              <a:buFont typeface="Arial"/>
+              <a:buChar char="•"/>
+              <a:defRPr>
+                <a:solidFill>
+                  <a:srgbClr val="242415"/>
+                </a:solidFill>
+                <a:latin typeface="Open Sans"/>
+                <a:ea typeface="Open Sans"/>
+                <a:cs typeface="Open Sans"/>
+                <a:sym typeface="Open Sans"/>
+              </a:defRPr>
+            </a:pPr>
+            <a:r>
+              <a:rPr lang="en-US"/>
+              <a:t>Creado por Microsoft (Anders Hejlsberg, padre de C#)</a:t>
+            </a:r>
+          </a:p>
+        </p:txBody>
+      </p:sp>
+      <p:sp>
+        <p:nvSpPr>
+          <p:cNvPr id="4" name="TextBox 3">
+            <a:extLst>
+              <a:ext uri="{FF2B5EF4-FFF2-40B4-BE49-F238E27FC236}">
+                <a16:creationId xmlns:a16="http://schemas.microsoft.com/office/drawing/2014/main" id="{CDBAADE6-5D1D-4438-A559-8A4576E64C03}"/>
+              </a:ext>
+            </a:extLst>
+          </p:cNvPr>
+          <p:cNvSpPr txBox="1"/>
+          <p:nvPr/>
+        </p:nvSpPr>
+        <p:spPr>
+          <a:xfrm>
+            <a:off x="900112" y="2500835"/>
+            <a:ext cx="7653195" cy="553998"/>
           </a:xfrm>
           <a:prstGeom prst="rect">
             <a:avLst/>
@@ -15661,39 +16945,65 @@
             <a:spAutoFit/>
           </a:bodyPr>
           <a:lstStyle>
-            <a:lvl1pPr>
-              <a:tabLst>
-                <a:tab pos="88900" algn="l"/>
-              </a:tabLst>
-              <a:defRPr sz="7200" spc="-300">
+            <a:lvl1pPr marL="285750" indent="-285750">
+              <a:buSzPct val="100000"/>
+              <a:buFont typeface="Arial"/>
+              <a:buChar char="•"/>
+              <a:defRPr>
                 <a:solidFill>
                   <a:srgbClr val="242415"/>
                 </a:solidFill>
-                <a:latin typeface="Montserrat SemiBold"/>
-                <a:ea typeface="Montserrat SemiBold"/>
-                <a:cs typeface="Montserrat SemiBold"/>
-                <a:sym typeface="Montserrat SemiBold"/>
+                <a:latin typeface="Open Sans"/>
+                <a:ea typeface="Open Sans"/>
+                <a:cs typeface="Open Sans"/>
+                <a:sym typeface="Open Sans"/>
               </a:defRPr>
             </a:lvl1pPr>
           </a:lstStyle>
           <a:p>
             <a:r>
-              <a:rPr lang="es-ES_tradnl" sz="6000" dirty="0"/>
-              <a:t>Programación funcional</a:t>
-            </a:r>
+              <a:rPr lang="en-GB">
+                <a:solidFill>
+                  <a:srgbClr val="000000"/>
+                </a:solidFill>
+              </a:rPr>
+              <a:t>Produce como resultado JavaScript mediante </a:t>
+            </a:r>
+            <a:r>
+              <a:rPr lang="en-GB" i="1">
+                <a:solidFill>
+                  <a:srgbClr val="000000"/>
+                </a:solidFill>
+              </a:rPr>
+              <a:t>transpilación</a:t>
+            </a:r>
+            <a:endParaRPr lang="en-GB"/>
+          </a:p>
+          <a:p>
+            <a:endParaRPr lang="en-GB" dirty="0">
+              <a:solidFill>
+                <a:srgbClr val="000000"/>
+              </a:solidFill>
+            </a:endParaRPr>
           </a:p>
         </p:txBody>
       </p:sp>
       <p:sp>
         <p:nvSpPr>
-          <p:cNvPr id="298" name="Title 1"/>
+          <p:cNvPr id="5" name="TextBox 3">
+            <a:extLst>
+              <a:ext uri="{FF2B5EF4-FFF2-40B4-BE49-F238E27FC236}">
+                <a16:creationId xmlns:a16="http://schemas.microsoft.com/office/drawing/2014/main" id="{E73360E9-93BB-47C9-BD8B-787F0215F172}"/>
+              </a:ext>
+            </a:extLst>
+          </p:cNvPr>
           <p:cNvSpPr txBox="1"/>
           <p:nvPr/>
         </p:nvSpPr>
         <p:spPr>
           <a:xfrm>
-            <a:off x="647699" y="3442251"/>
-            <a:ext cx="8245476" cy="756001"/>
+            <a:off x="900110" y="943947"/>
+            <a:ext cx="7653195" cy="279401"/>
           </a:xfrm>
           <a:prstGeom prst="rect">
             <a:avLst/>
@@ -15708,14 +17018,17 @@
           </a:extLst>
         </p:spPr>
         <p:txBody>
-          <a:bodyPr lIns="0" tIns="0" rIns="0" bIns="0" anchor="b">
-            <a:normAutofit/>
+          <a:bodyPr lIns="0" tIns="0" rIns="0" bIns="0" anchor="t">
+            <a:spAutoFit/>
           </a:bodyPr>
           <a:lstStyle>
-            <a:lvl1pPr>
-              <a:defRPr sz="3900" spc="-200">
+            <a:lvl1pPr marL="285750" indent="-285750">
+              <a:buSzPct val="100000"/>
+              <a:buFont typeface="Arial"/>
+              <a:buChar char="•"/>
+              <a:defRPr>
                 <a:solidFill>
-                  <a:srgbClr val="FFFFFF"/>
+                  <a:srgbClr val="242415"/>
                 </a:solidFill>
                 <a:latin typeface="Open Sans"/>
                 <a:ea typeface="Open Sans"/>
@@ -15726,14 +17039,301 @@
           </a:lstStyle>
           <a:p>
             <a:r>
-              <a:t>Introducción</a:t>
-            </a:r>
+              <a:rPr lang="en-GB"/>
+              <a:t>Superset de JavaScript</a:t>
+            </a:r>
+            <a:endParaRPr lang="en-GB" err="1"/>
+          </a:p>
+        </p:txBody>
+      </p:sp>
+      <p:sp>
+        <p:nvSpPr>
+          <p:cNvPr id="6" name="TextBox 3">
+            <a:extLst>
+              <a:ext uri="{FF2B5EF4-FFF2-40B4-BE49-F238E27FC236}">
+                <a16:creationId xmlns:a16="http://schemas.microsoft.com/office/drawing/2014/main" id="{1251CE56-D5F5-4261-A35B-3D6CA8D9363D}"/>
+              </a:ext>
+            </a:extLst>
+          </p:cNvPr>
+          <p:cNvSpPr txBox="1"/>
+          <p:nvPr/>
+        </p:nvSpPr>
+        <p:spPr>
+          <a:xfrm>
+            <a:off x="900110" y="1333169"/>
+            <a:ext cx="7653195" cy="276999"/>
+          </a:xfrm>
+          <a:prstGeom prst="rect">
+            <a:avLst/>
+          </a:prstGeom>
+          <a:ln w="12700">
+            <a:miter lim="400000"/>
+          </a:ln>
+          <a:extLst>
+            <a:ext uri="{C572A759-6A51-4108-AA02-DFA0A04FC94B}">
+              <ma14:wrappingTextBoxFlag xmlns:ma14="http://schemas.microsoft.com/office/mac/drawingml/2011/main" xmlns:a14="http://schemas.microsoft.com/office/drawing/2010/main" xmlns:m="http://schemas.openxmlformats.org/officeDocument/2006/math" xmlns="" val="1"/>
+            </a:ext>
+          </a:extLst>
+        </p:spPr>
+        <p:txBody>
+          <a:bodyPr lIns="0" tIns="0" rIns="0" bIns="0" anchor="t">
+            <a:spAutoFit/>
+          </a:bodyPr>
+          <a:lstStyle>
+            <a:lvl1pPr marL="285750" indent="-285750">
+              <a:buSzPct val="100000"/>
+              <a:buFont typeface="Arial"/>
+              <a:buChar char="•"/>
+              <a:defRPr>
+                <a:solidFill>
+                  <a:srgbClr val="242415"/>
+                </a:solidFill>
+                <a:latin typeface="Open Sans"/>
+                <a:ea typeface="Open Sans"/>
+                <a:cs typeface="Open Sans"/>
+                <a:sym typeface="Open Sans"/>
+              </a:defRPr>
+            </a:lvl1pPr>
+          </a:lstStyle>
+          <a:p>
+            <a:r>
+              <a:rPr lang="en-US">
+                <a:solidFill>
+                  <a:srgbClr val="000000"/>
+                </a:solidFill>
+              </a:rPr>
+              <a:t>Añade tipos estáticos a JavaScript</a:t>
+            </a:r>
+            <a:endParaRPr lang="en-GB" i="1"/>
+          </a:p>
+        </p:txBody>
+      </p:sp>
+      <p:sp>
+        <p:nvSpPr>
+          <p:cNvPr id="7" name="TextBox 3">
+            <a:extLst>
+              <a:ext uri="{FF2B5EF4-FFF2-40B4-BE49-F238E27FC236}">
+                <a16:creationId xmlns:a16="http://schemas.microsoft.com/office/drawing/2014/main" id="{B8304F32-D02C-44C9-9E2C-F7EE3374CB62}"/>
+              </a:ext>
+            </a:extLst>
+          </p:cNvPr>
+          <p:cNvSpPr txBox="1"/>
+          <p:nvPr/>
+        </p:nvSpPr>
+        <p:spPr>
+          <a:xfrm>
+            <a:off x="900112" y="2890058"/>
+            <a:ext cx="7653195" cy="279401"/>
+          </a:xfrm>
+          <a:prstGeom prst="rect">
+            <a:avLst/>
+          </a:prstGeom>
+          <a:ln w="12700">
+            <a:miter lim="400000"/>
+          </a:ln>
+          <a:extLst>
+            <a:ext uri="{C572A759-6A51-4108-AA02-DFA0A04FC94B}">
+              <ma14:wrappingTextBoxFlag xmlns:ma14="http://schemas.microsoft.com/office/mac/drawingml/2011/main" xmlns:a14="http://schemas.microsoft.com/office/drawing/2010/main" xmlns:m="http://schemas.openxmlformats.org/officeDocument/2006/math" xmlns="" val="1"/>
+            </a:ext>
+          </a:extLst>
+        </p:spPr>
+        <p:txBody>
+          <a:bodyPr lIns="0" tIns="0" rIns="0" bIns="0" anchor="t">
+            <a:spAutoFit/>
+          </a:bodyPr>
+          <a:lstStyle/>
+          <a:p>
+            <a:pPr marL="285750" indent="-285750">
+              <a:buSzPct val="100000"/>
+              <a:buFont typeface="Arial"/>
+              <a:buChar char="•"/>
+              <a:defRPr>
+                <a:solidFill>
+                  <a:srgbClr val="242415"/>
+                </a:solidFill>
+                <a:latin typeface="Open Sans"/>
+                <a:ea typeface="Open Sans"/>
+                <a:cs typeface="Open Sans"/>
+                <a:sym typeface="Open Sans"/>
+              </a:defRPr>
+            </a:pPr>
+            <a:r>
+              <a:rPr lang="en-US"/>
+              <a:t>Fácil de integrar en proyectos JavaScript</a:t>
+            </a:r>
+            <a:endParaRPr lang="en-US" dirty="0"/>
+          </a:p>
+        </p:txBody>
+      </p:sp>
+      <p:sp>
+        <p:nvSpPr>
+          <p:cNvPr id="8" name="TextBox 3">
+            <a:extLst>
+              <a:ext uri="{FF2B5EF4-FFF2-40B4-BE49-F238E27FC236}">
+                <a16:creationId xmlns:a16="http://schemas.microsoft.com/office/drawing/2014/main" id="{F46CD173-39DD-4D21-8347-51D6DEB34691}"/>
+              </a:ext>
+            </a:extLst>
+          </p:cNvPr>
+          <p:cNvSpPr txBox="1"/>
+          <p:nvPr/>
+        </p:nvSpPr>
+        <p:spPr>
+          <a:xfrm>
+            <a:off x="900112" y="3279280"/>
+            <a:ext cx="7653195" cy="276999"/>
+          </a:xfrm>
+          <a:prstGeom prst="rect">
+            <a:avLst/>
+          </a:prstGeom>
+          <a:ln w="12700">
+            <a:miter lim="400000"/>
+          </a:ln>
+          <a:extLst>
+            <a:ext uri="{C572A759-6A51-4108-AA02-DFA0A04FC94B}">
+              <ma14:wrappingTextBoxFlag xmlns:ma14="http://schemas.microsoft.com/office/mac/drawingml/2011/main" xmlns:a14="http://schemas.microsoft.com/office/drawing/2010/main" xmlns:m="http://schemas.openxmlformats.org/officeDocument/2006/math" xmlns="" val="1"/>
+            </a:ext>
+          </a:extLst>
+        </p:spPr>
+        <p:txBody>
+          <a:bodyPr lIns="0" tIns="0" rIns="0" bIns="0" anchor="t">
+            <a:spAutoFit/>
+          </a:bodyPr>
+          <a:lstStyle/>
+          <a:p>
+            <a:pPr marL="285750" indent="-285750">
+              <a:buSzPct val="100000"/>
+              <a:buFont typeface="Arial"/>
+              <a:buChar char="•"/>
+              <a:defRPr>
+                <a:solidFill>
+                  <a:srgbClr val="242415"/>
+                </a:solidFill>
+                <a:latin typeface="Open Sans"/>
+                <a:ea typeface="Open Sans"/>
+                <a:cs typeface="Open Sans"/>
+                <a:sym typeface="Open Sans"/>
+              </a:defRPr>
+            </a:pPr>
+            <a:endParaRPr lang="en-US" dirty="0"/>
+          </a:p>
+        </p:txBody>
+      </p:sp>
+      <p:sp>
+        <p:nvSpPr>
+          <p:cNvPr id="9" name="TextBox 3">
+            <a:extLst>
+              <a:ext uri="{FF2B5EF4-FFF2-40B4-BE49-F238E27FC236}">
+                <a16:creationId xmlns:a16="http://schemas.microsoft.com/office/drawing/2014/main" id="{F322B547-8EBF-4910-B2C5-45844AF78EE5}"/>
+              </a:ext>
+            </a:extLst>
+          </p:cNvPr>
+          <p:cNvSpPr txBox="1"/>
+          <p:nvPr/>
+        </p:nvSpPr>
+        <p:spPr>
+          <a:xfrm>
+            <a:off x="900112" y="4020746"/>
+            <a:ext cx="7653195" cy="279401"/>
+          </a:xfrm>
+          <a:prstGeom prst="rect">
+            <a:avLst/>
+          </a:prstGeom>
+          <a:ln w="12700">
+            <a:miter lim="400000"/>
+          </a:ln>
+          <a:extLst>
+            <a:ext uri="{C572A759-6A51-4108-AA02-DFA0A04FC94B}">
+              <ma14:wrappingTextBoxFlag xmlns:ma14="http://schemas.microsoft.com/office/mac/drawingml/2011/main" xmlns:a14="http://schemas.microsoft.com/office/drawing/2010/main" xmlns:m="http://schemas.openxmlformats.org/officeDocument/2006/math" xmlns="" val="1"/>
+            </a:ext>
+          </a:extLst>
+        </p:spPr>
+        <p:txBody>
+          <a:bodyPr lIns="0" tIns="0" rIns="0" bIns="0" anchor="t">
+            <a:spAutoFit/>
+          </a:bodyPr>
+          <a:lstStyle>
+            <a:lvl1pPr marL="285750" indent="-285750">
+              <a:buSzPct val="100000"/>
+              <a:buFont typeface="Arial"/>
+              <a:buChar char="•"/>
+              <a:defRPr>
+                <a:solidFill>
+                  <a:srgbClr val="242415"/>
+                </a:solidFill>
+                <a:latin typeface="Open Sans"/>
+                <a:ea typeface="Open Sans"/>
+                <a:cs typeface="Open Sans"/>
+                <a:sym typeface="Open Sans"/>
+              </a:defRPr>
+            </a:lvl1pPr>
+          </a:lstStyle>
+          <a:p>
+            <a:endParaRPr lang="en-US" dirty="0"/>
+          </a:p>
+        </p:txBody>
+      </p:sp>
+      <p:sp>
+        <p:nvSpPr>
+          <p:cNvPr id="12" name="TextBox 3">
+            <a:extLst>
+              <a:ext uri="{FF2B5EF4-FFF2-40B4-BE49-F238E27FC236}">
+                <a16:creationId xmlns:a16="http://schemas.microsoft.com/office/drawing/2014/main" id="{21BB56F7-04AF-46C0-9E61-650C58BCF6C6}"/>
+              </a:ext>
+            </a:extLst>
+          </p:cNvPr>
+          <p:cNvSpPr txBox="1"/>
+          <p:nvPr/>
+        </p:nvSpPr>
+        <p:spPr>
+          <a:xfrm>
+            <a:off x="900112" y="3653092"/>
+            <a:ext cx="7653195" cy="276999"/>
+          </a:xfrm>
+          <a:prstGeom prst="rect">
+            <a:avLst/>
+          </a:prstGeom>
+          <a:ln w="12700">
+            <a:miter lim="400000"/>
+          </a:ln>
+          <a:extLst>
+            <a:ext uri="{C572A759-6A51-4108-AA02-DFA0A04FC94B}">
+              <ma14:wrappingTextBoxFlag xmlns="" xmlns:m="http://schemas.openxmlformats.org/officeDocument/2006/math" xmlns:a14="http://schemas.microsoft.com/office/drawing/2010/main" xmlns:ma14="http://schemas.microsoft.com/office/mac/drawingml/2011/main" val="1"/>
+            </a:ext>
+          </a:extLst>
+        </p:spPr>
+        <p:txBody>
+          <a:bodyPr lIns="0" tIns="0" rIns="0" bIns="0" anchor="t">
+            <a:spAutoFit/>
+          </a:bodyPr>
+          <a:lstStyle/>
+          <a:p>
+            <a:pPr marL="285750" indent="-285750">
+              <a:buSzPct val="100000"/>
+              <a:buFont typeface="Arial"/>
+              <a:buChar char="•"/>
+              <a:defRPr>
+                <a:solidFill>
+                  <a:srgbClr val="242415"/>
+                </a:solidFill>
+                <a:latin typeface="Open Sans"/>
+                <a:ea typeface="Open Sans"/>
+                <a:cs typeface="Open Sans"/>
+                <a:sym typeface="Open Sans"/>
+              </a:defRPr>
+            </a:pPr>
+            <a:endParaRPr lang="en-US" dirty="0"/>
           </a:p>
         </p:txBody>
       </p:sp>
       <p:pic>
         <p:nvPicPr>
-          <p:cNvPr id="299" name="Gráfico 9" descr="Gráfico 9"/>
+          <p:cNvPr id="10" name="Graphic 10">
+            <a:extLst>
+              <a:ext uri="{FF2B5EF4-FFF2-40B4-BE49-F238E27FC236}">
+                <a16:creationId xmlns:a16="http://schemas.microsoft.com/office/drawing/2014/main" id="{808A1E87-93F5-404C-968C-29D7D718C308}"/>
+              </a:ext>
+            </a:extLst>
+          </p:cNvPr>
           <p:cNvPicPr>
             <a:picLocks noChangeAspect="1"/>
           </p:cNvPicPr>
@@ -15741,30 +17341,30 @@
         </p:nvPicPr>
         <p:blipFill>
           <a:blip r:embed="rId2">
-            <a:extLst/>
+            <a:extLst>
+              <a:ext uri="{96DAC541-7B7A-43D3-8B79-37D633B846F1}">
+                <asvg:svgBlip xmlns:asvg="http://schemas.microsoft.com/office/drawing/2016/SVG/main" r:embed="rId3"/>
+              </a:ext>
+            </a:extLst>
           </a:blip>
-          <a:srcRect l="50688" r="13872" b="52337"/>
           <a:stretch>
             <a:fillRect/>
           </a:stretch>
         </p:blipFill>
         <p:spPr>
-          <a:xfrm rot="16200000">
-            <a:off x="7494248" y="3493747"/>
-            <a:ext cx="1701969" cy="1597538"/>
+          <a:xfrm>
+            <a:off x="922752" y="3290644"/>
+            <a:ext cx="1744797" cy="1741355"/>
           </a:xfrm>
           <a:prstGeom prst="rect">
             <a:avLst/>
           </a:prstGeom>
-          <a:ln w="12700">
-            <a:miter lim="400000"/>
-          </a:ln>
         </p:spPr>
       </p:pic>
     </p:spTree>
     <p:extLst>
       <p:ext uri="{BB962C8B-B14F-4D97-AF65-F5344CB8AC3E}">
-        <p14:creationId xmlns:p14="http://schemas.microsoft.com/office/powerpoint/2010/main" val="3475292157"/>
+        <p14:creationId xmlns:p14="http://schemas.microsoft.com/office/powerpoint/2010/main" val="1499336250"/>
       </p:ext>
     </p:extLst>
   </p:cSld>

</xml_diff>